<commit_message>
Updated the Web API PPT and lab
</commit_message>
<xml_diff>
--- a/WebApi.pptx
+++ b/WebApi.pptx
@@ -5,17 +5,21 @@
     <p:sldMasterId id="2147483648" r:id="rId1"/>
   </p:sldMasterIdLst>
   <p:notesMasterIdLst>
-    <p:notesMasterId r:id="rId10"/>
+    <p:notesMasterId r:id="rId14"/>
   </p:notesMasterIdLst>
   <p:sldIdLst>
     <p:sldId id="256" r:id="rId2"/>
-    <p:sldId id="269" r:id="rId3"/>
-    <p:sldId id="282" r:id="rId4"/>
-    <p:sldId id="275" r:id="rId5"/>
-    <p:sldId id="276" r:id="rId6"/>
-    <p:sldId id="277" r:id="rId7"/>
-    <p:sldId id="278" r:id="rId8"/>
-    <p:sldId id="266" r:id="rId9"/>
+    <p:sldId id="270" r:id="rId3"/>
+    <p:sldId id="280" r:id="rId4"/>
+    <p:sldId id="269" r:id="rId5"/>
+    <p:sldId id="271" r:id="rId6"/>
+    <p:sldId id="281" r:id="rId7"/>
+    <p:sldId id="274" r:id="rId8"/>
+    <p:sldId id="275" r:id="rId9"/>
+    <p:sldId id="276" r:id="rId10"/>
+    <p:sldId id="277" r:id="rId11"/>
+    <p:sldId id="278" r:id="rId12"/>
+    <p:sldId id="266" r:id="rId13"/>
   </p:sldIdLst>
   <p:sldSz cx="12192000" cy="6858000"/>
   <p:notesSz cx="6858000" cy="9144000"/>
@@ -115,6 +119,26 @@
     </a:lvl9pPr>
   </p:defaultTextStyle>
   <p:extLst>
+    <p:ext uri="{521415D9-36F7-43E2-AB2F-B90AF26B5E84}">
+      <p14:sectionLst xmlns:p14="http://schemas.microsoft.com/office/powerpoint/2010/main">
+        <p14:section name="Default Section" id="{A8588A2C-5304-4777-96D2-6AB0CCE709AB}">
+          <p14:sldIdLst>
+            <p14:sldId id="256"/>
+            <p14:sldId id="270"/>
+            <p14:sldId id="280"/>
+            <p14:sldId id="269"/>
+            <p14:sldId id="271"/>
+            <p14:sldId id="281"/>
+            <p14:sldId id="274"/>
+            <p14:sldId id="275"/>
+            <p14:sldId id="276"/>
+            <p14:sldId id="277"/>
+            <p14:sldId id="278"/>
+            <p14:sldId id="266"/>
+          </p14:sldIdLst>
+        </p14:section>
+      </p14:sectionLst>
+    </p:ext>
     <p:ext uri="{EFAFB233-063F-42B5-8137-9DF3F51BA10A}">
       <p15:sldGuideLst xmlns:p15="http://schemas.microsoft.com/office/powerpoint/2012/main">
         <p15:guide id="1" orient="horz" pos="2160">
@@ -215,7 +239,7 @@
           <a:p>
             <a:fld id="{84B89DD8-053B-4359-975A-4914A74E1808}" type="datetimeFigureOut">
               <a:rPr lang="en-US" smtClean="0"/>
-              <a:t>9/29/2013</a:t>
+              <a:t>10/18/2013</a:t>
             </a:fld>
             <a:endParaRPr lang="en-US"/>
           </a:p>
@@ -532,15 +556,7 @@
           <a:bodyPr/>
           <a:lstStyle/>
           <a:p>
-            <a:r>
-              <a:rPr lang="en-US" dirty="0" smtClean="0"/>
-              <a:t>HTTP defines several components that</a:t>
-            </a:r>
-            <a:r>
-              <a:rPr lang="en-US" baseline="0" dirty="0" smtClean="0"/>
-              <a:t> allow distributed, loosely-coupled agents to communicate. The first lines of requests and responses are standardized to ensure that loosely-coupled components can understand one another, yet they allow for extension either by standards bodies or for internal, proprietary use.</a:t>
-            </a:r>
-            <a:endParaRPr lang="en-US" dirty="0"/>
+            <a:endParaRPr lang="en-US"/>
           </a:p>
         </p:txBody>
       </p:sp>
@@ -570,7 +586,120 @@
     </p:spTree>
     <p:extLst>
       <p:ext uri="{BB962C8B-B14F-4D97-AF65-F5344CB8AC3E}">
-        <p14:creationId xmlns:p14="http://schemas.microsoft.com/office/powerpoint/2010/main" val="674673678"/>
+        <p14:creationId xmlns:p14="http://schemas.microsoft.com/office/powerpoint/2010/main" val="911349666"/>
+      </p:ext>
+    </p:extLst>
+  </p:cSld>
+  <p:clrMapOvr>
+    <a:masterClrMapping/>
+  </p:clrMapOvr>
+</p:notes>
+</file>
+
+<file path=ppt/notesSlides/notesSlide10.xml><?xml version="1.0" encoding="utf-8"?>
+<p:notes xmlns:a="http://schemas.openxmlformats.org/drawingml/2006/main" xmlns:r="http://schemas.openxmlformats.org/officeDocument/2006/relationships" xmlns:p="http://schemas.openxmlformats.org/presentationml/2006/main">
+  <p:cSld>
+    <p:spTree>
+      <p:nvGrpSpPr>
+        <p:cNvPr id="1" name=""/>
+        <p:cNvGrpSpPr/>
+        <p:nvPr/>
+      </p:nvGrpSpPr>
+      <p:grpSpPr>
+        <a:xfrm>
+          <a:off x="0" y="0"/>
+          <a:ext cx="0" cy="0"/>
+          <a:chOff x="0" y="0"/>
+          <a:chExt cx="0" cy="0"/>
+        </a:xfrm>
+      </p:grpSpPr>
+      <p:sp>
+        <p:nvSpPr>
+          <p:cNvPr id="2" name="Slide Image Placeholder 1"/>
+          <p:cNvSpPr>
+            <a:spLocks noGrp="1" noRot="1" noChangeAspect="1"/>
+          </p:cNvSpPr>
+          <p:nvPr>
+            <p:ph type="sldImg"/>
+          </p:nvPr>
+        </p:nvSpPr>
+        <p:spPr>
+          <a:xfrm>
+            <a:off x="381000" y="685800"/>
+            <a:ext cx="6096000" cy="3429000"/>
+          </a:xfrm>
+        </p:spPr>
+      </p:sp>
+      <p:sp>
+        <p:nvSpPr>
+          <p:cNvPr id="3" name="Notes Placeholder 2"/>
+          <p:cNvSpPr>
+            <a:spLocks noGrp="1"/>
+          </p:cNvSpPr>
+          <p:nvPr>
+            <p:ph type="body" idx="1"/>
+          </p:nvPr>
+        </p:nvSpPr>
+        <p:spPr/>
+        <p:txBody>
+          <a:bodyPr/>
+          <a:lstStyle/>
+          <a:p>
+            <a:r>
+              <a:rPr lang="en-US" dirty="0" smtClean="0"/>
+              <a:t>Similar</a:t>
+            </a:r>
+            <a:r>
+              <a:rPr lang="en-US" baseline="0" dirty="0" smtClean="0"/>
+              <a:t> to resource, merge is a function of HttpRequestMessage -&gt; </a:t>
+            </a:r>
+            <a:r>
+              <a:rPr lang="en-US" baseline="0" dirty="0" err="1" smtClean="0"/>
+              <a:t>Async</a:t>
+            </a:r>
+            <a:r>
+              <a:rPr lang="en-US" baseline="0" dirty="0" smtClean="0"/>
+              <a:t>&lt;HttpResponseMessage&gt; option. When a resource </a:t>
+            </a:r>
+            <a:r>
+              <a:rPr lang="en-US" baseline="0" dirty="0" err="1" smtClean="0"/>
+              <a:t>uri</a:t>
+            </a:r>
+            <a:r>
+              <a:rPr lang="en-US" baseline="0" dirty="0" smtClean="0"/>
+              <a:t> is not found, a 404 Not Found response is returned. The result, however, is a Frank application.</a:t>
+            </a:r>
+            <a:endParaRPr lang="en-US" dirty="0"/>
+          </a:p>
+        </p:txBody>
+      </p:sp>
+      <p:sp>
+        <p:nvSpPr>
+          <p:cNvPr id="4" name="Slide Number Placeholder 3"/>
+          <p:cNvSpPr>
+            <a:spLocks noGrp="1"/>
+          </p:cNvSpPr>
+          <p:nvPr>
+            <p:ph type="sldNum" sz="quarter" idx="10"/>
+          </p:nvPr>
+        </p:nvSpPr>
+        <p:spPr/>
+        <p:txBody>
+          <a:bodyPr/>
+          <a:lstStyle/>
+          <a:p>
+            <a:fld id="{A5FD7785-0E15-469E-85B3-F8AF7D47EE69}" type="slidenum">
+              <a:rPr lang="en-US" smtClean="0"/>
+              <a:t>11</a:t>
+            </a:fld>
+            <a:endParaRPr lang="en-US"/>
+          </a:p>
+        </p:txBody>
+      </p:sp>
+    </p:spTree>
+    <p:extLst>
+      <p:ext uri="{BB962C8B-B14F-4D97-AF65-F5344CB8AC3E}">
+        <p14:creationId xmlns:p14="http://schemas.microsoft.com/office/powerpoint/2010/main" val="441788286"/>
       </p:ext>
     </p:extLst>
   </p:cSld>
@@ -629,15 +758,7 @@
           <a:bodyPr/>
           <a:lstStyle/>
           <a:p>
-            <a:r>
-              <a:rPr lang="en-US" dirty="0" smtClean="0"/>
-              <a:t>HTTP defines several components that</a:t>
-            </a:r>
-            <a:r>
-              <a:rPr lang="en-US" baseline="0" dirty="0" smtClean="0"/>
-              <a:t> allow distributed, loosely-coupled agents to communicate. The first lines of requests and responses are standardized to ensure that loosely-coupled components can understand one another, yet they allow for extension either by standards bodies or for internal, proprietary use.</a:t>
-            </a:r>
-            <a:endParaRPr lang="en-US" dirty="0"/>
+            <a:endParaRPr lang="en-US"/>
           </a:p>
         </p:txBody>
       </p:sp>
@@ -667,7 +788,7 @@
     </p:spTree>
     <p:extLst>
       <p:ext uri="{BB962C8B-B14F-4D97-AF65-F5344CB8AC3E}">
-        <p14:creationId xmlns:p14="http://schemas.microsoft.com/office/powerpoint/2010/main" val="1172357074"/>
+        <p14:creationId xmlns:p14="http://schemas.microsoft.com/office/powerpoint/2010/main" val="2550040956"/>
       </p:ext>
     </p:extLst>
   </p:cSld>
@@ -728,43 +849,11 @@
           <a:p>
             <a:r>
               <a:rPr lang="en-US" dirty="0" smtClean="0"/>
-              <a:t>Compare</a:t>
+              <a:t>HTTP defines several components that</a:t>
             </a:r>
             <a:r>
               <a:rPr lang="en-US" baseline="0" dirty="0" smtClean="0"/>
-              <a:t> the Frank application signature with the simplest app signature we used above. The only addition is that we are stating that an application is non-blocking. This is the same idea as is used in node.js. It’s also sort-of required since Frank sits on </a:t>
-            </a:r>
-            <a:r>
-              <a:rPr lang="en-US" baseline="0" dirty="0" err="1" smtClean="0"/>
-              <a:t>System.Net.Http</a:t>
-            </a:r>
-            <a:r>
-              <a:rPr lang="en-US" baseline="0" dirty="0" smtClean="0"/>
-              <a:t> via </a:t>
-            </a:r>
-            <a:r>
-              <a:rPr lang="en-US" baseline="0" dirty="0" err="1" smtClean="0"/>
-              <a:t>MessageHandlers</a:t>
-            </a:r>
-            <a:r>
-              <a:rPr lang="en-US" baseline="0" dirty="0" smtClean="0"/>
-              <a:t>. The signature for the </a:t>
-            </a:r>
-            <a:r>
-              <a:rPr lang="en-US" baseline="0" dirty="0" err="1" smtClean="0"/>
-              <a:t>MessageHandler.SendAsync</a:t>
-            </a:r>
-            <a:r>
-              <a:rPr lang="en-US" baseline="0" dirty="0" smtClean="0"/>
-              <a:t> is the same but for Task rather than </a:t>
-            </a:r>
-            <a:r>
-              <a:rPr lang="en-US" baseline="0" dirty="0" err="1" smtClean="0"/>
-              <a:t>Async</a:t>
-            </a:r>
-            <a:r>
-              <a:rPr lang="en-US" baseline="0" dirty="0" smtClean="0"/>
-              <a:t>. This signature extends all the way through all layers of composition.</a:t>
+              <a:t> allow distributed, loosely-coupled agents to communicate. The first lines of requests and responses are standardized to ensure that loosely-coupled components can understand one another, yet they allow for extension either by standards bodies or for internal, proprietary use.</a:t>
             </a:r>
             <a:endParaRPr lang="en-US" dirty="0"/>
           </a:p>
@@ -796,7 +885,7 @@
     </p:spTree>
     <p:extLst>
       <p:ext uri="{BB962C8B-B14F-4D97-AF65-F5344CB8AC3E}">
-        <p14:creationId xmlns:p14="http://schemas.microsoft.com/office/powerpoint/2010/main" val="809592611"/>
+        <p14:creationId xmlns:p14="http://schemas.microsoft.com/office/powerpoint/2010/main" val="674673678"/>
       </p:ext>
     </p:extLst>
   </p:cSld>
@@ -855,7 +944,15 @@
           <a:bodyPr/>
           <a:lstStyle/>
           <a:p>
-            <a:endParaRPr lang="en-US"/>
+            <a:r>
+              <a:rPr lang="en-US" dirty="0" smtClean="0"/>
+              <a:t>This may be new to some, but this resource is not the same as the collection</a:t>
+            </a:r>
+            <a:r>
+              <a:rPr lang="en-US" baseline="0" dirty="0" smtClean="0"/>
+              <a:t> of items at /items.</a:t>
+            </a:r>
+            <a:endParaRPr lang="en-US" dirty="0"/>
           </a:p>
         </p:txBody>
       </p:sp>
@@ -885,7 +982,7 @@
     </p:spTree>
     <p:extLst>
       <p:ext uri="{BB962C8B-B14F-4D97-AF65-F5344CB8AC3E}">
-        <p14:creationId xmlns:p14="http://schemas.microsoft.com/office/powerpoint/2010/main" val="1749080848"/>
+        <p14:creationId xmlns:p14="http://schemas.microsoft.com/office/powerpoint/2010/main" val="1358736746"/>
       </p:ext>
     </p:extLst>
   </p:cSld>
@@ -946,19 +1043,11 @@
           <a:p>
             <a:r>
               <a:rPr lang="en-US" dirty="0" smtClean="0"/>
-              <a:t>A resource is the only curren</a:t>
+              <a:t>HTTP defines several components that</a:t>
             </a:r>
             <a:r>
               <a:rPr lang="en-US" baseline="0" dirty="0" smtClean="0"/>
-              <a:t>t location that does not conform solely to the Frank application signature. A resource holds both a Uri Template (its name) as well as a HttpRequestMessage -&gt; </a:t>
-            </a:r>
-            <a:r>
-              <a:rPr lang="en-US" baseline="0" dirty="0" err="1" smtClean="0"/>
-              <a:t>Async</a:t>
-            </a:r>
-            <a:r>
-              <a:rPr lang="en-US" baseline="0" dirty="0" smtClean="0"/>
-              <a:t>&lt;HttpResponseMessage&gt; option. Why the option? The resource will respond with a 405 Method Not Allowed if it does not respond to the method thrown its way. Thus the option allows the programmer to define the methods for the resource without having to manually hook up the 405 response.</a:t>
+              <a:t> allow distributed, loosely-coupled agents to communicate. The first lines of requests and responses are standardized to ensure that loosely-coupled components can understand one another, yet they allow for extension either by standards bodies or for internal, proprietary use.</a:t>
             </a:r>
             <a:endParaRPr lang="en-US" dirty="0"/>
           </a:p>
@@ -990,7 +1079,7 @@
     </p:spTree>
     <p:extLst>
       <p:ext uri="{BB962C8B-B14F-4D97-AF65-F5344CB8AC3E}">
-        <p14:creationId xmlns:p14="http://schemas.microsoft.com/office/powerpoint/2010/main" val="3397532311"/>
+        <p14:creationId xmlns:p14="http://schemas.microsoft.com/office/powerpoint/2010/main" val="1393561364"/>
       </p:ext>
     </p:extLst>
   </p:cSld>
@@ -1051,27 +1140,19 @@
           <a:p>
             <a:r>
               <a:rPr lang="en-US" dirty="0" smtClean="0"/>
-              <a:t>Similar</a:t>
+              <a:t>For those with a stronger</a:t>
             </a:r>
             <a:r>
               <a:rPr lang="en-US" baseline="0" dirty="0" smtClean="0"/>
-              <a:t> to resource, merge is a function of HttpRequestMessage -&gt; </a:t>
+              <a:t> bent towards building web sites, Mauricio </a:t>
             </a:r>
             <a:r>
               <a:rPr lang="en-US" baseline="0" dirty="0" err="1" smtClean="0"/>
-              <a:t>Async</a:t>
+              <a:t>Scheffer’s</a:t>
             </a:r>
             <a:r>
               <a:rPr lang="en-US" baseline="0" dirty="0" smtClean="0"/>
-              <a:t>&lt;HttpResponseMessage&gt; option. When a resource </a:t>
-            </a:r>
-            <a:r>
-              <a:rPr lang="en-US" baseline="0" dirty="0" err="1" smtClean="0"/>
-              <a:t>uri</a:t>
-            </a:r>
-            <a:r>
-              <a:rPr lang="en-US" baseline="0" dirty="0" smtClean="0"/>
-              <a:t> is not found, a 404 Not Found response is returned. The result, however, is a Frank application.</a:t>
+              <a:t> Figment may be a closer match to your taste.</a:t>
             </a:r>
             <a:endParaRPr lang="en-US" dirty="0"/>
           </a:p>
@@ -1103,7 +1184,330 @@
     </p:spTree>
     <p:extLst>
       <p:ext uri="{BB962C8B-B14F-4D97-AF65-F5344CB8AC3E}">
-        <p14:creationId xmlns:p14="http://schemas.microsoft.com/office/powerpoint/2010/main" val="441788286"/>
+        <p14:creationId xmlns:p14="http://schemas.microsoft.com/office/powerpoint/2010/main" val="1706336117"/>
+      </p:ext>
+    </p:extLst>
+  </p:cSld>
+  <p:clrMapOvr>
+    <a:masterClrMapping/>
+  </p:clrMapOvr>
+</p:notes>
+</file>
+
+<file path=ppt/notesSlides/notesSlide7.xml><?xml version="1.0" encoding="utf-8"?>
+<p:notes xmlns:a="http://schemas.openxmlformats.org/drawingml/2006/main" xmlns:r="http://schemas.openxmlformats.org/officeDocument/2006/relationships" xmlns:p="http://schemas.openxmlformats.org/presentationml/2006/main">
+  <p:cSld>
+    <p:spTree>
+      <p:nvGrpSpPr>
+        <p:cNvPr id="1" name=""/>
+        <p:cNvGrpSpPr/>
+        <p:nvPr/>
+      </p:nvGrpSpPr>
+      <p:grpSpPr>
+        <a:xfrm>
+          <a:off x="0" y="0"/>
+          <a:ext cx="0" cy="0"/>
+          <a:chOff x="0" y="0"/>
+          <a:chExt cx="0" cy="0"/>
+        </a:xfrm>
+      </p:grpSpPr>
+      <p:sp>
+        <p:nvSpPr>
+          <p:cNvPr id="2" name="Slide Image Placeholder 1"/>
+          <p:cNvSpPr>
+            <a:spLocks noGrp="1" noRot="1" noChangeAspect="1"/>
+          </p:cNvSpPr>
+          <p:nvPr>
+            <p:ph type="sldImg"/>
+          </p:nvPr>
+        </p:nvSpPr>
+        <p:spPr>
+          <a:xfrm>
+            <a:off x="381000" y="685800"/>
+            <a:ext cx="6096000" cy="3429000"/>
+          </a:xfrm>
+        </p:spPr>
+      </p:sp>
+      <p:sp>
+        <p:nvSpPr>
+          <p:cNvPr id="3" name="Notes Placeholder 2"/>
+          <p:cNvSpPr>
+            <a:spLocks noGrp="1"/>
+          </p:cNvSpPr>
+          <p:nvPr>
+            <p:ph type="body" idx="1"/>
+          </p:nvPr>
+        </p:nvSpPr>
+        <p:spPr/>
+        <p:txBody>
+          <a:bodyPr/>
+          <a:lstStyle/>
+          <a:p>
+            <a:r>
+              <a:rPr lang="en-US" dirty="0" smtClean="0"/>
+              <a:t>Compare</a:t>
+            </a:r>
+            <a:r>
+              <a:rPr lang="en-US" baseline="0" dirty="0" smtClean="0"/>
+              <a:t> the Frank application signature with the simplest app signature we used above. The only addition is that we are stating that an application is non-blocking. This is the same idea as is used in node.js. It’s also sort-of required since Frank sits on </a:t>
+            </a:r>
+            <a:r>
+              <a:rPr lang="en-US" baseline="0" dirty="0" err="1" smtClean="0"/>
+              <a:t>System.Net.Http</a:t>
+            </a:r>
+            <a:r>
+              <a:rPr lang="en-US" baseline="0" dirty="0" smtClean="0"/>
+              <a:t> via </a:t>
+            </a:r>
+            <a:r>
+              <a:rPr lang="en-US" baseline="0" dirty="0" err="1" smtClean="0"/>
+              <a:t>MessageHandlers</a:t>
+            </a:r>
+            <a:r>
+              <a:rPr lang="en-US" baseline="0" dirty="0" smtClean="0"/>
+              <a:t>. The signature for the </a:t>
+            </a:r>
+            <a:r>
+              <a:rPr lang="en-US" baseline="0" dirty="0" err="1" smtClean="0"/>
+              <a:t>MessageHandler.SendAsync</a:t>
+            </a:r>
+            <a:r>
+              <a:rPr lang="en-US" baseline="0" dirty="0" smtClean="0"/>
+              <a:t> is the same but for Task rather than </a:t>
+            </a:r>
+            <a:r>
+              <a:rPr lang="en-US" baseline="0" dirty="0" err="1" smtClean="0"/>
+              <a:t>Async</a:t>
+            </a:r>
+            <a:r>
+              <a:rPr lang="en-US" baseline="0" dirty="0" smtClean="0"/>
+              <a:t>. This signature extends all the way through all layers of composition.</a:t>
+            </a:r>
+            <a:endParaRPr lang="en-US" dirty="0"/>
+          </a:p>
+        </p:txBody>
+      </p:sp>
+      <p:sp>
+        <p:nvSpPr>
+          <p:cNvPr id="4" name="Slide Number Placeholder 3"/>
+          <p:cNvSpPr>
+            <a:spLocks noGrp="1"/>
+          </p:cNvSpPr>
+          <p:nvPr>
+            <p:ph type="sldNum" sz="quarter" idx="10"/>
+          </p:nvPr>
+        </p:nvSpPr>
+        <p:spPr/>
+        <p:txBody>
+          <a:bodyPr/>
+          <a:lstStyle/>
+          <a:p>
+            <a:fld id="{A5FD7785-0E15-469E-85B3-F8AF7D47EE69}" type="slidenum">
+              <a:rPr lang="en-US" smtClean="0"/>
+              <a:t>8</a:t>
+            </a:fld>
+            <a:endParaRPr lang="en-US"/>
+          </a:p>
+        </p:txBody>
+      </p:sp>
+    </p:spTree>
+    <p:extLst>
+      <p:ext uri="{BB962C8B-B14F-4D97-AF65-F5344CB8AC3E}">
+        <p14:creationId xmlns:p14="http://schemas.microsoft.com/office/powerpoint/2010/main" val="809592611"/>
+      </p:ext>
+    </p:extLst>
+  </p:cSld>
+  <p:clrMapOvr>
+    <a:masterClrMapping/>
+  </p:clrMapOvr>
+</p:notes>
+</file>
+
+<file path=ppt/notesSlides/notesSlide8.xml><?xml version="1.0" encoding="utf-8"?>
+<p:notes xmlns:a="http://schemas.openxmlformats.org/drawingml/2006/main" xmlns:r="http://schemas.openxmlformats.org/officeDocument/2006/relationships" xmlns:p="http://schemas.openxmlformats.org/presentationml/2006/main">
+  <p:cSld>
+    <p:spTree>
+      <p:nvGrpSpPr>
+        <p:cNvPr id="1" name=""/>
+        <p:cNvGrpSpPr/>
+        <p:nvPr/>
+      </p:nvGrpSpPr>
+      <p:grpSpPr>
+        <a:xfrm>
+          <a:off x="0" y="0"/>
+          <a:ext cx="0" cy="0"/>
+          <a:chOff x="0" y="0"/>
+          <a:chExt cx="0" cy="0"/>
+        </a:xfrm>
+      </p:grpSpPr>
+      <p:sp>
+        <p:nvSpPr>
+          <p:cNvPr id="2" name="Slide Image Placeholder 1"/>
+          <p:cNvSpPr>
+            <a:spLocks noGrp="1" noRot="1" noChangeAspect="1"/>
+          </p:cNvSpPr>
+          <p:nvPr>
+            <p:ph type="sldImg"/>
+          </p:nvPr>
+        </p:nvSpPr>
+        <p:spPr>
+          <a:xfrm>
+            <a:off x="381000" y="685800"/>
+            <a:ext cx="6096000" cy="3429000"/>
+          </a:xfrm>
+        </p:spPr>
+      </p:sp>
+      <p:sp>
+        <p:nvSpPr>
+          <p:cNvPr id="3" name="Notes Placeholder 2"/>
+          <p:cNvSpPr>
+            <a:spLocks noGrp="1"/>
+          </p:cNvSpPr>
+          <p:nvPr>
+            <p:ph type="body" idx="1"/>
+          </p:nvPr>
+        </p:nvSpPr>
+        <p:spPr/>
+        <p:txBody>
+          <a:bodyPr/>
+          <a:lstStyle/>
+          <a:p>
+            <a:endParaRPr lang="en-US"/>
+          </a:p>
+        </p:txBody>
+      </p:sp>
+      <p:sp>
+        <p:nvSpPr>
+          <p:cNvPr id="4" name="Slide Number Placeholder 3"/>
+          <p:cNvSpPr>
+            <a:spLocks noGrp="1"/>
+          </p:cNvSpPr>
+          <p:nvPr>
+            <p:ph type="sldNum" sz="quarter" idx="10"/>
+          </p:nvPr>
+        </p:nvSpPr>
+        <p:spPr/>
+        <p:txBody>
+          <a:bodyPr/>
+          <a:lstStyle/>
+          <a:p>
+            <a:fld id="{A5FD7785-0E15-469E-85B3-F8AF7D47EE69}" type="slidenum">
+              <a:rPr lang="en-US" smtClean="0"/>
+              <a:t>9</a:t>
+            </a:fld>
+            <a:endParaRPr lang="en-US"/>
+          </a:p>
+        </p:txBody>
+      </p:sp>
+    </p:spTree>
+    <p:extLst>
+      <p:ext uri="{BB962C8B-B14F-4D97-AF65-F5344CB8AC3E}">
+        <p14:creationId xmlns:p14="http://schemas.microsoft.com/office/powerpoint/2010/main" val="1749080848"/>
+      </p:ext>
+    </p:extLst>
+  </p:cSld>
+  <p:clrMapOvr>
+    <a:masterClrMapping/>
+  </p:clrMapOvr>
+</p:notes>
+</file>
+
+<file path=ppt/notesSlides/notesSlide9.xml><?xml version="1.0" encoding="utf-8"?>
+<p:notes xmlns:a="http://schemas.openxmlformats.org/drawingml/2006/main" xmlns:r="http://schemas.openxmlformats.org/officeDocument/2006/relationships" xmlns:p="http://schemas.openxmlformats.org/presentationml/2006/main">
+  <p:cSld>
+    <p:spTree>
+      <p:nvGrpSpPr>
+        <p:cNvPr id="1" name=""/>
+        <p:cNvGrpSpPr/>
+        <p:nvPr/>
+      </p:nvGrpSpPr>
+      <p:grpSpPr>
+        <a:xfrm>
+          <a:off x="0" y="0"/>
+          <a:ext cx="0" cy="0"/>
+          <a:chOff x="0" y="0"/>
+          <a:chExt cx="0" cy="0"/>
+        </a:xfrm>
+      </p:grpSpPr>
+      <p:sp>
+        <p:nvSpPr>
+          <p:cNvPr id="2" name="Slide Image Placeholder 1"/>
+          <p:cNvSpPr>
+            <a:spLocks noGrp="1" noRot="1" noChangeAspect="1"/>
+          </p:cNvSpPr>
+          <p:nvPr>
+            <p:ph type="sldImg"/>
+          </p:nvPr>
+        </p:nvSpPr>
+        <p:spPr>
+          <a:xfrm>
+            <a:off x="381000" y="685800"/>
+            <a:ext cx="6096000" cy="3429000"/>
+          </a:xfrm>
+        </p:spPr>
+      </p:sp>
+      <p:sp>
+        <p:nvSpPr>
+          <p:cNvPr id="3" name="Notes Placeholder 2"/>
+          <p:cNvSpPr>
+            <a:spLocks noGrp="1"/>
+          </p:cNvSpPr>
+          <p:nvPr>
+            <p:ph type="body" idx="1"/>
+          </p:nvPr>
+        </p:nvSpPr>
+        <p:spPr/>
+        <p:txBody>
+          <a:bodyPr/>
+          <a:lstStyle/>
+          <a:p>
+            <a:r>
+              <a:rPr lang="en-US" dirty="0" smtClean="0"/>
+              <a:t>A resource is the only curren</a:t>
+            </a:r>
+            <a:r>
+              <a:rPr lang="en-US" baseline="0" dirty="0" smtClean="0"/>
+              <a:t>t location that does not conform solely to the Frank application signature. A resource holds both a Uri Template (its name) as well as a HttpRequestMessage -&gt; </a:t>
+            </a:r>
+            <a:r>
+              <a:rPr lang="en-US" baseline="0" dirty="0" err="1" smtClean="0"/>
+              <a:t>Async</a:t>
+            </a:r>
+            <a:r>
+              <a:rPr lang="en-US" baseline="0" dirty="0" smtClean="0"/>
+              <a:t>&lt;HttpResponseMessage&gt; option. Why the option? The resource will respond with a 405 Method Not Allowed if it does not respond to the method thrown its way. Thus the option allows the programmer to define the methods for the resource without having to manually hook up the 405 response.</a:t>
+            </a:r>
+            <a:endParaRPr lang="en-US" dirty="0"/>
+          </a:p>
+        </p:txBody>
+      </p:sp>
+      <p:sp>
+        <p:nvSpPr>
+          <p:cNvPr id="4" name="Slide Number Placeholder 3"/>
+          <p:cNvSpPr>
+            <a:spLocks noGrp="1"/>
+          </p:cNvSpPr>
+          <p:nvPr>
+            <p:ph type="sldNum" sz="quarter" idx="10"/>
+          </p:nvPr>
+        </p:nvSpPr>
+        <p:spPr/>
+        <p:txBody>
+          <a:bodyPr/>
+          <a:lstStyle/>
+          <a:p>
+            <a:fld id="{A5FD7785-0E15-469E-85B3-F8AF7D47EE69}" type="slidenum">
+              <a:rPr lang="en-US" smtClean="0"/>
+              <a:t>10</a:t>
+            </a:fld>
+            <a:endParaRPr lang="en-US"/>
+          </a:p>
+        </p:txBody>
+      </p:sp>
+    </p:spTree>
+    <p:extLst>
+      <p:ext uri="{BB962C8B-B14F-4D97-AF65-F5344CB8AC3E}">
+        <p14:creationId xmlns:p14="http://schemas.microsoft.com/office/powerpoint/2010/main" val="3397532311"/>
       </p:ext>
     </p:extLst>
   </p:cSld>
@@ -1296,7 +1700,7 @@
           <a:p>
             <a:fld id="{4AAD347D-5ACD-4C99-B74B-A9C85AD731AF}" type="datetime1">
               <a:rPr lang="en-US" smtClean="0"/>
-              <a:t>9/29/2013</a:t>
+              <a:t>10/18/2013</a:t>
             </a:fld>
             <a:endParaRPr lang="en-US"/>
           </a:p>
@@ -1566,7 +1970,7 @@
           <a:p>
             <a:fld id="{4509A250-FF31-4206-8172-F9D3106AACB1}" type="datetime1">
               <a:rPr lang="en-US" smtClean="0"/>
-              <a:t>9/29/2013</a:t>
+              <a:t>10/18/2013</a:t>
             </a:fld>
             <a:endParaRPr lang="en-US" dirty="0"/>
           </a:p>
@@ -1688,7 +2092,7 @@
           <a:p>
             <a:fld id="{4509A250-FF31-4206-8172-F9D3106AACB1}" type="datetime1">
               <a:rPr lang="en-US" smtClean="0"/>
-              <a:t>9/29/2013</a:t>
+              <a:t>10/18/2013</a:t>
             </a:fld>
             <a:endParaRPr lang="en-US" dirty="0"/>
           </a:p>
@@ -1877,7 +2281,7 @@
           <a:p>
             <a:fld id="{4509A250-FF31-4206-8172-F9D3106AACB1}" type="datetime1">
               <a:rPr lang="en-US" smtClean="0"/>
-              <a:t>9/29/2013</a:t>
+              <a:t>10/18/2013</a:t>
             </a:fld>
             <a:endParaRPr lang="en-US" dirty="0"/>
           </a:p>
@@ -2347,7 +2751,7 @@
           <a:p>
             <a:fld id="{4509A250-FF31-4206-8172-F9D3106AACB1}" type="datetime1">
               <a:rPr lang="en-US" smtClean="0"/>
-              <a:t>9/29/2013</a:t>
+              <a:t>10/18/2013</a:t>
             </a:fld>
             <a:endParaRPr lang="en-US" dirty="0"/>
           </a:p>
@@ -2469,7 +2873,7 @@
           <a:p>
             <a:fld id="{4509A250-FF31-4206-8172-F9D3106AACB1}" type="datetime1">
               <a:rPr lang="en-US" smtClean="0"/>
-              <a:t>9/29/2013</a:t>
+              <a:t>10/18/2013</a:t>
             </a:fld>
             <a:endParaRPr lang="en-US" dirty="0"/>
           </a:p>
@@ -2755,7 +3159,7 @@
           <a:p>
             <a:fld id="{4509A250-FF31-4206-8172-F9D3106AACB1}" type="datetime1">
               <a:rPr lang="en-US" smtClean="0"/>
-              <a:t>9/29/2013</a:t>
+              <a:t>10/18/2013</a:t>
             </a:fld>
             <a:endParaRPr lang="en-US" dirty="0"/>
           </a:p>
@@ -3501,7 +3905,7 @@
           <a:p>
             <a:fld id="{4509A250-FF31-4206-8172-F9D3106AACB1}" type="datetime1">
               <a:rPr lang="en-US" smtClean="0"/>
-              <a:t>9/29/2013</a:t>
+              <a:t>10/18/2013</a:t>
             </a:fld>
             <a:endParaRPr lang="en-US" dirty="0"/>
           </a:p>
@@ -4343,7 +4747,7 @@
           <a:p>
             <a:fld id="{4509A250-FF31-4206-8172-F9D3106AACB1}" type="datetime1">
               <a:rPr lang="en-US" smtClean="0"/>
-              <a:t>9/29/2013</a:t>
+              <a:t>10/18/2013</a:t>
             </a:fld>
             <a:endParaRPr lang="en-US" dirty="0"/>
           </a:p>
@@ -4508,7 +4912,7 @@
           <a:p>
             <a:fld id="{4509A250-FF31-4206-8172-F9D3106AACB1}" type="datetime1">
               <a:rPr lang="en-US" smtClean="0"/>
-              <a:t>9/29/2013</a:t>
+              <a:t>10/18/2013</a:t>
             </a:fld>
             <a:endParaRPr lang="en-US" dirty="0"/>
           </a:p>
@@ -4683,7 +5087,7 @@
           <a:p>
             <a:fld id="{4509A250-FF31-4206-8172-F9D3106AACB1}" type="datetime1">
               <a:rPr lang="en-US" smtClean="0"/>
-              <a:t>9/29/2013</a:t>
+              <a:t>10/18/2013</a:t>
             </a:fld>
             <a:endParaRPr lang="en-US" dirty="0"/>
           </a:p>
@@ -4848,7 +5252,7 @@
           <a:p>
             <a:fld id="{4509A250-FF31-4206-8172-F9D3106AACB1}" type="datetime1">
               <a:rPr lang="en-US" smtClean="0"/>
-              <a:t>9/29/2013</a:t>
+              <a:t>10/18/2013</a:t>
             </a:fld>
             <a:endParaRPr lang="en-US" dirty="0"/>
           </a:p>
@@ -5087,7 +5491,7 @@
           <a:p>
             <a:fld id="{4509A250-FF31-4206-8172-F9D3106AACB1}" type="datetime1">
               <a:rPr lang="en-US" smtClean="0"/>
-              <a:t>9/29/2013</a:t>
+              <a:t>10/18/2013</a:t>
             </a:fld>
             <a:endParaRPr lang="en-US" dirty="0"/>
           </a:p>
@@ -5374,7 +5778,7 @@
           <a:p>
             <a:fld id="{4509A250-FF31-4206-8172-F9D3106AACB1}" type="datetime1">
               <a:rPr lang="en-US" smtClean="0"/>
-              <a:t>9/29/2013</a:t>
+              <a:t>10/18/2013</a:t>
             </a:fld>
             <a:endParaRPr lang="en-US" dirty="0"/>
           </a:p>
@@ -5807,7 +6211,7 @@
           <a:p>
             <a:fld id="{4509A250-FF31-4206-8172-F9D3106AACB1}" type="datetime1">
               <a:rPr lang="en-US" smtClean="0"/>
-              <a:t>9/29/2013</a:t>
+              <a:t>10/18/2013</a:t>
             </a:fld>
             <a:endParaRPr lang="en-US" dirty="0"/>
           </a:p>
@@ -5920,7 +6324,7 @@
           <a:p>
             <a:fld id="{4509A250-FF31-4206-8172-F9D3106AACB1}" type="datetime1">
               <a:rPr lang="en-US" smtClean="0"/>
-              <a:t>9/29/2013</a:t>
+              <a:t>10/18/2013</a:t>
             </a:fld>
             <a:endParaRPr lang="en-US" dirty="0"/>
           </a:p>
@@ -6010,7 +6414,7 @@
           <a:p>
             <a:fld id="{4509A250-FF31-4206-8172-F9D3106AACB1}" type="datetime1">
               <a:rPr lang="en-US" smtClean="0"/>
-              <a:t>9/29/2013</a:t>
+              <a:t>10/18/2013</a:t>
             </a:fld>
             <a:endParaRPr lang="en-US" dirty="0"/>
           </a:p>
@@ -6284,7 +6688,7 @@
           <a:p>
             <a:fld id="{4509A250-FF31-4206-8172-F9D3106AACB1}" type="datetime1">
               <a:rPr lang="en-US" smtClean="0"/>
-              <a:t>9/29/2013</a:t>
+              <a:t>10/18/2013</a:t>
             </a:fld>
             <a:endParaRPr lang="en-US" dirty="0"/>
           </a:p>
@@ -6554,7 +6958,7 @@
           <a:p>
             <a:fld id="{4509A250-FF31-4206-8172-F9D3106AACB1}" type="datetime1">
               <a:rPr lang="en-US" smtClean="0"/>
-              <a:t>9/29/2013</a:t>
+              <a:t>10/18/2013</a:t>
             </a:fld>
             <a:endParaRPr lang="en-US" dirty="0"/>
           </a:p>
@@ -7162,7 +7566,7 @@
           <a:p>
             <a:fld id="{4509A250-FF31-4206-8172-F9D3106AACB1}" type="datetime1">
               <a:rPr lang="en-US" smtClean="0"/>
-              <a:t>9/29/2013</a:t>
+              <a:t>10/18/2013</a:t>
             </a:fld>
             <a:endParaRPr lang="en-US" dirty="0"/>
           </a:p>
@@ -7682,8 +8086,8 @@
           <a:lstStyle/>
           <a:p>
             <a:r>
-              <a:rPr lang="en-US" smtClean="0"/>
-              <a:t>Web APIs with F#</a:t>
+              <a:rPr lang="en-US" dirty="0" smtClean="0"/>
+              <a:t>Web API</a:t>
             </a:r>
             <a:endParaRPr lang="en-US" dirty="0"/>
           </a:p>
@@ -7691,7 +8095,7 @@
       </p:sp>
       <p:sp>
         <p:nvSpPr>
-          <p:cNvPr id="6" name="Subtitle 2"/>
+          <p:cNvPr id="5" name="Subtitle 2"/>
           <p:cNvSpPr>
             <a:spLocks noGrp="1"/>
           </p:cNvSpPr>
@@ -7699,7 +8103,7 @@
         </p:nvSpPr>
         <p:spPr>
           <a:xfrm>
-            <a:off x="7471968" y="4930551"/>
+            <a:off x="7678030" y="4786824"/>
             <a:ext cx="4331445" cy="2019660"/>
           </a:xfrm>
           <a:prstGeom prst="rect">
@@ -7708,100 +8112,221 @@
         </p:spPr>
         <p:txBody>
           <a:bodyPr vert="horz" lIns="91440" tIns="45720" rIns="91440" bIns="45720" rtlCol="0" anchor="t">
-            <a:normAutofit/>
+            <a:normAutofit lnSpcReduction="10000"/>
           </a:bodyPr>
           <a:lstStyle>
-            <a:defPPr>
-              <a:defRPr lang="en-US"/>
-            </a:defPPr>
-            <a:lvl1pPr marL="0" algn="l" defTabSz="457200" rtl="0" eaLnBrk="1" latinLnBrk="0" hangingPunct="1">
-              <a:defRPr sz="1800" kern="1200">
+            <a:lvl1pPr marL="0" indent="0" algn="l" defTabSz="457200" rtl="0" eaLnBrk="1" latinLnBrk="0" hangingPunct="1">
+              <a:spcBef>
+                <a:spcPct val="20000"/>
+              </a:spcBef>
+              <a:spcAft>
+                <a:spcPts val="600"/>
+              </a:spcAft>
+              <a:buClr>
+                <a:schemeClr val="accent1"/>
+              </a:buClr>
+              <a:buSzPct val="80000"/>
+              <a:buFont typeface="Wingdings 3" charset="2"/>
+              <a:buNone/>
+              <a:defRPr sz="2000" b="0" i="0" kern="1200" cap="all">
                 <a:solidFill>
-                  <a:schemeClr val="tx1"/>
+                  <a:schemeClr val="accent1"/>
                 </a:solidFill>
-                <a:latin typeface="+mn-lt"/>
-                <a:ea typeface="+mn-ea"/>
-                <a:cs typeface="+mn-cs"/>
+                <a:latin typeface="+mj-lt"/>
+                <a:ea typeface="+mj-ea"/>
+                <a:cs typeface="+mj-cs"/>
               </a:defRPr>
             </a:lvl1pPr>
-            <a:lvl2pPr marL="457200" algn="l" defTabSz="457200" rtl="0" eaLnBrk="1" latinLnBrk="0" hangingPunct="1">
-              <a:defRPr sz="1800" kern="1200">
+            <a:lvl2pPr marL="457200" indent="0" algn="ctr" defTabSz="457200" rtl="0" eaLnBrk="1" latinLnBrk="0" hangingPunct="1">
+              <a:spcBef>
+                <a:spcPct val="20000"/>
+              </a:spcBef>
+              <a:spcAft>
+                <a:spcPts val="600"/>
+              </a:spcAft>
+              <a:buClr>
+                <a:schemeClr val="accent1"/>
+              </a:buClr>
+              <a:buSzPct val="80000"/>
+              <a:buFont typeface="Wingdings 3" charset="2"/>
+              <a:buNone/>
+              <a:defRPr sz="1800" b="0" i="0" kern="1200">
                 <a:solidFill>
-                  <a:schemeClr val="tx1"/>
+                  <a:schemeClr val="tx1">
+                    <a:tint val="75000"/>
+                  </a:schemeClr>
                 </a:solidFill>
-                <a:latin typeface="+mn-lt"/>
-                <a:ea typeface="+mn-ea"/>
-                <a:cs typeface="+mn-cs"/>
+                <a:latin typeface="+mj-lt"/>
+                <a:ea typeface="+mj-ea"/>
+                <a:cs typeface="+mj-cs"/>
               </a:defRPr>
             </a:lvl2pPr>
-            <a:lvl3pPr marL="914400" algn="l" defTabSz="457200" rtl="0" eaLnBrk="1" latinLnBrk="0" hangingPunct="1">
-              <a:defRPr sz="1800" kern="1200">
+            <a:lvl3pPr marL="914400" indent="0" algn="ctr" defTabSz="457200" rtl="0" eaLnBrk="1" latinLnBrk="0" hangingPunct="1">
+              <a:spcBef>
+                <a:spcPct val="20000"/>
+              </a:spcBef>
+              <a:spcAft>
+                <a:spcPts val="600"/>
+              </a:spcAft>
+              <a:buClr>
+                <a:schemeClr val="accent1"/>
+              </a:buClr>
+              <a:buSzPct val="80000"/>
+              <a:buFont typeface="Wingdings 3" charset="2"/>
+              <a:buNone/>
+              <a:defRPr sz="1600" b="0" i="0" kern="1200">
                 <a:solidFill>
-                  <a:schemeClr val="tx1"/>
+                  <a:schemeClr val="tx1">
+                    <a:tint val="75000"/>
+                  </a:schemeClr>
                 </a:solidFill>
-                <a:latin typeface="+mn-lt"/>
-                <a:ea typeface="+mn-ea"/>
-                <a:cs typeface="+mn-cs"/>
+                <a:latin typeface="+mj-lt"/>
+                <a:ea typeface="+mj-ea"/>
+                <a:cs typeface="+mj-cs"/>
               </a:defRPr>
             </a:lvl3pPr>
-            <a:lvl4pPr marL="1371600" algn="l" defTabSz="457200" rtl="0" eaLnBrk="1" latinLnBrk="0" hangingPunct="1">
-              <a:defRPr sz="1800" kern="1200">
+            <a:lvl4pPr marL="1371600" indent="0" algn="ctr" defTabSz="457200" rtl="0" eaLnBrk="1" latinLnBrk="0" hangingPunct="1">
+              <a:spcBef>
+                <a:spcPct val="20000"/>
+              </a:spcBef>
+              <a:spcAft>
+                <a:spcPts val="600"/>
+              </a:spcAft>
+              <a:buClr>
+                <a:schemeClr val="accent1"/>
+              </a:buClr>
+              <a:buSzPct val="80000"/>
+              <a:buFont typeface="Wingdings 3" charset="2"/>
+              <a:buNone/>
+              <a:defRPr sz="1400" b="0" i="0" kern="1200">
                 <a:solidFill>
-                  <a:schemeClr val="tx1"/>
+                  <a:schemeClr val="tx1">
+                    <a:tint val="75000"/>
+                  </a:schemeClr>
                 </a:solidFill>
-                <a:latin typeface="+mn-lt"/>
-                <a:ea typeface="+mn-ea"/>
-                <a:cs typeface="+mn-cs"/>
+                <a:latin typeface="+mj-lt"/>
+                <a:ea typeface="+mj-ea"/>
+                <a:cs typeface="+mj-cs"/>
               </a:defRPr>
             </a:lvl4pPr>
-            <a:lvl5pPr marL="1828800" algn="l" defTabSz="457200" rtl="0" eaLnBrk="1" latinLnBrk="0" hangingPunct="1">
-              <a:defRPr sz="1800" kern="1200">
+            <a:lvl5pPr marL="1828800" indent="0" algn="ctr" defTabSz="457200" rtl="0" eaLnBrk="1" latinLnBrk="0" hangingPunct="1">
+              <a:spcBef>
+                <a:spcPct val="20000"/>
+              </a:spcBef>
+              <a:spcAft>
+                <a:spcPts val="600"/>
+              </a:spcAft>
+              <a:buClr>
+                <a:schemeClr val="accent1"/>
+              </a:buClr>
+              <a:buSzPct val="80000"/>
+              <a:buFont typeface="Wingdings 3" charset="2"/>
+              <a:buNone/>
+              <a:defRPr sz="1400" b="0" i="0" kern="1200">
                 <a:solidFill>
-                  <a:schemeClr val="tx1"/>
+                  <a:schemeClr val="tx1">
+                    <a:tint val="75000"/>
+                  </a:schemeClr>
                 </a:solidFill>
-                <a:latin typeface="+mn-lt"/>
-                <a:ea typeface="+mn-ea"/>
-                <a:cs typeface="+mn-cs"/>
+                <a:latin typeface="+mj-lt"/>
+                <a:ea typeface="+mj-ea"/>
+                <a:cs typeface="+mj-cs"/>
               </a:defRPr>
             </a:lvl5pPr>
-            <a:lvl6pPr marL="2286000" algn="l" defTabSz="457200" rtl="0" eaLnBrk="1" latinLnBrk="0" hangingPunct="1">
-              <a:defRPr sz="1800" kern="1200">
+            <a:lvl6pPr marL="2286000" indent="0" algn="ctr" defTabSz="457200" rtl="0" eaLnBrk="1" latinLnBrk="0" hangingPunct="1">
+              <a:spcBef>
+                <a:spcPct val="20000"/>
+              </a:spcBef>
+              <a:spcAft>
+                <a:spcPts val="600"/>
+              </a:spcAft>
+              <a:buClr>
+                <a:schemeClr val="accent1"/>
+              </a:buClr>
+              <a:buSzPct val="80000"/>
+              <a:buFont typeface="Wingdings 3" charset="2"/>
+              <a:buNone/>
+              <a:defRPr sz="120" b="0" i="0" kern="1200">
                 <a:solidFill>
-                  <a:schemeClr val="tx1"/>
+                  <a:schemeClr val="tx1">
+                    <a:tint val="75000"/>
+                  </a:schemeClr>
                 </a:solidFill>
-                <a:latin typeface="+mn-lt"/>
-                <a:ea typeface="+mn-ea"/>
-                <a:cs typeface="+mn-cs"/>
+                <a:latin typeface="+mj-lt"/>
+                <a:ea typeface="+mj-ea"/>
+                <a:cs typeface="+mj-cs"/>
               </a:defRPr>
             </a:lvl6pPr>
-            <a:lvl7pPr marL="2743200" algn="l" defTabSz="457200" rtl="0" eaLnBrk="1" latinLnBrk="0" hangingPunct="1">
-              <a:defRPr sz="1800" kern="1200">
+            <a:lvl7pPr marL="2743200" indent="0" algn="ctr" defTabSz="457200" rtl="0" eaLnBrk="1" latinLnBrk="0" hangingPunct="1">
+              <a:spcBef>
+                <a:spcPct val="20000"/>
+              </a:spcBef>
+              <a:spcAft>
+                <a:spcPts val="600"/>
+              </a:spcAft>
+              <a:buClr>
+                <a:schemeClr val="accent1"/>
+              </a:buClr>
+              <a:buSzPct val="80000"/>
+              <a:buFont typeface="Wingdings 3" charset="2"/>
+              <a:buNone/>
+              <a:defRPr sz="120" b="0" i="0" kern="1200">
                 <a:solidFill>
-                  <a:schemeClr val="tx1"/>
+                  <a:schemeClr val="tx1">
+                    <a:tint val="75000"/>
+                  </a:schemeClr>
                 </a:solidFill>
-                <a:latin typeface="+mn-lt"/>
-                <a:ea typeface="+mn-ea"/>
-                <a:cs typeface="+mn-cs"/>
+                <a:latin typeface="+mj-lt"/>
+                <a:ea typeface="+mj-ea"/>
+                <a:cs typeface="+mj-cs"/>
               </a:defRPr>
             </a:lvl7pPr>
-            <a:lvl8pPr marL="3200400" algn="l" defTabSz="457200" rtl="0" eaLnBrk="1" latinLnBrk="0" hangingPunct="1">
-              <a:defRPr sz="1800" kern="1200">
+            <a:lvl8pPr marL="3200400" indent="0" algn="ctr" defTabSz="457200" rtl="0" eaLnBrk="1" latinLnBrk="0" hangingPunct="1">
+              <a:spcBef>
+                <a:spcPct val="20000"/>
+              </a:spcBef>
+              <a:spcAft>
+                <a:spcPts val="600"/>
+              </a:spcAft>
+              <a:buClr>
+                <a:schemeClr val="accent1"/>
+              </a:buClr>
+              <a:buSzPct val="80000"/>
+              <a:buFont typeface="Wingdings 3" charset="2"/>
+              <a:buNone/>
+              <a:defRPr sz="120" b="0" i="0" kern="1200">
                 <a:solidFill>
-                  <a:schemeClr val="tx1"/>
+                  <a:schemeClr val="tx1">
+                    <a:tint val="75000"/>
+                  </a:schemeClr>
                 </a:solidFill>
-                <a:latin typeface="+mn-lt"/>
-                <a:ea typeface="+mn-ea"/>
-                <a:cs typeface="+mn-cs"/>
+                <a:latin typeface="+mj-lt"/>
+                <a:ea typeface="+mj-ea"/>
+                <a:cs typeface="+mj-cs"/>
               </a:defRPr>
             </a:lvl8pPr>
-            <a:lvl9pPr marL="3657600" algn="l" defTabSz="457200" rtl="0" eaLnBrk="1" latinLnBrk="0" hangingPunct="1">
-              <a:defRPr sz="1800" kern="1200">
+            <a:lvl9pPr marL="3657600" indent="0" algn="ctr" defTabSz="457200" rtl="0" eaLnBrk="1" latinLnBrk="0" hangingPunct="1">
+              <a:spcBef>
+                <a:spcPct val="20000"/>
+              </a:spcBef>
+              <a:spcAft>
+                <a:spcPts val="600"/>
+              </a:spcAft>
+              <a:buClr>
+                <a:schemeClr val="accent1"/>
+              </a:buClr>
+              <a:buSzPct val="80000"/>
+              <a:buFont typeface="Wingdings 3" charset="2"/>
+              <a:buNone/>
+              <a:defRPr sz="120" b="0" i="0" kern="1200">
                 <a:solidFill>
-                  <a:schemeClr val="tx1"/>
+                  <a:schemeClr val="tx1">
+                    <a:tint val="75000"/>
+                  </a:schemeClr>
                 </a:solidFill>
-                <a:latin typeface="+mn-lt"/>
-                <a:ea typeface="+mn-ea"/>
-                <a:cs typeface="+mn-cs"/>
+                <a:latin typeface="+mj-lt"/>
+                <a:ea typeface="+mj-ea"/>
+                <a:cs typeface="+mj-cs"/>
               </a:defRPr>
             </a:lvl9pPr>
           </a:lstStyle>
@@ -7812,9 +8337,6 @@
             </a:pPr>
             <a:r>
               <a:rPr lang="en-US" cap="none" dirty="0" smtClean="0">
-                <a:solidFill>
-                  <a:schemeClr val="accent1"/>
-                </a:solidFill>
                 <a:latin typeface="Segoe UI" panose="020B0502040204020203" pitchFamily="34" charset="0"/>
                 <a:ea typeface="Segoe UI" panose="020B0502040204020203" pitchFamily="34" charset="0"/>
                 <a:cs typeface="Segoe UI" panose="020B0502040204020203" pitchFamily="34" charset="0"/>
@@ -7829,9 +8351,6 @@
             </a:pPr>
             <a:r>
               <a:rPr lang="en-US" cap="none" dirty="0" smtClean="0">
-                <a:solidFill>
-                  <a:schemeClr val="accent1"/>
-                </a:solidFill>
                 <a:latin typeface="Segoe UI" panose="020B0502040204020203" pitchFamily="34" charset="0"/>
                 <a:ea typeface="Segoe UI" panose="020B0502040204020203" pitchFamily="34" charset="0"/>
                 <a:cs typeface="Segoe UI" panose="020B0502040204020203" pitchFamily="34" charset="0"/>
@@ -7840,9 +8359,6 @@
             </a:r>
             <a:r>
               <a:rPr lang="en-US" cap="none" dirty="0" err="1" smtClean="0">
-                <a:solidFill>
-                  <a:schemeClr val="accent1"/>
-                </a:solidFill>
                 <a:latin typeface="Segoe UI" panose="020B0502040204020203" pitchFamily="34" charset="0"/>
                 <a:ea typeface="Segoe UI" panose="020B0502040204020203" pitchFamily="34" charset="0"/>
                 <a:cs typeface="Segoe UI" panose="020B0502040204020203" pitchFamily="34" charset="0"/>
@@ -7851,9 +8367,6 @@
             </a:r>
             <a:r>
               <a:rPr lang="en-US" cap="none" dirty="0" smtClean="0">
-                <a:solidFill>
-                  <a:schemeClr val="accent1"/>
-                </a:solidFill>
                 <a:latin typeface="Segoe UI" panose="020B0502040204020203" pitchFamily="34" charset="0"/>
                 <a:ea typeface="Segoe UI" panose="020B0502040204020203" pitchFamily="34" charset="0"/>
                 <a:cs typeface="Segoe UI" panose="020B0502040204020203" pitchFamily="34" charset="0"/>
@@ -7862,9 +8375,6 @@
             </a:r>
             <a:r>
               <a:rPr lang="en-US" cap="none" dirty="0" err="1" smtClean="0">
-                <a:solidFill>
-                  <a:schemeClr val="accent1"/>
-                </a:solidFill>
                 <a:latin typeface="Segoe UI" panose="020B0502040204020203" pitchFamily="34" charset="0"/>
                 <a:ea typeface="Segoe UI" panose="020B0502040204020203" pitchFamily="34" charset="0"/>
                 <a:cs typeface="Segoe UI" panose="020B0502040204020203" pitchFamily="34" charset="0"/>
@@ -7872,9 +8382,6 @@
               <a:t>zbray</a:t>
             </a:r>
             <a:endParaRPr lang="en-US" cap="none" dirty="0" smtClean="0">
-              <a:solidFill>
-                <a:schemeClr val="accent1"/>
-              </a:solidFill>
               <a:latin typeface="Segoe UI" panose="020B0502040204020203" pitchFamily="34" charset="0"/>
               <a:ea typeface="Segoe UI" panose="020B0502040204020203" pitchFamily="34" charset="0"/>
               <a:cs typeface="Segoe UI" panose="020B0502040204020203" pitchFamily="34" charset="0"/>
@@ -7887,9 +8394,6 @@
             </a:pPr>
             <a:r>
               <a:rPr lang="en-US" cap="none" dirty="0" smtClean="0">
-                <a:solidFill>
-                  <a:schemeClr val="accent1"/>
-                </a:solidFill>
                 <a:latin typeface="Segoe UI" panose="020B0502040204020203" pitchFamily="34" charset="0"/>
                 <a:ea typeface="Segoe UI" panose="020B0502040204020203" pitchFamily="34" charset="0"/>
                 <a:cs typeface="Segoe UI" panose="020B0502040204020203" pitchFamily="34" charset="0"/>
@@ -7904,9 +8408,6 @@
             </a:pPr>
             <a:r>
               <a:rPr lang="en-US" cap="none" dirty="0" smtClean="0">
-                <a:solidFill>
-                  <a:schemeClr val="accent1"/>
-                </a:solidFill>
                 <a:latin typeface="Segoe UI" panose="020B0502040204020203" pitchFamily="34" charset="0"/>
                 <a:ea typeface="Segoe UI" panose="020B0502040204020203" pitchFamily="34" charset="0"/>
                 <a:cs typeface="Segoe UI" panose="020B0502040204020203" pitchFamily="34" charset="0"/>
@@ -7916,9 +8417,6 @@
           </a:p>
           <a:p>
             <a:endParaRPr lang="en-US" dirty="0">
-              <a:solidFill>
-                <a:schemeClr val="accent1"/>
-              </a:solidFill>
               <a:latin typeface="Segoe UI" panose="020B0502040204020203" pitchFamily="34" charset="0"/>
               <a:ea typeface="Segoe UI" panose="020B0502040204020203" pitchFamily="34" charset="0"/>
               <a:cs typeface="Segoe UI" panose="020B0502040204020203" pitchFamily="34" charset="0"/>
@@ -7946,7 +8444,7 @@
 </p:sld>
 </file>
 
-<file path=ppt/slides/slide2.xml><?xml version="1.0" encoding="utf-8"?>
+<file path=ppt/slides/slide10.xml><?xml version="1.0" encoding="utf-8"?>
 <p:sld xmlns:a="http://schemas.openxmlformats.org/drawingml/2006/main" xmlns:r="http://schemas.openxmlformats.org/officeDocument/2006/relationships" xmlns:p="http://schemas.openxmlformats.org/presentationml/2006/main">
   <p:cSld>
     <p:spTree>
@@ -7965,7 +8463,7 @@
       </p:grpSpPr>
       <p:sp>
         <p:nvSpPr>
-          <p:cNvPr id="4" name="Title 3"/>
+          <p:cNvPr id="2" name="Title 1"/>
           <p:cNvSpPr>
             <a:spLocks noGrp="1"/>
           </p:cNvSpPr>
@@ -7980,7 +8478,7 @@
           <a:p>
             <a:r>
               <a:rPr lang="en-US" dirty="0" smtClean="0"/>
-              <a:t>Where does F# shine?</a:t>
+              <a:t>Define a Resource</a:t>
             </a:r>
             <a:endParaRPr lang="en-US" dirty="0"/>
           </a:p>
@@ -7988,7 +8486,7 @@
       </p:sp>
       <p:sp>
         <p:nvSpPr>
-          <p:cNvPr id="5" name="Content Placeholder 4"/>
+          <p:cNvPr id="4" name="Content Placeholder 2"/>
           <p:cNvSpPr>
             <a:spLocks noGrp="1"/>
           </p:cNvSpPr>
@@ -7998,25 +8496,113 @@
         </p:nvSpPr>
         <p:spPr>
           <a:xfrm>
-            <a:off x="1103312" y="1443790"/>
-            <a:ext cx="8946541" cy="4804610"/>
+            <a:off x="646111" y="1997631"/>
+            <a:ext cx="11000457" cy="3869823"/>
           </a:xfrm>
         </p:spPr>
         <p:txBody>
           <a:bodyPr>
-            <a:noAutofit/>
+            <a:normAutofit/>
           </a:bodyPr>
           <a:lstStyle/>
           <a:p>
-            <a:r>
-              <a:rPr lang="en-US" sz="2800" dirty="0" smtClean="0"/>
-              <a:t>Serve functional Web APIs</a:t>
-            </a:r>
-          </a:p>
-          <a:p>
-            <a:r>
-              <a:rPr lang="en-US" sz="2800" dirty="0" smtClean="0"/>
-              <a:t>Consume HTTP with pattern matching</a:t>
+            <a:pPr marL="0" indent="0">
+              <a:buNone/>
+            </a:pPr>
+            <a:r>
+              <a:rPr lang="en-US" sz="2800" dirty="0" smtClean="0">
+                <a:latin typeface="Consolas"/>
+                <a:cs typeface="Consolas"/>
+              </a:rPr>
+              <a:t>let </a:t>
+            </a:r>
+            <a:r>
+              <a:rPr lang="en-US" sz="2800" dirty="0" err="1">
+                <a:latin typeface="Consolas"/>
+                <a:cs typeface="Consolas"/>
+              </a:rPr>
+              <a:t>helloworld</a:t>
+            </a:r>
+            <a:r>
+              <a:rPr lang="en-US" sz="2800" dirty="0">
+                <a:latin typeface="Consolas"/>
+                <a:cs typeface="Consolas"/>
+              </a:rPr>
+              <a:t> request = </a:t>
+            </a:r>
+            <a:r>
+              <a:rPr lang="en-US" sz="2800" dirty="0" err="1">
+                <a:latin typeface="Consolas"/>
+                <a:cs typeface="Consolas"/>
+              </a:rPr>
+              <a:t>async</a:t>
+            </a:r>
+            <a:r>
+              <a:rPr lang="en-US" sz="2800" dirty="0">
+                <a:latin typeface="Consolas"/>
+                <a:cs typeface="Consolas"/>
+              </a:rPr>
+              <a:t> { … }</a:t>
+            </a:r>
+          </a:p>
+          <a:p>
+            <a:pPr marL="0" indent="0">
+              <a:buNone/>
+            </a:pPr>
+            <a:r>
+              <a:rPr lang="en-US" sz="2800" dirty="0">
+                <a:latin typeface="Consolas"/>
+                <a:cs typeface="Consolas"/>
+              </a:rPr>
+              <a:t>let echo request = </a:t>
+            </a:r>
+            <a:r>
+              <a:rPr lang="en-US" sz="2800" dirty="0" err="1">
+                <a:latin typeface="Consolas"/>
+                <a:cs typeface="Consolas"/>
+              </a:rPr>
+              <a:t>async</a:t>
+            </a:r>
+            <a:r>
+              <a:rPr lang="en-US" sz="2800" dirty="0">
+                <a:latin typeface="Consolas"/>
+                <a:cs typeface="Consolas"/>
+              </a:rPr>
+              <a:t> { … }</a:t>
+            </a:r>
+          </a:p>
+          <a:p>
+            <a:pPr marL="0" indent="0">
+              <a:buNone/>
+            </a:pPr>
+            <a:endParaRPr lang="en-US" sz="2800" dirty="0">
+              <a:latin typeface="Monaco" pitchFamily="2" charset="0"/>
+            </a:endParaRPr>
+          </a:p>
+          <a:p>
+            <a:pPr marL="0" indent="0">
+              <a:buNone/>
+            </a:pPr>
+            <a:r>
+              <a:rPr lang="en-US" sz="2800" dirty="0">
+                <a:latin typeface="Consolas"/>
+                <a:cs typeface="Consolas"/>
+              </a:rPr>
+              <a:t>let resource = route “/” (get </a:t>
+            </a:r>
+            <a:r>
+              <a:rPr lang="en-US" sz="2800" dirty="0" err="1">
+                <a:latin typeface="Consolas"/>
+                <a:cs typeface="Consolas"/>
+              </a:rPr>
+              <a:t>helloworld</a:t>
+            </a:r>
+            <a:r>
+              <a:rPr lang="en-US" sz="2800" dirty="0">
+                <a:latin typeface="Consolas"/>
+                <a:cs typeface="Consolas"/>
+              </a:rPr>
+              <a:t> &lt;|&gt; post echo)</a:t>
             </a:r>
           </a:p>
         </p:txBody>
@@ -8024,13 +8610,21 @@
     </p:spTree>
     <p:extLst>
       <p:ext uri="{BB962C8B-B14F-4D97-AF65-F5344CB8AC3E}">
-        <p14:creationId xmlns:p14="http://schemas.microsoft.com/office/powerpoint/2010/main" val="1647281745"/>
+        <p14:creationId xmlns:p14="http://schemas.microsoft.com/office/powerpoint/2010/main" val="2148083016"/>
       </p:ext>
     </p:extLst>
   </p:cSld>
   <p:clrMapOvr>
     <a:masterClrMapping/>
   </p:clrMapOvr>
+  <mc:AlternateContent xmlns:mc="http://schemas.openxmlformats.org/markup-compatibility/2006">
+    <mc:Choice xmlns:p14="http://schemas.microsoft.com/office/powerpoint/2010/main" Requires="p14">
+      <p:transition spd="slow" p14:dur="2000"/>
+    </mc:Choice>
+    <mc:Fallback>
+      <p:transition spd="slow"/>
+    </mc:Fallback>
+  </mc:AlternateContent>
   <p:timing>
     <p:tnLst>
       <p:par>
@@ -8041,7 +8635,7 @@
 </p:sld>
 </file>
 
-<file path=ppt/slides/slide3.xml><?xml version="1.0" encoding="utf-8"?>
+<file path=ppt/slides/slide11.xml><?xml version="1.0" encoding="utf-8"?>
 <p:sld xmlns:a="http://schemas.openxmlformats.org/drawingml/2006/main" xmlns:r="http://schemas.openxmlformats.org/officeDocument/2006/relationships" xmlns:p="http://schemas.openxmlformats.org/presentationml/2006/main">
   <p:cSld>
     <p:spTree>
@@ -8060,7 +8654,7 @@
       </p:grpSpPr>
       <p:sp>
         <p:nvSpPr>
-          <p:cNvPr id="4" name="Title 3"/>
+          <p:cNvPr id="2" name="Title 1"/>
           <p:cNvSpPr>
             <a:spLocks noGrp="1"/>
           </p:cNvSpPr>
@@ -8075,7 +8669,7 @@
           <a:p>
             <a:r>
               <a:rPr lang="en-US" dirty="0" smtClean="0"/>
-              <a:t>Refresher</a:t>
+              <a:t>Define an Application</a:t>
             </a:r>
             <a:endParaRPr lang="en-US" dirty="0"/>
           </a:p>
@@ -8083,7 +8677,7 @@
       </p:sp>
       <p:sp>
         <p:nvSpPr>
-          <p:cNvPr id="5" name="Content Placeholder 4"/>
+          <p:cNvPr id="4" name="Content Placeholder 2"/>
           <p:cNvSpPr>
             <a:spLocks noGrp="1"/>
           </p:cNvSpPr>
@@ -8093,8 +8687,8 @@
         </p:nvSpPr>
         <p:spPr>
           <a:xfrm>
-            <a:off x="1103312" y="1443790"/>
-            <a:ext cx="8946541" cy="4804610"/>
+            <a:off x="646111" y="2119259"/>
+            <a:ext cx="10856078" cy="3603812"/>
           </a:xfrm>
         </p:spPr>
         <p:txBody>
@@ -8103,225 +8697,136 @@
           </a:bodyPr>
           <a:lstStyle/>
           <a:p>
-            <a:r>
-              <a:rPr lang="en-US" sz="2800" dirty="0" smtClean="0"/>
-              <a:t>Request/Response Lines</a:t>
-            </a:r>
-          </a:p>
-          <a:p>
-            <a:pPr lvl="1"/>
-            <a:r>
-              <a:rPr lang="en-US" sz="2800" dirty="0" smtClean="0"/>
-              <a:t>Methods, URIs, Status Codes</a:t>
-            </a:r>
-          </a:p>
-          <a:p>
-            <a:r>
-              <a:rPr lang="en-US" sz="2800" dirty="0" smtClean="0"/>
-              <a:t>Headers</a:t>
-            </a:r>
-          </a:p>
-          <a:p>
-            <a:pPr lvl="1"/>
-            <a:r>
-              <a:rPr lang="en-US" sz="2800" dirty="0" smtClean="0"/>
-              <a:t>General, Request, Response, Content</a:t>
-            </a:r>
-          </a:p>
-          <a:p>
-            <a:r>
-              <a:rPr lang="en-US" sz="2800" dirty="0" smtClean="0"/>
-              <a:t>Resources</a:t>
-            </a:r>
-          </a:p>
-          <a:p>
-            <a:r>
-              <a:rPr lang="en-US" sz="2800" dirty="0" smtClean="0"/>
-              <a:t>Representations</a:t>
-            </a:r>
-          </a:p>
-          <a:p>
-            <a:r>
-              <a:rPr lang="en-US" sz="2800" dirty="0" smtClean="0"/>
-              <a:t>Hypermedia</a:t>
-            </a:r>
-          </a:p>
-          <a:p>
-            <a:r>
-              <a:rPr lang="en-US" sz="2800" dirty="0" smtClean="0"/>
-              <a:t>Code on Demand</a:t>
-            </a:r>
-            <a:endParaRPr lang="en-US" sz="2800" dirty="0"/>
+            <a:pPr marL="0" indent="0">
+              <a:buNone/>
+            </a:pPr>
+            <a:r>
+              <a:rPr lang="en-US" sz="2800" dirty="0" smtClean="0">
+                <a:latin typeface="Consolas"/>
+                <a:cs typeface="Consolas"/>
+              </a:rPr>
+              <a:t>let </a:t>
+            </a:r>
+            <a:r>
+              <a:rPr lang="en-US" sz="2800" dirty="0" err="1">
+                <a:latin typeface="Consolas"/>
+                <a:cs typeface="Consolas"/>
+              </a:rPr>
+              <a:t>todoListResource</a:t>
+            </a:r>
+            <a:r>
+              <a:rPr lang="en-US" sz="2800" dirty="0">
+                <a:latin typeface="Consolas"/>
+                <a:cs typeface="Consolas"/>
+              </a:rPr>
+              <a:t> = route “/” (get </a:t>
+            </a:r>
+            <a:r>
+              <a:rPr lang="en-US" sz="2800" dirty="0" err="1">
+                <a:latin typeface="Consolas"/>
+                <a:cs typeface="Consolas"/>
+              </a:rPr>
+              <a:t>todoList</a:t>
+            </a:r>
+            <a:r>
+              <a:rPr lang="en-US" sz="2800" dirty="0">
+                <a:latin typeface="Consolas"/>
+                <a:cs typeface="Consolas"/>
+              </a:rPr>
+              <a:t> &lt;|&gt; …)</a:t>
+            </a:r>
+          </a:p>
+          <a:p>
+            <a:pPr marL="0" indent="0">
+              <a:buNone/>
+            </a:pPr>
+            <a:r>
+              <a:rPr lang="en-US" sz="2800" dirty="0">
+                <a:latin typeface="Consolas"/>
+                <a:cs typeface="Consolas"/>
+              </a:rPr>
+              <a:t>let </a:t>
+            </a:r>
+            <a:r>
+              <a:rPr lang="en-US" sz="2800" dirty="0" err="1">
+                <a:latin typeface="Consolas"/>
+                <a:cs typeface="Consolas"/>
+              </a:rPr>
+              <a:t>todoItemResource</a:t>
+            </a:r>
+            <a:r>
+              <a:rPr lang="en-US" sz="2800" dirty="0">
+                <a:latin typeface="Consolas"/>
+                <a:cs typeface="Consolas"/>
+              </a:rPr>
+              <a:t> = route “/item/{1}” (put …)</a:t>
+            </a:r>
+          </a:p>
+          <a:p>
+            <a:pPr marL="0" indent="0">
+              <a:buNone/>
+            </a:pPr>
+            <a:endParaRPr lang="en-US" sz="2800" dirty="0">
+              <a:latin typeface="Monaco" pitchFamily="2" charset="0"/>
+            </a:endParaRPr>
+          </a:p>
+          <a:p>
+            <a:pPr marL="0" indent="0">
+              <a:buNone/>
+            </a:pPr>
+            <a:r>
+              <a:rPr lang="en-US" sz="2800" dirty="0">
+                <a:latin typeface="Consolas"/>
+                <a:cs typeface="Consolas"/>
+              </a:rPr>
+              <a:t>let app = merge [ </a:t>
+            </a:r>
+            <a:r>
+              <a:rPr lang="en-US" sz="2800" dirty="0" err="1">
+                <a:latin typeface="Consolas"/>
+                <a:cs typeface="Consolas"/>
+              </a:rPr>
+              <a:t>todoListResource</a:t>
+            </a:r>
+            <a:r>
+              <a:rPr lang="en-US" sz="2800" dirty="0">
+                <a:latin typeface="Consolas"/>
+                <a:cs typeface="Consolas"/>
+              </a:rPr>
+              <a:t>; </a:t>
+            </a:r>
+            <a:r>
+              <a:rPr lang="en-US" sz="2800" dirty="0" err="1">
+                <a:latin typeface="Consolas"/>
+                <a:cs typeface="Consolas"/>
+              </a:rPr>
+              <a:t>todoItemResource</a:t>
+            </a:r>
+            <a:r>
+              <a:rPr lang="en-US" sz="2800" dirty="0">
+                <a:latin typeface="Consolas"/>
+                <a:cs typeface="Consolas"/>
+              </a:rPr>
+              <a:t> ]</a:t>
+            </a:r>
           </a:p>
         </p:txBody>
       </p:sp>
     </p:spTree>
     <p:extLst>
       <p:ext uri="{BB962C8B-B14F-4D97-AF65-F5344CB8AC3E}">
-        <p14:creationId xmlns:p14="http://schemas.microsoft.com/office/powerpoint/2010/main" val="1086183461"/>
+        <p14:creationId xmlns:p14="http://schemas.microsoft.com/office/powerpoint/2010/main" val="357962463"/>
       </p:ext>
     </p:extLst>
   </p:cSld>
   <p:clrMapOvr>
     <a:masterClrMapping/>
   </p:clrMapOvr>
-  <p:timing>
-    <p:tnLst>
-      <p:par>
-        <p:cTn id="1" dur="indefinite" restart="never" nodeType="tmRoot"/>
-      </p:par>
-    </p:tnLst>
-  </p:timing>
-</p:sld>
-</file>
-
-<file path=ppt/slides/slide4.xml><?xml version="1.0" encoding="utf-8"?>
-<p:sld xmlns:a="http://schemas.openxmlformats.org/drawingml/2006/main" xmlns:r="http://schemas.openxmlformats.org/officeDocument/2006/relationships" xmlns:p="http://schemas.openxmlformats.org/presentationml/2006/main">
-  <p:cSld>
-    <p:spTree>
-      <p:nvGrpSpPr>
-        <p:cNvPr id="1" name=""/>
-        <p:cNvGrpSpPr/>
-        <p:nvPr/>
-      </p:nvGrpSpPr>
-      <p:grpSpPr>
-        <a:xfrm>
-          <a:off x="0" y="0"/>
-          <a:ext cx="0" cy="0"/>
-          <a:chOff x="0" y="0"/>
-          <a:chExt cx="0" cy="0"/>
-        </a:xfrm>
-      </p:grpSpPr>
-      <p:sp>
-        <p:nvSpPr>
-          <p:cNvPr id="2" name="Title 1"/>
-          <p:cNvSpPr>
-            <a:spLocks noGrp="1"/>
-          </p:cNvSpPr>
-          <p:nvPr>
-            <p:ph type="title"/>
-          </p:nvPr>
-        </p:nvSpPr>
-        <p:spPr/>
-        <p:txBody>
-          <a:bodyPr>
-            <a:normAutofit/>
-          </a:bodyPr>
-          <a:lstStyle/>
-          <a:p>
-            <a:r>
-              <a:rPr lang="en-US" dirty="0" smtClean="0"/>
-              <a:t>Simplest HTTP Application</a:t>
-            </a:r>
-            <a:endParaRPr lang="en-US" dirty="0"/>
-          </a:p>
-        </p:txBody>
-      </p:sp>
-      <p:sp>
-        <p:nvSpPr>
-          <p:cNvPr id="3" name="Content Placeholder 2"/>
-          <p:cNvSpPr>
-            <a:spLocks noGrp="1"/>
-          </p:cNvSpPr>
-          <p:nvPr>
-            <p:ph idx="1"/>
-          </p:nvPr>
-        </p:nvSpPr>
-        <p:spPr>
-          <a:xfrm>
-            <a:off x="481263" y="2052918"/>
-            <a:ext cx="11165305" cy="4195481"/>
-          </a:xfrm>
-        </p:spPr>
-        <p:txBody>
-          <a:bodyPr>
-            <a:normAutofit/>
-          </a:bodyPr>
-          <a:lstStyle/>
-          <a:p>
-            <a:pPr marL="0" indent="0" algn="ctr">
-              <a:buNone/>
-            </a:pPr>
-            <a:r>
-              <a:rPr lang="en-US" sz="3200" dirty="0" err="1" smtClean="0">
-                <a:latin typeface="Consolas"/>
-                <a:cs typeface="Consolas"/>
-              </a:rPr>
-              <a:t>HttpRequestMessage</a:t>
-            </a:r>
-            <a:r>
-              <a:rPr lang="en-US" sz="3200" dirty="0" smtClean="0">
-                <a:latin typeface="Consolas"/>
-                <a:cs typeface="Consolas"/>
-              </a:rPr>
-              <a:t> </a:t>
-            </a:r>
-            <a:r>
-              <a:rPr lang="en-US" sz="3200" dirty="0">
-                <a:latin typeface="Consolas"/>
-                <a:cs typeface="Consolas"/>
-              </a:rPr>
-              <a:t>-&gt; </a:t>
-            </a:r>
-            <a:r>
-              <a:rPr lang="en-US" sz="3200" strike="sngStrike" dirty="0">
-                <a:latin typeface="Consolas"/>
-                <a:cs typeface="Consolas"/>
-              </a:rPr>
-              <a:t>HttpResponseMessage</a:t>
-            </a:r>
-          </a:p>
-          <a:p>
-            <a:pPr marL="0" indent="0" algn="ctr">
-              <a:buNone/>
-            </a:pPr>
-            <a:endParaRPr lang="en-US" sz="3200" strike="sngStrike" dirty="0">
-              <a:latin typeface="Monaco" pitchFamily="2" charset="0"/>
-            </a:endParaRPr>
-          </a:p>
-          <a:p>
-            <a:pPr marL="0" indent="0" algn="ctr">
-              <a:buNone/>
-            </a:pPr>
-            <a:r>
-              <a:rPr lang="en-US" sz="3200" dirty="0">
-                <a:latin typeface="Consolas"/>
-                <a:cs typeface="Consolas"/>
-              </a:rPr>
-              <a:t>HttpRequestMessage -&gt; </a:t>
-            </a:r>
-            <a:r>
-              <a:rPr lang="en-US" sz="3200" dirty="0" err="1">
-                <a:latin typeface="Consolas"/>
-                <a:cs typeface="Consolas"/>
-              </a:rPr>
-              <a:t>Async</a:t>
-            </a:r>
-            <a:r>
-              <a:rPr lang="en-US" sz="3200" dirty="0">
-                <a:latin typeface="Consolas"/>
-                <a:cs typeface="Consolas"/>
-              </a:rPr>
-              <a:t>&lt;HttpResponseMessage&gt;</a:t>
-            </a:r>
-          </a:p>
-        </p:txBody>
-      </p:sp>
-    </p:spTree>
-    <p:extLst>
-      <p:ext uri="{BB962C8B-B14F-4D97-AF65-F5344CB8AC3E}">
-        <p14:creationId xmlns:p14="http://schemas.microsoft.com/office/powerpoint/2010/main" val="540654935"/>
-      </p:ext>
-    </p:extLst>
-  </p:cSld>
-  <p:clrMapOvr>
-    <a:masterClrMapping/>
-  </p:clrMapOvr>
-  <mc:AlternateContent xmlns:mc="http://schemas.openxmlformats.org/markup-compatibility/2006" xmlns:p14="http://schemas.microsoft.com/office/powerpoint/2010/main">
-    <mc:Choice Requires="p14">
+  <mc:AlternateContent xmlns:mc="http://schemas.openxmlformats.org/markup-compatibility/2006">
+    <mc:Choice xmlns:p14="http://schemas.microsoft.com/office/powerpoint/2010/main" Requires="p14">
       <p:transition spd="slow" p14:dur="2000"/>
     </mc:Choice>
-    <mc:Fallback xmlns="">
+    <mc:Fallback>
       <p:transition spd="slow"/>
     </mc:Fallback>
   </mc:AlternateContent>
@@ -8335,709 +8840,7 @@
 </p:sld>
 </file>
 
-<file path=ppt/slides/slide5.xml><?xml version="1.0" encoding="utf-8"?>
-<p:sld xmlns:a="http://schemas.openxmlformats.org/drawingml/2006/main" xmlns:r="http://schemas.openxmlformats.org/officeDocument/2006/relationships" xmlns:p="http://schemas.openxmlformats.org/presentationml/2006/main">
-  <p:cSld>
-    <p:spTree>
-      <p:nvGrpSpPr>
-        <p:cNvPr id="1" name=""/>
-        <p:cNvGrpSpPr/>
-        <p:nvPr/>
-      </p:nvGrpSpPr>
-      <p:grpSpPr>
-        <a:xfrm>
-          <a:off x="0" y="0"/>
-          <a:ext cx="0" cy="0"/>
-          <a:chOff x="0" y="0"/>
-          <a:chExt cx="0" cy="0"/>
-        </a:xfrm>
-      </p:grpSpPr>
-      <p:sp>
-        <p:nvSpPr>
-          <p:cNvPr id="2" name="Title 1"/>
-          <p:cNvSpPr>
-            <a:spLocks noGrp="1"/>
-          </p:cNvSpPr>
-          <p:nvPr>
-            <p:ph type="title"/>
-          </p:nvPr>
-        </p:nvSpPr>
-        <p:spPr/>
-        <p:txBody>
-          <a:bodyPr/>
-          <a:lstStyle/>
-          <a:p>
-            <a:r>
-              <a:rPr lang="en-US" dirty="0" smtClean="0"/>
-              <a:t>Define a Method Handler</a:t>
-            </a:r>
-            <a:endParaRPr lang="en-US" dirty="0"/>
-          </a:p>
-        </p:txBody>
-      </p:sp>
-      <p:sp>
-        <p:nvSpPr>
-          <p:cNvPr id="3" name="Content Placeholder 2"/>
-          <p:cNvSpPr>
-            <a:spLocks noGrp="1"/>
-          </p:cNvSpPr>
-          <p:nvPr>
-            <p:ph idx="1"/>
-          </p:nvPr>
-        </p:nvSpPr>
-        <p:spPr>
-          <a:xfrm>
-            <a:off x="445168" y="1696452"/>
-            <a:ext cx="11273590" cy="4551947"/>
-          </a:xfrm>
-        </p:spPr>
-        <p:txBody>
-          <a:bodyPr>
-            <a:noAutofit/>
-          </a:bodyPr>
-          <a:lstStyle/>
-          <a:p>
-            <a:pPr marL="0" indent="0">
-              <a:buNone/>
-            </a:pPr>
-            <a:r>
-              <a:rPr lang="en-US" sz="2800" dirty="0" smtClean="0">
-                <a:latin typeface="Consolas"/>
-                <a:cs typeface="Consolas"/>
-              </a:rPr>
-              <a:t>// </a:t>
-            </a:r>
-            <a:r>
-              <a:rPr lang="en-US" sz="2800" dirty="0">
-                <a:latin typeface="Consolas"/>
-                <a:cs typeface="Consolas"/>
-              </a:rPr>
-              <a:t>handler</a:t>
-            </a:r>
-          </a:p>
-          <a:p>
-            <a:pPr marL="0" indent="0">
-              <a:buNone/>
-            </a:pPr>
-            <a:r>
-              <a:rPr lang="en-US" sz="2800" dirty="0">
-                <a:latin typeface="Consolas"/>
-                <a:cs typeface="Consolas"/>
-              </a:rPr>
-              <a:t>let echo request = </a:t>
-            </a:r>
-            <a:r>
-              <a:rPr lang="en-US" sz="2800" dirty="0" err="1">
-                <a:latin typeface="Consolas"/>
-                <a:cs typeface="Consolas"/>
-              </a:rPr>
-              <a:t>async</a:t>
-            </a:r>
-            <a:r>
-              <a:rPr lang="en-US" sz="2800" dirty="0">
-                <a:latin typeface="Consolas"/>
-                <a:cs typeface="Consolas"/>
-              </a:rPr>
-              <a:t> {</a:t>
-            </a:r>
-          </a:p>
-          <a:p>
-            <a:pPr marL="0" indent="0">
-              <a:buNone/>
-            </a:pPr>
-            <a:r>
-              <a:rPr lang="en-US" sz="2800" dirty="0">
-                <a:latin typeface="Monaco" pitchFamily="2" charset="0"/>
-              </a:rPr>
-              <a:t>  </a:t>
-            </a:r>
-            <a:r>
-              <a:rPr lang="en-US" sz="2800" dirty="0" smtClean="0">
-                <a:latin typeface="Monaco" pitchFamily="2" charset="0"/>
-              </a:rPr>
-              <a:t>  </a:t>
-            </a:r>
-            <a:r>
-              <a:rPr lang="en-US" sz="2800" dirty="0" smtClean="0">
-                <a:latin typeface="Consolas"/>
-                <a:cs typeface="Consolas"/>
-              </a:rPr>
-              <a:t>let</a:t>
-            </a:r>
-            <a:r>
-              <a:rPr lang="en-US" sz="2800" dirty="0">
-                <a:latin typeface="Consolas"/>
-                <a:cs typeface="Consolas"/>
-              </a:rPr>
-              <a:t>! body = </a:t>
-            </a:r>
-            <a:r>
-              <a:rPr lang="en-US" sz="2800" dirty="0" err="1">
-                <a:latin typeface="Consolas"/>
-                <a:cs typeface="Consolas"/>
-              </a:rPr>
-              <a:t>request.Content.AsyncReadAsString</a:t>
-            </a:r>
-            <a:r>
-              <a:rPr lang="en-US" sz="2800" dirty="0">
-                <a:latin typeface="Consolas"/>
-                <a:cs typeface="Consolas"/>
-              </a:rPr>
-              <a:t>()</a:t>
-            </a:r>
-          </a:p>
-          <a:p>
-            <a:pPr marL="0" indent="0">
-              <a:buNone/>
-            </a:pPr>
-            <a:r>
-              <a:rPr lang="en-US" sz="2800" dirty="0">
-                <a:latin typeface="Monaco" pitchFamily="2" charset="0"/>
-              </a:rPr>
-              <a:t>  </a:t>
-            </a:r>
-            <a:r>
-              <a:rPr lang="en-US" sz="2800" dirty="0" smtClean="0">
-                <a:latin typeface="Monaco" pitchFamily="2" charset="0"/>
-              </a:rPr>
-              <a:t>  </a:t>
-            </a:r>
-            <a:r>
-              <a:rPr lang="en-US" sz="2800" dirty="0" smtClean="0">
-                <a:latin typeface="Consolas"/>
-                <a:cs typeface="Consolas"/>
-              </a:rPr>
-              <a:t>return </a:t>
-            </a:r>
-            <a:r>
-              <a:rPr lang="en-US" sz="2800" dirty="0" err="1" smtClean="0">
-                <a:latin typeface="Consolas"/>
-                <a:cs typeface="Consolas"/>
-              </a:rPr>
-              <a:t>request.CreateResponse</a:t>
-            </a:r>
-            <a:r>
-              <a:rPr lang="en-US" sz="2800" dirty="0" smtClean="0">
-                <a:latin typeface="Consolas"/>
-                <a:cs typeface="Consolas"/>
-              </a:rPr>
-              <a:t>(</a:t>
-            </a:r>
-            <a:r>
-              <a:rPr lang="en-US" sz="2800" dirty="0" err="1" smtClean="0">
-                <a:latin typeface="Consolas"/>
-                <a:cs typeface="Consolas"/>
-              </a:rPr>
-              <a:t>HttpStatusCode.OK</a:t>
-            </a:r>
-            <a:r>
-              <a:rPr lang="en-US" sz="2800" dirty="0" smtClean="0">
-                <a:latin typeface="Consolas"/>
-                <a:cs typeface="Consolas"/>
-              </a:rPr>
-              <a:t>, body)</a:t>
-            </a:r>
-            <a:endParaRPr lang="en-US" sz="2800" dirty="0">
-              <a:latin typeface="Consolas"/>
-              <a:cs typeface="Consolas"/>
-            </a:endParaRPr>
-          </a:p>
-          <a:p>
-            <a:pPr marL="0" indent="0">
-              <a:buNone/>
-            </a:pPr>
-            <a:r>
-              <a:rPr lang="en-US" sz="2800" dirty="0" smtClean="0">
-                <a:latin typeface="Consolas"/>
-                <a:cs typeface="Consolas"/>
-              </a:rPr>
-              <a:t>}</a:t>
-            </a:r>
-            <a:endParaRPr lang="en-US" sz="2800" dirty="0">
-              <a:latin typeface="Monaco" pitchFamily="2" charset="0"/>
-            </a:endParaRPr>
-          </a:p>
-          <a:p>
-            <a:pPr marL="0" indent="0">
-              <a:buNone/>
-            </a:pPr>
-            <a:r>
-              <a:rPr lang="en-US" sz="2800" dirty="0">
-                <a:latin typeface="Consolas"/>
-                <a:cs typeface="Consolas"/>
-              </a:rPr>
-              <a:t>// method handler</a:t>
-            </a:r>
-          </a:p>
-          <a:p>
-            <a:pPr marL="0" indent="0">
-              <a:buNone/>
-            </a:pPr>
-            <a:r>
-              <a:rPr lang="en-US" sz="2800" dirty="0">
-                <a:latin typeface="Consolas"/>
-                <a:cs typeface="Consolas"/>
-              </a:rPr>
-              <a:t>get echo</a:t>
-            </a:r>
-          </a:p>
-        </p:txBody>
-      </p:sp>
-    </p:spTree>
-    <p:extLst>
-      <p:ext uri="{BB962C8B-B14F-4D97-AF65-F5344CB8AC3E}">
-        <p14:creationId xmlns:p14="http://schemas.microsoft.com/office/powerpoint/2010/main" val="3462925926"/>
-      </p:ext>
-    </p:extLst>
-  </p:cSld>
-  <p:clrMapOvr>
-    <a:masterClrMapping/>
-  </p:clrMapOvr>
-  <mc:AlternateContent xmlns:mc="http://schemas.openxmlformats.org/markup-compatibility/2006" xmlns:p14="http://schemas.microsoft.com/office/powerpoint/2010/main">
-    <mc:Choice Requires="p14">
-      <p:transition spd="slow" p14:dur="2000"/>
-    </mc:Choice>
-    <mc:Fallback xmlns="">
-      <p:transition spd="slow"/>
-    </mc:Fallback>
-  </mc:AlternateContent>
-  <p:timing>
-    <p:tnLst>
-      <p:par>
-        <p:cTn id="1" dur="indefinite" restart="never" nodeType="tmRoot"/>
-      </p:par>
-    </p:tnLst>
-  </p:timing>
-</p:sld>
-</file>
-
-<file path=ppt/slides/slide6.xml><?xml version="1.0" encoding="utf-8"?>
-<p:sld xmlns:a="http://schemas.openxmlformats.org/drawingml/2006/main" xmlns:r="http://schemas.openxmlformats.org/officeDocument/2006/relationships" xmlns:p="http://schemas.openxmlformats.org/presentationml/2006/main">
-  <p:cSld>
-    <p:spTree>
-      <p:nvGrpSpPr>
-        <p:cNvPr id="1" name=""/>
-        <p:cNvGrpSpPr/>
-        <p:nvPr/>
-      </p:nvGrpSpPr>
-      <p:grpSpPr>
-        <a:xfrm>
-          <a:off x="0" y="0"/>
-          <a:ext cx="0" cy="0"/>
-          <a:chOff x="0" y="0"/>
-          <a:chExt cx="0" cy="0"/>
-        </a:xfrm>
-      </p:grpSpPr>
-      <p:sp>
-        <p:nvSpPr>
-          <p:cNvPr id="2" name="Title 1"/>
-          <p:cNvSpPr>
-            <a:spLocks noGrp="1"/>
-          </p:cNvSpPr>
-          <p:nvPr>
-            <p:ph type="title"/>
-          </p:nvPr>
-        </p:nvSpPr>
-        <p:spPr/>
-        <p:txBody>
-          <a:bodyPr/>
-          <a:lstStyle/>
-          <a:p>
-            <a:r>
-              <a:rPr lang="en-US" dirty="0" smtClean="0"/>
-              <a:t>Define a Resource</a:t>
-            </a:r>
-            <a:endParaRPr lang="en-US" dirty="0"/>
-          </a:p>
-        </p:txBody>
-      </p:sp>
-      <p:sp>
-        <p:nvSpPr>
-          <p:cNvPr id="4" name="Content Placeholder 2"/>
-          <p:cNvSpPr>
-            <a:spLocks noGrp="1"/>
-          </p:cNvSpPr>
-          <p:nvPr>
-            <p:ph idx="1"/>
-          </p:nvPr>
-        </p:nvSpPr>
-        <p:spPr>
-          <a:xfrm>
-            <a:off x="646111" y="1997631"/>
-            <a:ext cx="11000457" cy="3869823"/>
-          </a:xfrm>
-        </p:spPr>
-        <p:txBody>
-          <a:bodyPr>
-            <a:normAutofit/>
-          </a:bodyPr>
-          <a:lstStyle/>
-          <a:p>
-            <a:pPr marL="0" indent="0">
-              <a:buNone/>
-            </a:pPr>
-            <a:r>
-              <a:rPr lang="en-US" sz="2800" dirty="0" smtClean="0">
-                <a:latin typeface="Consolas"/>
-                <a:cs typeface="Consolas"/>
-              </a:rPr>
-              <a:t>let </a:t>
-            </a:r>
-            <a:r>
-              <a:rPr lang="en-US" sz="2800" dirty="0" err="1">
-                <a:latin typeface="Consolas"/>
-                <a:cs typeface="Consolas"/>
-              </a:rPr>
-              <a:t>helloworld</a:t>
-            </a:r>
-            <a:r>
-              <a:rPr lang="en-US" sz="2800" dirty="0">
-                <a:latin typeface="Consolas"/>
-                <a:cs typeface="Consolas"/>
-              </a:rPr>
-              <a:t> request = </a:t>
-            </a:r>
-            <a:r>
-              <a:rPr lang="en-US" sz="2800" dirty="0" err="1">
-                <a:latin typeface="Consolas"/>
-                <a:cs typeface="Consolas"/>
-              </a:rPr>
-              <a:t>async</a:t>
-            </a:r>
-            <a:r>
-              <a:rPr lang="en-US" sz="2800" dirty="0">
-                <a:latin typeface="Consolas"/>
-                <a:cs typeface="Consolas"/>
-              </a:rPr>
-              <a:t> { … }</a:t>
-            </a:r>
-          </a:p>
-          <a:p>
-            <a:pPr marL="0" indent="0">
-              <a:buNone/>
-            </a:pPr>
-            <a:r>
-              <a:rPr lang="en-US" sz="2800" dirty="0">
-                <a:latin typeface="Consolas"/>
-                <a:cs typeface="Consolas"/>
-              </a:rPr>
-              <a:t>let echo request = </a:t>
-            </a:r>
-            <a:r>
-              <a:rPr lang="en-US" sz="2800" dirty="0" err="1">
-                <a:latin typeface="Consolas"/>
-                <a:cs typeface="Consolas"/>
-              </a:rPr>
-              <a:t>async</a:t>
-            </a:r>
-            <a:r>
-              <a:rPr lang="en-US" sz="2800" dirty="0">
-                <a:latin typeface="Consolas"/>
-                <a:cs typeface="Consolas"/>
-              </a:rPr>
-              <a:t> { … }</a:t>
-            </a:r>
-          </a:p>
-          <a:p>
-            <a:pPr marL="0" indent="0">
-              <a:buNone/>
-            </a:pPr>
-            <a:endParaRPr lang="en-US" sz="2800" dirty="0">
-              <a:latin typeface="Monaco" pitchFamily="2" charset="0"/>
-            </a:endParaRPr>
-          </a:p>
-          <a:p>
-            <a:pPr marL="0" indent="0">
-              <a:buNone/>
-            </a:pPr>
-            <a:r>
-              <a:rPr lang="en-US" sz="2800" dirty="0">
-                <a:latin typeface="Consolas"/>
-                <a:cs typeface="Consolas"/>
-              </a:rPr>
-              <a:t>let resource = route “/” (get </a:t>
-            </a:r>
-            <a:r>
-              <a:rPr lang="en-US" sz="2800" dirty="0" err="1">
-                <a:latin typeface="Consolas"/>
-                <a:cs typeface="Consolas"/>
-              </a:rPr>
-              <a:t>helloworld</a:t>
-            </a:r>
-            <a:r>
-              <a:rPr lang="en-US" sz="2800" dirty="0">
-                <a:latin typeface="Consolas"/>
-                <a:cs typeface="Consolas"/>
-              </a:rPr>
-              <a:t> &lt;|&gt; post echo)</a:t>
-            </a:r>
-          </a:p>
-        </p:txBody>
-      </p:sp>
-    </p:spTree>
-    <p:extLst>
-      <p:ext uri="{BB962C8B-B14F-4D97-AF65-F5344CB8AC3E}">
-        <p14:creationId xmlns:p14="http://schemas.microsoft.com/office/powerpoint/2010/main" val="2148083016"/>
-      </p:ext>
-    </p:extLst>
-  </p:cSld>
-  <p:clrMapOvr>
-    <a:masterClrMapping/>
-  </p:clrMapOvr>
-  <mc:AlternateContent xmlns:mc="http://schemas.openxmlformats.org/markup-compatibility/2006" xmlns:p14="http://schemas.microsoft.com/office/powerpoint/2010/main">
-    <mc:Choice Requires="p14">
-      <p:transition spd="slow" p14:dur="2000"/>
-    </mc:Choice>
-    <mc:Fallback xmlns="">
-      <p:transition spd="slow"/>
-    </mc:Fallback>
-  </mc:AlternateContent>
-  <p:timing>
-    <p:tnLst>
-      <p:par>
-        <p:cTn id="1" dur="indefinite" restart="never" nodeType="tmRoot"/>
-      </p:par>
-    </p:tnLst>
-  </p:timing>
-</p:sld>
-</file>
-
-<file path=ppt/slides/slide7.xml><?xml version="1.0" encoding="utf-8"?>
-<p:sld xmlns:a="http://schemas.openxmlformats.org/drawingml/2006/main" xmlns:r="http://schemas.openxmlformats.org/officeDocument/2006/relationships" xmlns:p="http://schemas.openxmlformats.org/presentationml/2006/main">
-  <p:cSld>
-    <p:spTree>
-      <p:nvGrpSpPr>
-        <p:cNvPr id="1" name=""/>
-        <p:cNvGrpSpPr/>
-        <p:nvPr/>
-      </p:nvGrpSpPr>
-      <p:grpSpPr>
-        <a:xfrm>
-          <a:off x="0" y="0"/>
-          <a:ext cx="0" cy="0"/>
-          <a:chOff x="0" y="0"/>
-          <a:chExt cx="0" cy="0"/>
-        </a:xfrm>
-      </p:grpSpPr>
-      <p:sp>
-        <p:nvSpPr>
-          <p:cNvPr id="2" name="Title 1"/>
-          <p:cNvSpPr>
-            <a:spLocks noGrp="1"/>
-          </p:cNvSpPr>
-          <p:nvPr>
-            <p:ph type="title"/>
-          </p:nvPr>
-        </p:nvSpPr>
-        <p:spPr/>
-        <p:txBody>
-          <a:bodyPr/>
-          <a:lstStyle/>
-          <a:p>
-            <a:r>
-              <a:rPr lang="en-US" dirty="0" smtClean="0"/>
-              <a:t>Register an Application</a:t>
-            </a:r>
-            <a:endParaRPr lang="en-US" dirty="0"/>
-          </a:p>
-        </p:txBody>
-      </p:sp>
-      <p:sp>
-        <p:nvSpPr>
-          <p:cNvPr id="4" name="Content Placeholder 2"/>
-          <p:cNvSpPr>
-            <a:spLocks noGrp="1"/>
-          </p:cNvSpPr>
-          <p:nvPr>
-            <p:ph idx="1"/>
-          </p:nvPr>
-        </p:nvSpPr>
-        <p:spPr>
-          <a:xfrm>
-            <a:off x="646111" y="2119259"/>
-            <a:ext cx="10856078" cy="3603812"/>
-          </a:xfrm>
-        </p:spPr>
-        <p:txBody>
-          <a:bodyPr>
-            <a:noAutofit/>
-          </a:bodyPr>
-          <a:lstStyle/>
-          <a:p>
-            <a:pPr marL="0" indent="0">
-              <a:buNone/>
-            </a:pPr>
-            <a:r>
-              <a:rPr lang="en-US" sz="2800" dirty="0" smtClean="0">
-                <a:latin typeface="Consolas"/>
-                <a:cs typeface="Consolas"/>
-              </a:rPr>
-              <a:t>let </a:t>
-            </a:r>
-            <a:r>
-              <a:rPr lang="en-US" sz="2800" dirty="0" err="1">
-                <a:latin typeface="Consolas"/>
-                <a:cs typeface="Consolas"/>
-              </a:rPr>
-              <a:t>todoListResource</a:t>
-            </a:r>
-            <a:r>
-              <a:rPr lang="en-US" sz="2800" dirty="0">
-                <a:latin typeface="Consolas"/>
-                <a:cs typeface="Consolas"/>
-              </a:rPr>
-              <a:t> = route “/” (get </a:t>
-            </a:r>
-            <a:r>
-              <a:rPr lang="en-US" sz="2800" dirty="0" err="1">
-                <a:latin typeface="Consolas"/>
-                <a:cs typeface="Consolas"/>
-              </a:rPr>
-              <a:t>todoList</a:t>
-            </a:r>
-            <a:r>
-              <a:rPr lang="en-US" sz="2800" dirty="0">
-                <a:latin typeface="Consolas"/>
-                <a:cs typeface="Consolas"/>
-              </a:rPr>
-              <a:t> &lt;|&gt; …)</a:t>
-            </a:r>
-          </a:p>
-          <a:p>
-            <a:pPr marL="0" indent="0">
-              <a:buNone/>
-            </a:pPr>
-            <a:r>
-              <a:rPr lang="en-US" sz="2800" dirty="0">
-                <a:latin typeface="Consolas"/>
-                <a:cs typeface="Consolas"/>
-              </a:rPr>
-              <a:t>let </a:t>
-            </a:r>
-            <a:r>
-              <a:rPr lang="en-US" sz="2800" dirty="0" err="1">
-                <a:latin typeface="Consolas"/>
-                <a:cs typeface="Consolas"/>
-              </a:rPr>
-              <a:t>todoItemResource</a:t>
-            </a:r>
-            <a:r>
-              <a:rPr lang="en-US" sz="2800" dirty="0">
-                <a:latin typeface="Consolas"/>
-                <a:cs typeface="Consolas"/>
-              </a:rPr>
-              <a:t> = route “/item/{1}” (put …)</a:t>
-            </a:r>
-          </a:p>
-          <a:p>
-            <a:pPr marL="0" indent="0">
-              <a:buNone/>
-            </a:pPr>
-            <a:endParaRPr lang="en-US" sz="2800" dirty="0">
-              <a:latin typeface="Monaco" pitchFamily="2" charset="0"/>
-            </a:endParaRPr>
-          </a:p>
-          <a:p>
-            <a:pPr marL="0" indent="0">
-              <a:buNone/>
-            </a:pPr>
-            <a:r>
-              <a:rPr lang="en-US" sz="2800" dirty="0">
-                <a:latin typeface="Consolas"/>
-                <a:cs typeface="Consolas"/>
-              </a:rPr>
-              <a:t>let app = </a:t>
-            </a:r>
-            <a:r>
-              <a:rPr lang="en-US" sz="2800" dirty="0" smtClean="0">
-                <a:latin typeface="Consolas"/>
-                <a:cs typeface="Consolas"/>
-              </a:rPr>
-              <a:t>register </a:t>
-            </a:r>
-            <a:r>
-              <a:rPr lang="en-US" sz="2800" dirty="0">
-                <a:latin typeface="Consolas"/>
-                <a:cs typeface="Consolas"/>
-              </a:rPr>
-              <a:t>[ </a:t>
-            </a:r>
-            <a:r>
-              <a:rPr lang="en-US" sz="2800" dirty="0" err="1" smtClean="0">
-                <a:latin typeface="Consolas"/>
-                <a:cs typeface="Consolas"/>
-              </a:rPr>
-              <a:t>todoListResource</a:t>
-            </a:r>
-            <a:endParaRPr lang="en-US" sz="2800" dirty="0">
-              <a:latin typeface="Consolas"/>
-              <a:cs typeface="Consolas"/>
-            </a:endParaRPr>
-          </a:p>
-          <a:p>
-            <a:pPr marL="0" indent="0">
-              <a:buNone/>
-            </a:pPr>
-            <a:r>
-              <a:rPr lang="en-US" sz="2800" dirty="0">
-                <a:latin typeface="Consolas"/>
-                <a:cs typeface="Consolas"/>
-              </a:rPr>
-              <a:t> </a:t>
-            </a:r>
-            <a:r>
-              <a:rPr lang="en-US" sz="2800" dirty="0" smtClean="0">
-                <a:latin typeface="Consolas"/>
-                <a:cs typeface="Consolas"/>
-              </a:rPr>
-              <a:t>                    </a:t>
-            </a:r>
-            <a:r>
-              <a:rPr lang="en-US" sz="2800" dirty="0" err="1">
-                <a:latin typeface="Consolas"/>
-                <a:cs typeface="Consolas"/>
-              </a:rPr>
-              <a:t>todoItemResource</a:t>
-            </a:r>
-            <a:r>
-              <a:rPr lang="en-US" sz="2800" dirty="0">
-                <a:latin typeface="Consolas"/>
-                <a:cs typeface="Consolas"/>
-              </a:rPr>
-              <a:t> ]</a:t>
-            </a:r>
-          </a:p>
-        </p:txBody>
-      </p:sp>
-    </p:spTree>
-    <p:extLst>
-      <p:ext uri="{BB962C8B-B14F-4D97-AF65-F5344CB8AC3E}">
-        <p14:creationId xmlns:p14="http://schemas.microsoft.com/office/powerpoint/2010/main" val="357962463"/>
-      </p:ext>
-    </p:extLst>
-  </p:cSld>
-  <p:clrMapOvr>
-    <a:masterClrMapping/>
-  </p:clrMapOvr>
-  <mc:AlternateContent xmlns:mc="http://schemas.openxmlformats.org/markup-compatibility/2006" xmlns:p14="http://schemas.microsoft.com/office/powerpoint/2010/main">
-    <mc:Choice Requires="p14">
-      <p:transition spd="slow" p14:dur="2000"/>
-    </mc:Choice>
-    <mc:Fallback xmlns="">
-      <p:transition spd="slow"/>
-    </mc:Fallback>
-  </mc:AlternateContent>
-  <p:timing>
-    <p:tnLst>
-      <p:par>
-        <p:cTn id="1" dur="indefinite" restart="never" nodeType="tmRoot"/>
-      </p:par>
-    </p:tnLst>
-  </p:timing>
-</p:sld>
-</file>
-
-<file path=ppt/slides/slide8.xml><?xml version="1.0" encoding="utf-8"?>
+<file path=ppt/slides/slide12.xml><?xml version="1.0" encoding="utf-8"?>
 <p:sld xmlns:a="http://schemas.openxmlformats.org/drawingml/2006/main" xmlns:r="http://schemas.openxmlformats.org/officeDocument/2006/relationships" xmlns:p="http://schemas.openxmlformats.org/presentationml/2006/main">
   <p:cSld>
     <p:spTree>
@@ -9162,11 +8965,1842 @@
   <p:clrMapOvr>
     <a:masterClrMapping/>
   </p:clrMapOvr>
-  <mc:AlternateContent xmlns:mc="http://schemas.openxmlformats.org/markup-compatibility/2006" xmlns:p14="http://schemas.microsoft.com/office/powerpoint/2010/main">
-    <mc:Choice Requires="p14">
+  <mc:AlternateContent xmlns:mc="http://schemas.openxmlformats.org/markup-compatibility/2006">
+    <mc:Choice xmlns:p14="http://schemas.microsoft.com/office/powerpoint/2010/main" Requires="p14">
       <p:transition spd="slow" p14:dur="2000"/>
     </mc:Choice>
-    <mc:Fallback xmlns="">
+    <mc:Fallback>
+      <p:transition spd="slow"/>
+    </mc:Fallback>
+  </mc:AlternateContent>
+  <p:timing>
+    <p:tnLst>
+      <p:par>
+        <p:cTn id="1" dur="indefinite" restart="never" nodeType="tmRoot"/>
+      </p:par>
+    </p:tnLst>
+  </p:timing>
+</p:sld>
+</file>
+
+<file path=ppt/slides/slide2.xml><?xml version="1.0" encoding="utf-8"?>
+<p:sld xmlns:a="http://schemas.openxmlformats.org/drawingml/2006/main" xmlns:r="http://schemas.openxmlformats.org/officeDocument/2006/relationships" xmlns:p="http://schemas.openxmlformats.org/presentationml/2006/main">
+  <p:cSld>
+    <p:spTree>
+      <p:nvGrpSpPr>
+        <p:cNvPr id="1" name=""/>
+        <p:cNvGrpSpPr/>
+        <p:nvPr/>
+      </p:nvGrpSpPr>
+      <p:grpSpPr>
+        <a:xfrm>
+          <a:off x="0" y="0"/>
+          <a:ext cx="0" cy="0"/>
+          <a:chOff x="0" y="0"/>
+          <a:chExt cx="0" cy="0"/>
+        </a:xfrm>
+      </p:grpSpPr>
+      <p:sp>
+        <p:nvSpPr>
+          <p:cNvPr id="3" name="Content Placeholder 2"/>
+          <p:cNvSpPr>
+            <a:spLocks noGrp="1"/>
+          </p:cNvSpPr>
+          <p:nvPr>
+            <p:ph idx="1"/>
+          </p:nvPr>
+        </p:nvSpPr>
+        <p:spPr>
+          <a:xfrm>
+            <a:off x="1103312" y="1460490"/>
+            <a:ext cx="10025899" cy="4195481"/>
+          </a:xfrm>
+        </p:spPr>
+        <p:txBody>
+          <a:bodyPr>
+            <a:normAutofit/>
+          </a:bodyPr>
+          <a:lstStyle/>
+          <a:p>
+            <a:pPr marL="0" indent="0" algn="ctr">
+              <a:buNone/>
+            </a:pPr>
+            <a:endParaRPr lang="en-US" sz="3200" dirty="0">
+              <a:latin typeface="Consolas"/>
+              <a:cs typeface="Consolas"/>
+            </a:endParaRPr>
+          </a:p>
+        </p:txBody>
+      </p:sp>
+      <p:pic>
+        <p:nvPicPr>
+          <p:cNvPr id="1026" name="Picture 2" descr="http://blog.stackoverflow.com/wp-content/uploads/then-a-miracle-occurs-cartoon.png"/>
+          <p:cNvPicPr>
+            <a:picLocks noChangeAspect="1" noChangeArrowheads="1"/>
+          </p:cNvPicPr>
+          <p:nvPr/>
+        </p:nvPicPr>
+        <p:blipFill>
+          <a:blip r:embed="rId3">
+            <a:extLst>
+              <a:ext uri="{28A0092B-C50C-407E-A947-70E740481C1C}">
+                <a14:useLocalDpi xmlns:a14="http://schemas.microsoft.com/office/drawing/2010/main" val="0"/>
+              </a:ext>
+            </a:extLst>
+          </a:blip>
+          <a:srcRect/>
+          <a:stretch>
+            <a:fillRect/>
+          </a:stretch>
+        </p:blipFill>
+        <p:spPr bwMode="auto">
+          <a:xfrm>
+            <a:off x="4044573" y="1460490"/>
+            <a:ext cx="4143375" cy="4724401"/>
+          </a:xfrm>
+          <a:prstGeom prst="rect">
+            <a:avLst/>
+          </a:prstGeom>
+          <a:noFill/>
+          <a:extLst>
+            <a:ext uri="{909E8E84-426E-40DD-AFC4-6F175D3DCCD1}">
+              <a14:hiddenFill xmlns:a14="http://schemas.microsoft.com/office/drawing/2010/main">
+                <a:solidFill>
+                  <a:srgbClr val="FFFFFF"/>
+                </a:solidFill>
+              </a14:hiddenFill>
+            </a:ext>
+          </a:extLst>
+        </p:spPr>
+      </p:pic>
+    </p:spTree>
+    <p:extLst>
+      <p:ext uri="{BB962C8B-B14F-4D97-AF65-F5344CB8AC3E}">
+        <p14:creationId xmlns:p14="http://schemas.microsoft.com/office/powerpoint/2010/main" val="2281224794"/>
+      </p:ext>
+    </p:extLst>
+  </p:cSld>
+  <p:clrMapOvr>
+    <a:masterClrMapping/>
+  </p:clrMapOvr>
+  <p:timing>
+    <p:tnLst>
+      <p:par>
+        <p:cTn id="1" dur="indefinite" restart="never" nodeType="tmRoot"/>
+      </p:par>
+    </p:tnLst>
+  </p:timing>
+</p:sld>
+</file>
+
+<file path=ppt/slides/slide3.xml><?xml version="1.0" encoding="utf-8"?>
+<p:sld xmlns:a="http://schemas.openxmlformats.org/drawingml/2006/main" xmlns:r="http://schemas.openxmlformats.org/officeDocument/2006/relationships" xmlns:p="http://schemas.openxmlformats.org/presentationml/2006/main">
+  <p:cSld>
+    <p:spTree>
+      <p:nvGrpSpPr>
+        <p:cNvPr id="1" name=""/>
+        <p:cNvGrpSpPr/>
+        <p:nvPr/>
+      </p:nvGrpSpPr>
+      <p:grpSpPr>
+        <a:xfrm>
+          <a:off x="0" y="0"/>
+          <a:ext cx="0" cy="0"/>
+          <a:chOff x="0" y="0"/>
+          <a:chExt cx="0" cy="0"/>
+        </a:xfrm>
+      </p:grpSpPr>
+      <p:sp>
+        <p:nvSpPr>
+          <p:cNvPr id="2" name="Title 1"/>
+          <p:cNvSpPr>
+            <a:spLocks noGrp="1"/>
+          </p:cNvSpPr>
+          <p:nvPr>
+            <p:ph type="title"/>
+          </p:nvPr>
+        </p:nvSpPr>
+        <p:spPr/>
+        <p:txBody>
+          <a:bodyPr/>
+          <a:lstStyle/>
+          <a:p>
+            <a:r>
+              <a:rPr lang="en-US" dirty="0" smtClean="0"/>
+              <a:t>Simplest HTTP Application</a:t>
+            </a:r>
+            <a:endParaRPr lang="en-US" dirty="0"/>
+          </a:p>
+        </p:txBody>
+      </p:sp>
+      <p:sp>
+        <p:nvSpPr>
+          <p:cNvPr id="3" name="Content Placeholder 2"/>
+          <p:cNvSpPr>
+            <a:spLocks noGrp="1"/>
+          </p:cNvSpPr>
+          <p:nvPr>
+            <p:ph idx="1"/>
+          </p:nvPr>
+        </p:nvSpPr>
+        <p:spPr>
+          <a:xfrm>
+            <a:off x="1103312" y="2980196"/>
+            <a:ext cx="10025899" cy="4195481"/>
+          </a:xfrm>
+        </p:spPr>
+        <p:txBody>
+          <a:bodyPr>
+            <a:normAutofit/>
+          </a:bodyPr>
+          <a:lstStyle/>
+          <a:p>
+            <a:pPr marL="0" indent="0" algn="ctr">
+              <a:buNone/>
+            </a:pPr>
+            <a:r>
+              <a:rPr lang="en-US" sz="3200" dirty="0" err="1" smtClean="0">
+                <a:latin typeface="Consolas"/>
+                <a:cs typeface="Consolas"/>
+              </a:rPr>
+              <a:t>HttpRequestMessage</a:t>
+            </a:r>
+            <a:r>
+              <a:rPr lang="en-US" sz="3200" dirty="0" smtClean="0">
+                <a:latin typeface="Consolas"/>
+                <a:cs typeface="Consolas"/>
+              </a:rPr>
+              <a:t> </a:t>
+            </a:r>
+            <a:r>
+              <a:rPr lang="en-US" sz="3200" dirty="0">
+                <a:latin typeface="Consolas"/>
+                <a:cs typeface="Consolas"/>
+              </a:rPr>
+              <a:t>-&gt; HttpResponseMessage</a:t>
+            </a:r>
+          </a:p>
+        </p:txBody>
+      </p:sp>
+    </p:spTree>
+    <p:extLst>
+      <p:ext uri="{BB962C8B-B14F-4D97-AF65-F5344CB8AC3E}">
+        <p14:creationId xmlns:p14="http://schemas.microsoft.com/office/powerpoint/2010/main" val="151566142"/>
+      </p:ext>
+    </p:extLst>
+  </p:cSld>
+  <p:clrMapOvr>
+    <a:masterClrMapping/>
+  </p:clrMapOvr>
+  <p:timing>
+    <p:tnLst>
+      <p:par>
+        <p:cTn id="1" dur="indefinite" restart="never" nodeType="tmRoot"/>
+      </p:par>
+    </p:tnLst>
+  </p:timing>
+</p:sld>
+</file>
+
+<file path=ppt/slides/slide4.xml><?xml version="1.0" encoding="utf-8"?>
+<p:sld xmlns:a="http://schemas.openxmlformats.org/drawingml/2006/main" xmlns:r="http://schemas.openxmlformats.org/officeDocument/2006/relationships" xmlns:p="http://schemas.openxmlformats.org/presentationml/2006/main">
+  <p:cSld>
+    <p:spTree>
+      <p:nvGrpSpPr>
+        <p:cNvPr id="1" name=""/>
+        <p:cNvGrpSpPr/>
+        <p:nvPr/>
+      </p:nvGrpSpPr>
+      <p:grpSpPr>
+        <a:xfrm>
+          <a:off x="0" y="0"/>
+          <a:ext cx="0" cy="0"/>
+          <a:chOff x="0" y="0"/>
+          <a:chExt cx="0" cy="0"/>
+        </a:xfrm>
+      </p:grpSpPr>
+      <p:sp>
+        <p:nvSpPr>
+          <p:cNvPr id="4" name="Title 3"/>
+          <p:cNvSpPr>
+            <a:spLocks noGrp="1"/>
+          </p:cNvSpPr>
+          <p:nvPr>
+            <p:ph type="title"/>
+          </p:nvPr>
+        </p:nvSpPr>
+        <p:spPr/>
+        <p:txBody>
+          <a:bodyPr/>
+          <a:lstStyle/>
+          <a:p>
+            <a:r>
+              <a:rPr lang="en-US" dirty="0" smtClean="0"/>
+              <a:t>Component Parts</a:t>
+            </a:r>
+            <a:endParaRPr lang="en-US" dirty="0"/>
+          </a:p>
+        </p:txBody>
+      </p:sp>
+      <p:sp>
+        <p:nvSpPr>
+          <p:cNvPr id="5" name="Content Placeholder 4"/>
+          <p:cNvSpPr>
+            <a:spLocks noGrp="1"/>
+          </p:cNvSpPr>
+          <p:nvPr>
+            <p:ph idx="1"/>
+          </p:nvPr>
+        </p:nvSpPr>
+        <p:spPr>
+          <a:xfrm>
+            <a:off x="1103312" y="1443790"/>
+            <a:ext cx="8946541" cy="4804610"/>
+          </a:xfrm>
+        </p:spPr>
+        <p:txBody>
+          <a:bodyPr>
+            <a:noAutofit/>
+          </a:bodyPr>
+          <a:lstStyle/>
+          <a:p>
+            <a:r>
+              <a:rPr lang="en-US" sz="2800" dirty="0" smtClean="0"/>
+              <a:t>Request/Response</a:t>
+            </a:r>
+          </a:p>
+          <a:p>
+            <a:pPr lvl="1"/>
+            <a:r>
+              <a:rPr lang="en-US" sz="2800" dirty="0" smtClean="0"/>
+              <a:t>Methods, URIs, Status Codes</a:t>
+            </a:r>
+          </a:p>
+          <a:p>
+            <a:pPr lvl="1"/>
+            <a:endParaRPr lang="en-US" sz="2800" dirty="0" smtClean="0"/>
+          </a:p>
+          <a:p>
+            <a:r>
+              <a:rPr lang="en-US" sz="2800" dirty="0" smtClean="0"/>
+              <a:t>Headers (info on client, server, request type, </a:t>
+            </a:r>
+            <a:r>
+              <a:rPr lang="en-US" sz="2800" dirty="0" err="1" smtClean="0"/>
+              <a:t>etc</a:t>
+            </a:r>
+            <a:r>
+              <a:rPr lang="en-US" sz="2800" dirty="0" smtClean="0"/>
+              <a:t>)</a:t>
+            </a:r>
+          </a:p>
+          <a:p>
+            <a:pPr lvl="1"/>
+            <a:r>
+              <a:rPr lang="en-US" sz="2800" dirty="0" smtClean="0"/>
+              <a:t>General, Request, Response, Content</a:t>
+            </a:r>
+          </a:p>
+          <a:p>
+            <a:pPr lvl="1"/>
+            <a:endParaRPr lang="en-US" sz="2800" dirty="0" smtClean="0"/>
+          </a:p>
+          <a:p>
+            <a:r>
+              <a:rPr lang="en-US" sz="2800" dirty="0" smtClean="0"/>
+              <a:t>Resources –</a:t>
+            </a:r>
+          </a:p>
+          <a:p>
+            <a:pPr lvl="1"/>
+            <a:r>
+              <a:rPr lang="en-US" sz="2600" dirty="0" smtClean="0"/>
+              <a:t>“anything that has identity”–</a:t>
+            </a:r>
+            <a:r>
+              <a:rPr lang="en-US" sz="2600" dirty="0" smtClean="0">
+                <a:hlinkClick r:id="rId3"/>
+              </a:rPr>
+              <a:t>RFC2396</a:t>
+            </a:r>
+            <a:endParaRPr lang="en-US" sz="2600" dirty="0" smtClean="0"/>
+          </a:p>
+        </p:txBody>
+      </p:sp>
+    </p:spTree>
+    <p:extLst>
+      <p:ext uri="{BB962C8B-B14F-4D97-AF65-F5344CB8AC3E}">
+        <p14:creationId xmlns:p14="http://schemas.microsoft.com/office/powerpoint/2010/main" val="1647281745"/>
+      </p:ext>
+    </p:extLst>
+  </p:cSld>
+  <p:clrMapOvr>
+    <a:masterClrMapping/>
+  </p:clrMapOvr>
+  <p:timing>
+    <p:tnLst>
+      <p:par>
+        <p:cTn id="1" dur="indefinite" restart="never" nodeType="tmRoot"/>
+      </p:par>
+    </p:tnLst>
+  </p:timing>
+</p:sld>
+</file>
+
+<file path=ppt/slides/slide5.xml><?xml version="1.0" encoding="utf-8"?>
+<p:sld xmlns:a="http://schemas.openxmlformats.org/drawingml/2006/main" xmlns:r="http://schemas.openxmlformats.org/officeDocument/2006/relationships" xmlns:p="http://schemas.openxmlformats.org/presentationml/2006/main">
+  <p:cSld>
+    <p:spTree>
+      <p:nvGrpSpPr>
+        <p:cNvPr id="1" name=""/>
+        <p:cNvGrpSpPr/>
+        <p:nvPr/>
+      </p:nvGrpSpPr>
+      <p:grpSpPr>
+        <a:xfrm>
+          <a:off x="0" y="0"/>
+          <a:ext cx="0" cy="0"/>
+          <a:chOff x="0" y="0"/>
+          <a:chExt cx="0" cy="0"/>
+        </a:xfrm>
+      </p:grpSpPr>
+      <p:sp>
+        <p:nvSpPr>
+          <p:cNvPr id="2" name="Title 1"/>
+          <p:cNvSpPr>
+            <a:spLocks noGrp="1"/>
+          </p:cNvSpPr>
+          <p:nvPr>
+            <p:ph type="title"/>
+          </p:nvPr>
+        </p:nvSpPr>
+        <p:spPr/>
+        <p:txBody>
+          <a:bodyPr/>
+          <a:lstStyle/>
+          <a:p>
+            <a:r>
+              <a:rPr lang="en-US" dirty="0" smtClean="0"/>
+              <a:t>Resources</a:t>
+            </a:r>
+            <a:endParaRPr lang="en-US" dirty="0"/>
+          </a:p>
+        </p:txBody>
+      </p:sp>
+      <p:sp>
+        <p:nvSpPr>
+          <p:cNvPr id="3" name="Content Placeholder 2"/>
+          <p:cNvSpPr>
+            <a:spLocks noGrp="1"/>
+          </p:cNvSpPr>
+          <p:nvPr>
+            <p:ph idx="1"/>
+          </p:nvPr>
+        </p:nvSpPr>
+        <p:spPr>
+          <a:xfrm>
+            <a:off x="1271760" y="2052918"/>
+            <a:ext cx="4515435" cy="4195481"/>
+          </a:xfrm>
+        </p:spPr>
+        <p:txBody>
+          <a:bodyPr/>
+          <a:lstStyle/>
+          <a:p>
+            <a:pPr marL="0" indent="0">
+              <a:buNone/>
+            </a:pPr>
+            <a:r>
+              <a:rPr lang="en-US" sz="2800" dirty="0" smtClean="0"/>
+              <a:t>GET /item/1</a:t>
+            </a:r>
+          </a:p>
+          <a:p>
+            <a:pPr marL="0" indent="0">
+              <a:buNone/>
+            </a:pPr>
+            <a:r>
+              <a:rPr lang="en-US" sz="2800" dirty="0" smtClean="0"/>
+              <a:t>+ POST /item/1</a:t>
+            </a:r>
+          </a:p>
+          <a:p>
+            <a:pPr marL="0" indent="0">
+              <a:buNone/>
+            </a:pPr>
+            <a:r>
+              <a:rPr lang="en-US" sz="2800" dirty="0" smtClean="0"/>
+              <a:t>+ PUT /item/1</a:t>
+            </a:r>
+          </a:p>
+          <a:p>
+            <a:pPr marL="0" indent="0">
+              <a:buNone/>
+            </a:pPr>
+            <a:r>
+              <a:rPr lang="en-US" sz="2800" dirty="0" smtClean="0"/>
+              <a:t>+ DELETE /item/1</a:t>
+            </a:r>
+          </a:p>
+          <a:p>
+            <a:pPr marL="0" indent="0">
+              <a:buNone/>
+            </a:pPr>
+            <a:r>
+              <a:rPr lang="en-US" sz="2800" dirty="0" smtClean="0"/>
+              <a:t>+ OPTIONS /item/1</a:t>
+            </a:r>
+          </a:p>
+        </p:txBody>
+      </p:sp>
+      <p:sp>
+        <p:nvSpPr>
+          <p:cNvPr id="4" name="Content Placeholder 2"/>
+          <p:cNvSpPr txBox="1">
+            <a:spLocks/>
+          </p:cNvSpPr>
+          <p:nvPr/>
+        </p:nvSpPr>
+        <p:spPr>
+          <a:xfrm>
+            <a:off x="6742112" y="2052917"/>
+            <a:ext cx="4038183" cy="4195481"/>
+          </a:xfrm>
+          <a:prstGeom prst="rect">
+            <a:avLst/>
+          </a:prstGeom>
+        </p:spPr>
+        <p:txBody>
+          <a:bodyPr vert="horz" lIns="91440" tIns="45720" rIns="91440" bIns="45720" rtlCol="0">
+            <a:normAutofit/>
+          </a:bodyPr>
+          <a:lstStyle>
+            <a:lvl1pPr marL="342900" indent="-342900" algn="l" defTabSz="457200" rtl="0" eaLnBrk="1" latinLnBrk="0" hangingPunct="1">
+              <a:spcBef>
+                <a:spcPct val="20000"/>
+              </a:spcBef>
+              <a:spcAft>
+                <a:spcPts val="600"/>
+              </a:spcAft>
+              <a:buClr>
+                <a:schemeClr val="accent1"/>
+              </a:buClr>
+              <a:buSzPct val="80000"/>
+              <a:buFont typeface="Wingdings 3" charset="2"/>
+              <a:buChar char=""/>
+              <a:defRPr sz="2000" b="0" i="0" kern="1200">
+                <a:solidFill>
+                  <a:schemeClr val="tx1"/>
+                </a:solidFill>
+                <a:latin typeface="+mj-lt"/>
+                <a:ea typeface="+mj-ea"/>
+                <a:cs typeface="+mj-cs"/>
+              </a:defRPr>
+            </a:lvl1pPr>
+            <a:lvl2pPr marL="742950" indent="-285750" algn="l" defTabSz="457200" rtl="0" eaLnBrk="1" latinLnBrk="0" hangingPunct="1">
+              <a:spcBef>
+                <a:spcPct val="20000"/>
+              </a:spcBef>
+              <a:spcAft>
+                <a:spcPts val="600"/>
+              </a:spcAft>
+              <a:buClr>
+                <a:schemeClr val="accent1"/>
+              </a:buClr>
+              <a:buSzPct val="80000"/>
+              <a:buFont typeface="Wingdings 3" charset="2"/>
+              <a:buChar char=""/>
+              <a:defRPr sz="1800" b="0" i="0" kern="1200">
+                <a:solidFill>
+                  <a:schemeClr val="tx1"/>
+                </a:solidFill>
+                <a:latin typeface="+mj-lt"/>
+                <a:ea typeface="+mj-ea"/>
+                <a:cs typeface="+mj-cs"/>
+              </a:defRPr>
+            </a:lvl2pPr>
+            <a:lvl3pPr marL="1143000" indent="-228600" algn="l" defTabSz="457200" rtl="0" eaLnBrk="1" latinLnBrk="0" hangingPunct="1">
+              <a:spcBef>
+                <a:spcPct val="20000"/>
+              </a:spcBef>
+              <a:spcAft>
+                <a:spcPts val="600"/>
+              </a:spcAft>
+              <a:buClr>
+                <a:schemeClr val="accent1"/>
+              </a:buClr>
+              <a:buSzPct val="80000"/>
+              <a:buFont typeface="Wingdings 3" charset="2"/>
+              <a:buChar char=""/>
+              <a:defRPr sz="1600" b="0" i="0" kern="1200">
+                <a:solidFill>
+                  <a:schemeClr val="tx1"/>
+                </a:solidFill>
+                <a:latin typeface="+mj-lt"/>
+                <a:ea typeface="+mj-ea"/>
+                <a:cs typeface="+mj-cs"/>
+              </a:defRPr>
+            </a:lvl3pPr>
+            <a:lvl4pPr marL="1600200" indent="-228600" algn="l" defTabSz="457200" rtl="0" eaLnBrk="1" latinLnBrk="0" hangingPunct="1">
+              <a:spcBef>
+                <a:spcPct val="20000"/>
+              </a:spcBef>
+              <a:spcAft>
+                <a:spcPts val="600"/>
+              </a:spcAft>
+              <a:buClr>
+                <a:schemeClr val="accent1"/>
+              </a:buClr>
+              <a:buSzPct val="80000"/>
+              <a:buFont typeface="Wingdings 3" charset="2"/>
+              <a:buChar char=""/>
+              <a:defRPr sz="1400" b="0" i="0" kern="1200">
+                <a:solidFill>
+                  <a:schemeClr val="tx1"/>
+                </a:solidFill>
+                <a:latin typeface="+mj-lt"/>
+                <a:ea typeface="+mj-ea"/>
+                <a:cs typeface="+mj-cs"/>
+              </a:defRPr>
+            </a:lvl4pPr>
+            <a:lvl5pPr marL="2057400" indent="-228600" algn="l" defTabSz="457200" rtl="0" eaLnBrk="1" latinLnBrk="0" hangingPunct="1">
+              <a:spcBef>
+                <a:spcPct val="20000"/>
+              </a:spcBef>
+              <a:spcAft>
+                <a:spcPts val="600"/>
+              </a:spcAft>
+              <a:buClr>
+                <a:schemeClr val="accent1"/>
+              </a:buClr>
+              <a:buSzPct val="80000"/>
+              <a:buFont typeface="Wingdings 3" charset="2"/>
+              <a:buChar char=""/>
+              <a:defRPr sz="1400" b="0" i="0" kern="1200">
+                <a:solidFill>
+                  <a:schemeClr val="tx1"/>
+                </a:solidFill>
+                <a:latin typeface="+mj-lt"/>
+                <a:ea typeface="+mj-ea"/>
+                <a:cs typeface="+mj-cs"/>
+              </a:defRPr>
+            </a:lvl5pPr>
+            <a:lvl6pPr marL="2514600" indent="-228600" algn="l" defTabSz="457200" rtl="0" eaLnBrk="1" latinLnBrk="0" hangingPunct="1">
+              <a:spcBef>
+                <a:spcPct val="20000"/>
+              </a:spcBef>
+              <a:spcAft>
+                <a:spcPts val="600"/>
+              </a:spcAft>
+              <a:buClr>
+                <a:schemeClr val="accent1"/>
+              </a:buClr>
+              <a:buSzPct val="80000"/>
+              <a:buFont typeface="Wingdings 3" charset="2"/>
+              <a:buChar char=""/>
+              <a:defRPr sz="120" b="0" i="0" kern="1200">
+                <a:solidFill>
+                  <a:schemeClr val="tx1"/>
+                </a:solidFill>
+                <a:latin typeface="+mj-lt"/>
+                <a:ea typeface="+mj-ea"/>
+                <a:cs typeface="+mj-cs"/>
+              </a:defRPr>
+            </a:lvl6pPr>
+            <a:lvl7pPr marL="2971800" indent="-228600" algn="l" defTabSz="457200" rtl="0" eaLnBrk="1" latinLnBrk="0" hangingPunct="1">
+              <a:spcBef>
+                <a:spcPct val="20000"/>
+              </a:spcBef>
+              <a:spcAft>
+                <a:spcPts val="600"/>
+              </a:spcAft>
+              <a:buClr>
+                <a:schemeClr val="accent1"/>
+              </a:buClr>
+              <a:buSzPct val="80000"/>
+              <a:buFont typeface="Wingdings 3" charset="2"/>
+              <a:buChar char=""/>
+              <a:defRPr sz="120" b="0" i="0" kern="1200">
+                <a:solidFill>
+                  <a:schemeClr val="tx1"/>
+                </a:solidFill>
+                <a:latin typeface="+mj-lt"/>
+                <a:ea typeface="+mj-ea"/>
+                <a:cs typeface="+mj-cs"/>
+              </a:defRPr>
+            </a:lvl7pPr>
+            <a:lvl8pPr marL="3429000" indent="-228600" algn="l" defTabSz="457200" rtl="0" eaLnBrk="1" latinLnBrk="0" hangingPunct="1">
+              <a:spcBef>
+                <a:spcPct val="20000"/>
+              </a:spcBef>
+              <a:spcAft>
+                <a:spcPts val="600"/>
+              </a:spcAft>
+              <a:buClr>
+                <a:schemeClr val="accent1"/>
+              </a:buClr>
+              <a:buSzPct val="80000"/>
+              <a:buFont typeface="Wingdings 3" charset="2"/>
+              <a:buChar char=""/>
+              <a:defRPr sz="120" b="0" i="0" kern="1200">
+                <a:solidFill>
+                  <a:schemeClr val="tx1"/>
+                </a:solidFill>
+                <a:latin typeface="+mj-lt"/>
+                <a:ea typeface="+mj-ea"/>
+                <a:cs typeface="+mj-cs"/>
+              </a:defRPr>
+            </a:lvl8pPr>
+            <a:lvl9pPr marL="3886200" indent="-228600" algn="l" defTabSz="457200" rtl="0" eaLnBrk="1" latinLnBrk="0" hangingPunct="1">
+              <a:spcBef>
+                <a:spcPct val="20000"/>
+              </a:spcBef>
+              <a:spcAft>
+                <a:spcPts val="600"/>
+              </a:spcAft>
+              <a:buClr>
+                <a:schemeClr val="accent1"/>
+              </a:buClr>
+              <a:buSzPct val="80000"/>
+              <a:buFont typeface="Wingdings 3" charset="2"/>
+              <a:buChar char=""/>
+              <a:defRPr sz="120" b="0" i="0" kern="1200">
+                <a:solidFill>
+                  <a:schemeClr val="tx1"/>
+                </a:solidFill>
+                <a:latin typeface="+mj-lt"/>
+                <a:ea typeface="+mj-ea"/>
+                <a:cs typeface="+mj-cs"/>
+              </a:defRPr>
+            </a:lvl9pPr>
+          </a:lstStyle>
+          <a:p>
+            <a:pPr marL="0" indent="0">
+              <a:buFont typeface="Wingdings 3" charset="2"/>
+              <a:buNone/>
+            </a:pPr>
+            <a:r>
+              <a:rPr lang="en-US" sz="2800" dirty="0" smtClean="0"/>
+              <a:t>GET (or POST) /</a:t>
+            </a:r>
+          </a:p>
+          <a:p>
+            <a:pPr marL="0" indent="0">
+              <a:buFont typeface="Wingdings 3" charset="2"/>
+              <a:buNone/>
+            </a:pPr>
+            <a:r>
+              <a:rPr lang="en-US" sz="2800" dirty="0" smtClean="0"/>
+              <a:t>+ /items</a:t>
+            </a:r>
+          </a:p>
+          <a:p>
+            <a:pPr marL="0" indent="0">
+              <a:buFont typeface="Wingdings 3" charset="2"/>
+              <a:buNone/>
+            </a:pPr>
+            <a:r>
+              <a:rPr lang="en-US" sz="2800" dirty="0" smtClean="0"/>
+              <a:t>+ /item/{</a:t>
+            </a:r>
+            <a:r>
+              <a:rPr lang="en-US" sz="2800" dirty="0" err="1" smtClean="0"/>
+              <a:t>itemId</a:t>
+            </a:r>
+            <a:r>
+              <a:rPr lang="en-US" sz="2800" dirty="0" smtClean="0"/>
+              <a:t>}</a:t>
+            </a:r>
+          </a:p>
+          <a:p>
+            <a:pPr marL="0" indent="0">
+              <a:buFont typeface="Wingdings 3" charset="2"/>
+              <a:buNone/>
+            </a:pPr>
+            <a:r>
+              <a:rPr lang="en-US" sz="2800" dirty="0" smtClean="0"/>
+              <a:t>+ /</a:t>
+            </a:r>
+            <a:r>
+              <a:rPr lang="en-US" sz="2800" dirty="0" err="1" smtClean="0"/>
+              <a:t>setresult?foo</a:t>
+            </a:r>
+            <a:r>
+              <a:rPr lang="en-US" sz="2800" dirty="0" smtClean="0"/>
+              <a:t>=bar</a:t>
+            </a:r>
+          </a:p>
+        </p:txBody>
+      </p:sp>
+      <p:sp>
+        <p:nvSpPr>
+          <p:cNvPr id="5" name="TextBox 4"/>
+          <p:cNvSpPr txBox="1"/>
+          <p:nvPr/>
+        </p:nvSpPr>
+        <p:spPr>
+          <a:xfrm>
+            <a:off x="1271760" y="1483916"/>
+            <a:ext cx="2645276" cy="523220"/>
+          </a:xfrm>
+          <a:prstGeom prst="rect">
+            <a:avLst/>
+          </a:prstGeom>
+        </p:spPr>
+        <p:txBody>
+          <a:bodyPr vert="horz" lIns="91440" tIns="45720" rIns="91440" bIns="45720" rtlCol="0" anchor="b">
+            <a:noAutofit/>
+          </a:bodyPr>
+          <a:lstStyle>
+            <a:lvl1pPr indent="0">
+              <a:spcBef>
+                <a:spcPct val="20000"/>
+              </a:spcBef>
+              <a:spcAft>
+                <a:spcPts val="600"/>
+              </a:spcAft>
+              <a:buClr>
+                <a:schemeClr val="accent1"/>
+              </a:buClr>
+              <a:buSzPct val="80000"/>
+              <a:buFont typeface="Wingdings 3" charset="2"/>
+              <a:buNone/>
+              <a:defRPr sz="2800" b="0" i="0">
+                <a:solidFill>
+                  <a:schemeClr val="accent1"/>
+                </a:solidFill>
+                <a:latin typeface="+mj-lt"/>
+                <a:ea typeface="+mj-ea"/>
+                <a:cs typeface="+mj-cs"/>
+              </a:defRPr>
+            </a:lvl1pPr>
+            <a:lvl2pPr indent="0">
+              <a:spcBef>
+                <a:spcPct val="20000"/>
+              </a:spcBef>
+              <a:spcAft>
+                <a:spcPts val="600"/>
+              </a:spcAft>
+              <a:buClr>
+                <a:schemeClr val="accent1"/>
+              </a:buClr>
+              <a:buSzPct val="80000"/>
+              <a:buFont typeface="Wingdings 3" charset="2"/>
+              <a:buNone/>
+              <a:defRPr sz="2000" b="1" i="0">
+                <a:latin typeface="+mj-lt"/>
+                <a:ea typeface="+mj-ea"/>
+                <a:cs typeface="+mj-cs"/>
+              </a:defRPr>
+            </a:lvl2pPr>
+            <a:lvl3pPr indent="0">
+              <a:spcBef>
+                <a:spcPct val="20000"/>
+              </a:spcBef>
+              <a:spcAft>
+                <a:spcPts val="600"/>
+              </a:spcAft>
+              <a:buClr>
+                <a:schemeClr val="accent1"/>
+              </a:buClr>
+              <a:buSzPct val="80000"/>
+              <a:buFont typeface="Wingdings 3" charset="2"/>
+              <a:buNone/>
+              <a:defRPr b="1" i="0">
+                <a:latin typeface="+mj-lt"/>
+                <a:ea typeface="+mj-ea"/>
+                <a:cs typeface="+mj-cs"/>
+              </a:defRPr>
+            </a:lvl3pPr>
+            <a:lvl4pPr indent="0">
+              <a:spcBef>
+                <a:spcPct val="20000"/>
+              </a:spcBef>
+              <a:spcAft>
+                <a:spcPts val="600"/>
+              </a:spcAft>
+              <a:buClr>
+                <a:schemeClr val="accent1"/>
+              </a:buClr>
+              <a:buSzPct val="80000"/>
+              <a:buFont typeface="Wingdings 3" charset="2"/>
+              <a:buNone/>
+              <a:defRPr sz="1600" b="1" i="0">
+                <a:latin typeface="+mj-lt"/>
+                <a:ea typeface="+mj-ea"/>
+                <a:cs typeface="+mj-cs"/>
+              </a:defRPr>
+            </a:lvl4pPr>
+            <a:lvl5pPr indent="0">
+              <a:spcBef>
+                <a:spcPct val="20000"/>
+              </a:spcBef>
+              <a:spcAft>
+                <a:spcPts val="600"/>
+              </a:spcAft>
+              <a:buClr>
+                <a:schemeClr val="accent1"/>
+              </a:buClr>
+              <a:buSzPct val="80000"/>
+              <a:buFont typeface="Wingdings 3" charset="2"/>
+              <a:buNone/>
+              <a:defRPr sz="1600" b="1" i="0">
+                <a:latin typeface="+mj-lt"/>
+                <a:ea typeface="+mj-ea"/>
+                <a:cs typeface="+mj-cs"/>
+              </a:defRPr>
+            </a:lvl5pPr>
+            <a:lvl6pPr indent="0">
+              <a:spcBef>
+                <a:spcPct val="20000"/>
+              </a:spcBef>
+              <a:spcAft>
+                <a:spcPts val="600"/>
+              </a:spcAft>
+              <a:buClr>
+                <a:schemeClr val="accent1"/>
+              </a:buClr>
+              <a:buSzPct val="80000"/>
+              <a:buFont typeface="Wingdings 3" charset="2"/>
+              <a:buNone/>
+              <a:defRPr sz="1600" b="1" i="0">
+                <a:latin typeface="+mj-lt"/>
+                <a:ea typeface="+mj-ea"/>
+                <a:cs typeface="+mj-cs"/>
+              </a:defRPr>
+            </a:lvl6pPr>
+            <a:lvl7pPr indent="0">
+              <a:spcBef>
+                <a:spcPct val="20000"/>
+              </a:spcBef>
+              <a:spcAft>
+                <a:spcPts val="600"/>
+              </a:spcAft>
+              <a:buClr>
+                <a:schemeClr val="accent1"/>
+              </a:buClr>
+              <a:buSzPct val="80000"/>
+              <a:buFont typeface="Wingdings 3" charset="2"/>
+              <a:buNone/>
+              <a:defRPr sz="1600" b="1" i="0">
+                <a:latin typeface="+mj-lt"/>
+                <a:ea typeface="+mj-ea"/>
+                <a:cs typeface="+mj-cs"/>
+              </a:defRPr>
+            </a:lvl7pPr>
+            <a:lvl8pPr indent="0">
+              <a:spcBef>
+                <a:spcPct val="20000"/>
+              </a:spcBef>
+              <a:spcAft>
+                <a:spcPts val="600"/>
+              </a:spcAft>
+              <a:buClr>
+                <a:schemeClr val="accent1"/>
+              </a:buClr>
+              <a:buSzPct val="80000"/>
+              <a:buFont typeface="Wingdings 3" charset="2"/>
+              <a:buNone/>
+              <a:defRPr sz="1600" b="1" i="0">
+                <a:latin typeface="+mj-lt"/>
+                <a:ea typeface="+mj-ea"/>
+                <a:cs typeface="+mj-cs"/>
+              </a:defRPr>
+            </a:lvl8pPr>
+            <a:lvl9pPr indent="0">
+              <a:spcBef>
+                <a:spcPct val="20000"/>
+              </a:spcBef>
+              <a:spcAft>
+                <a:spcPts val="600"/>
+              </a:spcAft>
+              <a:buClr>
+                <a:schemeClr val="accent1"/>
+              </a:buClr>
+              <a:buSzPct val="80000"/>
+              <a:buFont typeface="Wingdings 3" charset="2"/>
+              <a:buNone/>
+              <a:defRPr sz="1600" b="1" i="0">
+                <a:latin typeface="+mj-lt"/>
+                <a:ea typeface="+mj-ea"/>
+                <a:cs typeface="+mj-cs"/>
+              </a:defRPr>
+            </a:lvl9pPr>
+          </a:lstStyle>
+          <a:p>
+            <a:r>
+              <a:rPr lang="en-US" dirty="0"/>
+              <a:t>HTTP Resource</a:t>
+            </a:r>
+          </a:p>
+        </p:txBody>
+      </p:sp>
+      <p:sp>
+        <p:nvSpPr>
+          <p:cNvPr id="6" name="TextBox 5"/>
+          <p:cNvSpPr txBox="1"/>
+          <p:nvPr/>
+        </p:nvSpPr>
+        <p:spPr>
+          <a:xfrm>
+            <a:off x="6742112" y="1483916"/>
+            <a:ext cx="2653290" cy="523220"/>
+          </a:xfrm>
+          <a:prstGeom prst="rect">
+            <a:avLst/>
+          </a:prstGeom>
+        </p:spPr>
+        <p:txBody>
+          <a:bodyPr vert="horz" lIns="91440" tIns="45720" rIns="91440" bIns="45720" rtlCol="0" anchor="b">
+            <a:noAutofit/>
+          </a:bodyPr>
+          <a:lstStyle>
+            <a:defPPr>
+              <a:defRPr lang="en-US"/>
+            </a:defPPr>
+            <a:lvl1pPr indent="0">
+              <a:spcBef>
+                <a:spcPct val="20000"/>
+              </a:spcBef>
+              <a:spcAft>
+                <a:spcPts val="600"/>
+              </a:spcAft>
+              <a:buClr>
+                <a:schemeClr val="accent1"/>
+              </a:buClr>
+              <a:buSzPct val="80000"/>
+              <a:buFont typeface="Wingdings 3" charset="2"/>
+              <a:buNone/>
+              <a:defRPr sz="2800" b="0" i="0">
+                <a:solidFill>
+                  <a:schemeClr val="accent1"/>
+                </a:solidFill>
+                <a:latin typeface="+mj-lt"/>
+                <a:ea typeface="+mj-ea"/>
+                <a:cs typeface="+mj-cs"/>
+              </a:defRPr>
+            </a:lvl1pPr>
+            <a:lvl2pPr indent="0">
+              <a:spcBef>
+                <a:spcPct val="20000"/>
+              </a:spcBef>
+              <a:spcAft>
+                <a:spcPts val="600"/>
+              </a:spcAft>
+              <a:buClr>
+                <a:schemeClr val="accent1"/>
+              </a:buClr>
+              <a:buSzPct val="80000"/>
+              <a:buFont typeface="Wingdings 3" charset="2"/>
+              <a:buNone/>
+              <a:defRPr sz="2000" b="1" i="0">
+                <a:latin typeface="+mj-lt"/>
+                <a:ea typeface="+mj-ea"/>
+                <a:cs typeface="+mj-cs"/>
+              </a:defRPr>
+            </a:lvl2pPr>
+            <a:lvl3pPr indent="0">
+              <a:spcBef>
+                <a:spcPct val="20000"/>
+              </a:spcBef>
+              <a:spcAft>
+                <a:spcPts val="600"/>
+              </a:spcAft>
+              <a:buClr>
+                <a:schemeClr val="accent1"/>
+              </a:buClr>
+              <a:buSzPct val="80000"/>
+              <a:buFont typeface="Wingdings 3" charset="2"/>
+              <a:buNone/>
+              <a:defRPr b="1" i="0">
+                <a:latin typeface="+mj-lt"/>
+                <a:ea typeface="+mj-ea"/>
+                <a:cs typeface="+mj-cs"/>
+              </a:defRPr>
+            </a:lvl3pPr>
+            <a:lvl4pPr indent="0">
+              <a:spcBef>
+                <a:spcPct val="20000"/>
+              </a:spcBef>
+              <a:spcAft>
+                <a:spcPts val="600"/>
+              </a:spcAft>
+              <a:buClr>
+                <a:schemeClr val="accent1"/>
+              </a:buClr>
+              <a:buSzPct val="80000"/>
+              <a:buFont typeface="Wingdings 3" charset="2"/>
+              <a:buNone/>
+              <a:defRPr sz="1600" b="1" i="0">
+                <a:latin typeface="+mj-lt"/>
+                <a:ea typeface="+mj-ea"/>
+                <a:cs typeface="+mj-cs"/>
+              </a:defRPr>
+            </a:lvl4pPr>
+            <a:lvl5pPr indent="0">
+              <a:spcBef>
+                <a:spcPct val="20000"/>
+              </a:spcBef>
+              <a:spcAft>
+                <a:spcPts val="600"/>
+              </a:spcAft>
+              <a:buClr>
+                <a:schemeClr val="accent1"/>
+              </a:buClr>
+              <a:buSzPct val="80000"/>
+              <a:buFont typeface="Wingdings 3" charset="2"/>
+              <a:buNone/>
+              <a:defRPr sz="1600" b="1" i="0">
+                <a:latin typeface="+mj-lt"/>
+                <a:ea typeface="+mj-ea"/>
+                <a:cs typeface="+mj-cs"/>
+              </a:defRPr>
+            </a:lvl5pPr>
+            <a:lvl6pPr indent="0">
+              <a:spcBef>
+                <a:spcPct val="20000"/>
+              </a:spcBef>
+              <a:spcAft>
+                <a:spcPts val="600"/>
+              </a:spcAft>
+              <a:buClr>
+                <a:schemeClr val="accent1"/>
+              </a:buClr>
+              <a:buSzPct val="80000"/>
+              <a:buFont typeface="Wingdings 3" charset="2"/>
+              <a:buNone/>
+              <a:defRPr sz="1600" b="1" i="0">
+                <a:latin typeface="+mj-lt"/>
+                <a:ea typeface="+mj-ea"/>
+                <a:cs typeface="+mj-cs"/>
+              </a:defRPr>
+            </a:lvl6pPr>
+            <a:lvl7pPr indent="0">
+              <a:spcBef>
+                <a:spcPct val="20000"/>
+              </a:spcBef>
+              <a:spcAft>
+                <a:spcPts val="600"/>
+              </a:spcAft>
+              <a:buClr>
+                <a:schemeClr val="accent1"/>
+              </a:buClr>
+              <a:buSzPct val="80000"/>
+              <a:buFont typeface="Wingdings 3" charset="2"/>
+              <a:buNone/>
+              <a:defRPr sz="1600" b="1" i="0">
+                <a:latin typeface="+mj-lt"/>
+                <a:ea typeface="+mj-ea"/>
+                <a:cs typeface="+mj-cs"/>
+              </a:defRPr>
+            </a:lvl7pPr>
+            <a:lvl8pPr indent="0">
+              <a:spcBef>
+                <a:spcPct val="20000"/>
+              </a:spcBef>
+              <a:spcAft>
+                <a:spcPts val="600"/>
+              </a:spcAft>
+              <a:buClr>
+                <a:schemeClr val="accent1"/>
+              </a:buClr>
+              <a:buSzPct val="80000"/>
+              <a:buFont typeface="Wingdings 3" charset="2"/>
+              <a:buNone/>
+              <a:defRPr sz="1600" b="1" i="0">
+                <a:latin typeface="+mj-lt"/>
+                <a:ea typeface="+mj-ea"/>
+                <a:cs typeface="+mj-cs"/>
+              </a:defRPr>
+            </a:lvl8pPr>
+            <a:lvl9pPr indent="0">
+              <a:spcBef>
+                <a:spcPct val="20000"/>
+              </a:spcBef>
+              <a:spcAft>
+                <a:spcPts val="600"/>
+              </a:spcAft>
+              <a:buClr>
+                <a:schemeClr val="accent1"/>
+              </a:buClr>
+              <a:buSzPct val="80000"/>
+              <a:buFont typeface="Wingdings 3" charset="2"/>
+              <a:buNone/>
+              <a:defRPr sz="1600" b="1" i="0">
+                <a:latin typeface="+mj-lt"/>
+                <a:ea typeface="+mj-ea"/>
+                <a:cs typeface="+mj-cs"/>
+              </a:defRPr>
+            </a:lvl9pPr>
+          </a:lstStyle>
+          <a:p>
+            <a:r>
+              <a:rPr lang="en-US" dirty="0"/>
+              <a:t>HTTP “Service”</a:t>
+            </a:r>
+          </a:p>
+        </p:txBody>
+      </p:sp>
+    </p:spTree>
+    <p:extLst>
+      <p:ext uri="{BB962C8B-B14F-4D97-AF65-F5344CB8AC3E}">
+        <p14:creationId xmlns:p14="http://schemas.microsoft.com/office/powerpoint/2010/main" val="1685831111"/>
+      </p:ext>
+    </p:extLst>
+  </p:cSld>
+  <p:clrMapOvr>
+    <a:masterClrMapping/>
+  </p:clrMapOvr>
+  <p:timing>
+    <p:tnLst>
+      <p:par>
+        <p:cTn id="1" dur="indefinite" restart="never" nodeType="tmRoot"/>
+      </p:par>
+    </p:tnLst>
+  </p:timing>
+</p:sld>
+</file>
+
+<file path=ppt/slides/slide6.xml><?xml version="1.0" encoding="utf-8"?>
+<p:sld xmlns:a="http://schemas.openxmlformats.org/drawingml/2006/main" xmlns:r="http://schemas.openxmlformats.org/officeDocument/2006/relationships" xmlns:p="http://schemas.openxmlformats.org/presentationml/2006/main">
+  <p:cSld>
+    <p:spTree>
+      <p:nvGrpSpPr>
+        <p:cNvPr id="1" name=""/>
+        <p:cNvGrpSpPr/>
+        <p:nvPr/>
+      </p:nvGrpSpPr>
+      <p:grpSpPr>
+        <a:xfrm>
+          <a:off x="0" y="0"/>
+          <a:ext cx="0" cy="0"/>
+          <a:chOff x="0" y="0"/>
+          <a:chExt cx="0" cy="0"/>
+        </a:xfrm>
+      </p:grpSpPr>
+      <p:sp>
+        <p:nvSpPr>
+          <p:cNvPr id="4" name="Title 3"/>
+          <p:cNvSpPr>
+            <a:spLocks noGrp="1"/>
+          </p:cNvSpPr>
+          <p:nvPr>
+            <p:ph type="title"/>
+          </p:nvPr>
+        </p:nvSpPr>
+        <p:spPr/>
+        <p:txBody>
+          <a:bodyPr/>
+          <a:lstStyle/>
+          <a:p>
+            <a:r>
+              <a:rPr lang="en-US" dirty="0" smtClean="0"/>
+              <a:t>Where does F# shine?</a:t>
+            </a:r>
+            <a:endParaRPr lang="en-US" dirty="0"/>
+          </a:p>
+        </p:txBody>
+      </p:sp>
+      <p:sp>
+        <p:nvSpPr>
+          <p:cNvPr id="5" name="Content Placeholder 4"/>
+          <p:cNvSpPr>
+            <a:spLocks noGrp="1"/>
+          </p:cNvSpPr>
+          <p:nvPr>
+            <p:ph idx="1"/>
+          </p:nvPr>
+        </p:nvSpPr>
+        <p:spPr>
+          <a:xfrm>
+            <a:off x="1103312" y="1443790"/>
+            <a:ext cx="8946541" cy="4804610"/>
+          </a:xfrm>
+        </p:spPr>
+        <p:txBody>
+          <a:bodyPr>
+            <a:noAutofit/>
+          </a:bodyPr>
+          <a:lstStyle/>
+          <a:p>
+            <a:r>
+              <a:rPr lang="en-US" sz="2800" dirty="0" smtClean="0"/>
+              <a:t>Serve functional Web APIs</a:t>
+            </a:r>
+          </a:p>
+          <a:p>
+            <a:r>
+              <a:rPr lang="en-US" sz="2800" dirty="0" smtClean="0"/>
+              <a:t>Consume HTTP with pattern matching</a:t>
+            </a:r>
+          </a:p>
+        </p:txBody>
+      </p:sp>
+    </p:spTree>
+    <p:extLst>
+      <p:ext uri="{BB962C8B-B14F-4D97-AF65-F5344CB8AC3E}">
+        <p14:creationId xmlns:p14="http://schemas.microsoft.com/office/powerpoint/2010/main" val="2010765657"/>
+      </p:ext>
+    </p:extLst>
+  </p:cSld>
+  <p:clrMapOvr>
+    <a:masterClrMapping/>
+  </p:clrMapOvr>
+  <p:timing>
+    <p:tnLst>
+      <p:par>
+        <p:cTn id="1" dur="indefinite" restart="never" nodeType="tmRoot"/>
+      </p:par>
+    </p:tnLst>
+  </p:timing>
+</p:sld>
+</file>
+
+<file path=ppt/slides/slide7.xml><?xml version="1.0" encoding="utf-8"?>
+<p:sld xmlns:a="http://schemas.openxmlformats.org/drawingml/2006/main" xmlns:r="http://schemas.openxmlformats.org/officeDocument/2006/relationships" xmlns:p="http://schemas.openxmlformats.org/presentationml/2006/main">
+  <p:cSld>
+    <p:spTree>
+      <p:nvGrpSpPr>
+        <p:cNvPr id="1" name=""/>
+        <p:cNvGrpSpPr/>
+        <p:nvPr/>
+      </p:nvGrpSpPr>
+      <p:grpSpPr>
+        <a:xfrm>
+          <a:off x="0" y="0"/>
+          <a:ext cx="0" cy="0"/>
+          <a:chOff x="0" y="0"/>
+          <a:chExt cx="0" cy="0"/>
+        </a:xfrm>
+      </p:grpSpPr>
+      <p:sp>
+        <p:nvSpPr>
+          <p:cNvPr id="2" name="Title 1"/>
+          <p:cNvSpPr>
+            <a:spLocks noGrp="1"/>
+          </p:cNvSpPr>
+          <p:nvPr>
+            <p:ph type="title"/>
+          </p:nvPr>
+        </p:nvSpPr>
+        <p:spPr/>
+        <p:txBody>
+          <a:bodyPr/>
+          <a:lstStyle/>
+          <a:p>
+            <a:r>
+              <a:rPr lang="en-US" dirty="0" smtClean="0"/>
+              <a:t>Frank</a:t>
+            </a:r>
+            <a:endParaRPr lang="en-US" dirty="0"/>
+          </a:p>
+        </p:txBody>
+      </p:sp>
+      <p:sp>
+        <p:nvSpPr>
+          <p:cNvPr id="3" name="Content Placeholder 2"/>
+          <p:cNvSpPr>
+            <a:spLocks noGrp="1"/>
+          </p:cNvSpPr>
+          <p:nvPr>
+            <p:ph idx="1"/>
+          </p:nvPr>
+        </p:nvSpPr>
+        <p:spPr/>
+        <p:txBody>
+          <a:bodyPr>
+            <a:normAutofit/>
+          </a:bodyPr>
+          <a:lstStyle/>
+          <a:p>
+            <a:r>
+              <a:rPr lang="en-US" sz="2800" dirty="0" smtClean="0"/>
+              <a:t>F# DSL using </a:t>
+            </a:r>
+            <a:r>
+              <a:rPr lang="en-US" sz="2800" dirty="0" err="1" smtClean="0"/>
+              <a:t>System.Net.Http</a:t>
+            </a:r>
+            <a:endParaRPr lang="en-US" sz="2800" dirty="0" smtClean="0"/>
+          </a:p>
+          <a:p>
+            <a:r>
+              <a:rPr lang="en-US" sz="2800" dirty="0" smtClean="0"/>
+              <a:t>Headers composition</a:t>
+            </a:r>
+          </a:p>
+          <a:p>
+            <a:r>
+              <a:rPr lang="en-US" sz="2800" dirty="0" smtClean="0"/>
+              <a:t>Follows the natural composition of HTTP</a:t>
+            </a:r>
+          </a:p>
+          <a:p>
+            <a:r>
+              <a:rPr lang="en-US" sz="2800" dirty="0" smtClean="0"/>
+              <a:t>Frank Resources == HTTP Resources</a:t>
+            </a:r>
+          </a:p>
+          <a:p>
+            <a:r>
+              <a:rPr lang="en-US" sz="2800" dirty="0" smtClean="0"/>
+              <a:t>Define your own conventions!</a:t>
+            </a:r>
+            <a:endParaRPr lang="en-US" sz="2800" dirty="0"/>
+          </a:p>
+        </p:txBody>
+      </p:sp>
+    </p:spTree>
+    <p:extLst>
+      <p:ext uri="{BB962C8B-B14F-4D97-AF65-F5344CB8AC3E}">
+        <p14:creationId xmlns:p14="http://schemas.microsoft.com/office/powerpoint/2010/main" val="1532543768"/>
+      </p:ext>
+    </p:extLst>
+  </p:cSld>
+  <p:clrMapOvr>
+    <a:masterClrMapping/>
+  </p:clrMapOvr>
+  <mc:AlternateContent xmlns:mc="http://schemas.openxmlformats.org/markup-compatibility/2006">
+    <mc:Choice xmlns:p14="http://schemas.microsoft.com/office/powerpoint/2010/main" Requires="p14">
+      <p:transition spd="slow" p14:dur="2000"/>
+    </mc:Choice>
+    <mc:Fallback>
+      <p:transition spd="slow"/>
+    </mc:Fallback>
+  </mc:AlternateContent>
+  <p:timing>
+    <p:tnLst>
+      <p:par>
+        <p:cTn id="1" dur="indefinite" restart="never" nodeType="tmRoot"/>
+      </p:par>
+    </p:tnLst>
+  </p:timing>
+</p:sld>
+</file>
+
+<file path=ppt/slides/slide8.xml><?xml version="1.0" encoding="utf-8"?>
+<p:sld xmlns:a="http://schemas.openxmlformats.org/drawingml/2006/main" xmlns:r="http://schemas.openxmlformats.org/officeDocument/2006/relationships" xmlns:p="http://schemas.openxmlformats.org/presentationml/2006/main">
+  <p:cSld>
+    <p:spTree>
+      <p:nvGrpSpPr>
+        <p:cNvPr id="1" name=""/>
+        <p:cNvGrpSpPr/>
+        <p:nvPr/>
+      </p:nvGrpSpPr>
+      <p:grpSpPr>
+        <a:xfrm>
+          <a:off x="0" y="0"/>
+          <a:ext cx="0" cy="0"/>
+          <a:chOff x="0" y="0"/>
+          <a:chExt cx="0" cy="0"/>
+        </a:xfrm>
+      </p:grpSpPr>
+      <p:sp>
+        <p:nvSpPr>
+          <p:cNvPr id="2" name="Title 1"/>
+          <p:cNvSpPr>
+            <a:spLocks noGrp="1"/>
+          </p:cNvSpPr>
+          <p:nvPr>
+            <p:ph type="title"/>
+          </p:nvPr>
+        </p:nvSpPr>
+        <p:spPr/>
+        <p:txBody>
+          <a:bodyPr>
+            <a:normAutofit/>
+          </a:bodyPr>
+          <a:lstStyle/>
+          <a:p>
+            <a:r>
+              <a:rPr lang="en-US" dirty="0" smtClean="0"/>
+              <a:t>Simplest HTTP Application</a:t>
+            </a:r>
+            <a:endParaRPr lang="en-US" dirty="0"/>
+          </a:p>
+        </p:txBody>
+      </p:sp>
+      <p:sp>
+        <p:nvSpPr>
+          <p:cNvPr id="3" name="Content Placeholder 2"/>
+          <p:cNvSpPr>
+            <a:spLocks noGrp="1"/>
+          </p:cNvSpPr>
+          <p:nvPr>
+            <p:ph idx="1"/>
+          </p:nvPr>
+        </p:nvSpPr>
+        <p:spPr>
+          <a:xfrm>
+            <a:off x="481263" y="2052918"/>
+            <a:ext cx="11165305" cy="4195481"/>
+          </a:xfrm>
+        </p:spPr>
+        <p:txBody>
+          <a:bodyPr>
+            <a:normAutofit/>
+          </a:bodyPr>
+          <a:lstStyle/>
+          <a:p>
+            <a:pPr marL="0" indent="0" algn="ctr">
+              <a:buNone/>
+            </a:pPr>
+            <a:r>
+              <a:rPr lang="en-US" sz="3200" dirty="0" err="1" smtClean="0">
+                <a:latin typeface="Consolas"/>
+                <a:cs typeface="Consolas"/>
+              </a:rPr>
+              <a:t>HttpRequestMessage</a:t>
+            </a:r>
+            <a:r>
+              <a:rPr lang="en-US" sz="3200" dirty="0" smtClean="0">
+                <a:latin typeface="Consolas"/>
+                <a:cs typeface="Consolas"/>
+              </a:rPr>
+              <a:t> </a:t>
+            </a:r>
+            <a:r>
+              <a:rPr lang="en-US" sz="3200" dirty="0">
+                <a:latin typeface="Consolas"/>
+                <a:cs typeface="Consolas"/>
+              </a:rPr>
+              <a:t>-&gt; </a:t>
+            </a:r>
+            <a:r>
+              <a:rPr lang="en-US" sz="3200" strike="sngStrike" dirty="0">
+                <a:latin typeface="Consolas"/>
+                <a:cs typeface="Consolas"/>
+              </a:rPr>
+              <a:t>HttpResponseMessage</a:t>
+            </a:r>
+          </a:p>
+          <a:p>
+            <a:pPr marL="0" indent="0" algn="ctr">
+              <a:buNone/>
+            </a:pPr>
+            <a:endParaRPr lang="en-US" sz="3200" strike="sngStrike" dirty="0">
+              <a:latin typeface="Monaco" pitchFamily="2" charset="0"/>
+            </a:endParaRPr>
+          </a:p>
+          <a:p>
+            <a:pPr marL="0" indent="0" algn="ctr">
+              <a:buNone/>
+            </a:pPr>
+            <a:r>
+              <a:rPr lang="en-US" sz="3200" dirty="0">
+                <a:latin typeface="Consolas"/>
+                <a:cs typeface="Consolas"/>
+              </a:rPr>
+              <a:t>HttpRequestMessage -&gt; </a:t>
+            </a:r>
+            <a:r>
+              <a:rPr lang="en-US" sz="3200" dirty="0" err="1">
+                <a:latin typeface="Consolas"/>
+                <a:cs typeface="Consolas"/>
+              </a:rPr>
+              <a:t>Async</a:t>
+            </a:r>
+            <a:r>
+              <a:rPr lang="en-US" sz="3200" dirty="0">
+                <a:latin typeface="Consolas"/>
+                <a:cs typeface="Consolas"/>
+              </a:rPr>
+              <a:t>&lt;HttpResponseMessage&gt;</a:t>
+            </a:r>
+          </a:p>
+        </p:txBody>
+      </p:sp>
+    </p:spTree>
+    <p:extLst>
+      <p:ext uri="{BB962C8B-B14F-4D97-AF65-F5344CB8AC3E}">
+        <p14:creationId xmlns:p14="http://schemas.microsoft.com/office/powerpoint/2010/main" val="540654935"/>
+      </p:ext>
+    </p:extLst>
+  </p:cSld>
+  <p:clrMapOvr>
+    <a:masterClrMapping/>
+  </p:clrMapOvr>
+  <mc:AlternateContent xmlns:mc="http://schemas.openxmlformats.org/markup-compatibility/2006">
+    <mc:Choice xmlns:p14="http://schemas.microsoft.com/office/powerpoint/2010/main" Requires="p14">
+      <p:transition spd="slow" p14:dur="2000"/>
+    </mc:Choice>
+    <mc:Fallback>
+      <p:transition spd="slow"/>
+    </mc:Fallback>
+  </mc:AlternateContent>
+  <p:timing>
+    <p:tnLst>
+      <p:par>
+        <p:cTn id="1" dur="indefinite" restart="never" nodeType="tmRoot"/>
+      </p:par>
+    </p:tnLst>
+  </p:timing>
+</p:sld>
+</file>
+
+<file path=ppt/slides/slide9.xml><?xml version="1.0" encoding="utf-8"?>
+<p:sld xmlns:a="http://schemas.openxmlformats.org/drawingml/2006/main" xmlns:r="http://schemas.openxmlformats.org/officeDocument/2006/relationships" xmlns:p="http://schemas.openxmlformats.org/presentationml/2006/main">
+  <p:cSld>
+    <p:spTree>
+      <p:nvGrpSpPr>
+        <p:cNvPr id="1" name=""/>
+        <p:cNvGrpSpPr/>
+        <p:nvPr/>
+      </p:nvGrpSpPr>
+      <p:grpSpPr>
+        <a:xfrm>
+          <a:off x="0" y="0"/>
+          <a:ext cx="0" cy="0"/>
+          <a:chOff x="0" y="0"/>
+          <a:chExt cx="0" cy="0"/>
+        </a:xfrm>
+      </p:grpSpPr>
+      <p:sp>
+        <p:nvSpPr>
+          <p:cNvPr id="2" name="Title 1"/>
+          <p:cNvSpPr>
+            <a:spLocks noGrp="1"/>
+          </p:cNvSpPr>
+          <p:nvPr>
+            <p:ph type="title"/>
+          </p:nvPr>
+        </p:nvSpPr>
+        <p:spPr/>
+        <p:txBody>
+          <a:bodyPr/>
+          <a:lstStyle/>
+          <a:p>
+            <a:r>
+              <a:rPr lang="en-US" dirty="0" smtClean="0"/>
+              <a:t>Define a Method Handler</a:t>
+            </a:r>
+            <a:endParaRPr lang="en-US" dirty="0"/>
+          </a:p>
+        </p:txBody>
+      </p:sp>
+      <p:sp>
+        <p:nvSpPr>
+          <p:cNvPr id="3" name="Content Placeholder 2"/>
+          <p:cNvSpPr>
+            <a:spLocks noGrp="1"/>
+          </p:cNvSpPr>
+          <p:nvPr>
+            <p:ph idx="1"/>
+          </p:nvPr>
+        </p:nvSpPr>
+        <p:spPr>
+          <a:xfrm>
+            <a:off x="445168" y="1696452"/>
+            <a:ext cx="11273590" cy="4551947"/>
+          </a:xfrm>
+        </p:spPr>
+        <p:txBody>
+          <a:bodyPr>
+            <a:noAutofit/>
+          </a:bodyPr>
+          <a:lstStyle/>
+          <a:p>
+            <a:pPr marL="0" indent="0">
+              <a:buNone/>
+            </a:pPr>
+            <a:r>
+              <a:rPr lang="en-US" sz="2800" dirty="0" smtClean="0">
+                <a:latin typeface="Consolas"/>
+                <a:cs typeface="Consolas"/>
+              </a:rPr>
+              <a:t>// </a:t>
+            </a:r>
+            <a:r>
+              <a:rPr lang="en-US" sz="2800" dirty="0">
+                <a:latin typeface="Consolas"/>
+                <a:cs typeface="Consolas"/>
+              </a:rPr>
+              <a:t>handler</a:t>
+            </a:r>
+          </a:p>
+          <a:p>
+            <a:pPr marL="0" indent="0">
+              <a:buNone/>
+            </a:pPr>
+            <a:r>
+              <a:rPr lang="en-US" sz="2800" dirty="0">
+                <a:latin typeface="Consolas"/>
+                <a:cs typeface="Consolas"/>
+              </a:rPr>
+              <a:t>let echo request = </a:t>
+            </a:r>
+            <a:r>
+              <a:rPr lang="en-US" sz="2800" dirty="0" err="1">
+                <a:latin typeface="Consolas"/>
+                <a:cs typeface="Consolas"/>
+              </a:rPr>
+              <a:t>async</a:t>
+            </a:r>
+            <a:r>
+              <a:rPr lang="en-US" sz="2800" dirty="0">
+                <a:latin typeface="Consolas"/>
+                <a:cs typeface="Consolas"/>
+              </a:rPr>
+              <a:t> {</a:t>
+            </a:r>
+          </a:p>
+          <a:p>
+            <a:pPr marL="0" indent="0">
+              <a:buNone/>
+            </a:pPr>
+            <a:r>
+              <a:rPr lang="en-US" sz="2800" dirty="0">
+                <a:latin typeface="Monaco" pitchFamily="2" charset="0"/>
+              </a:rPr>
+              <a:t>  </a:t>
+            </a:r>
+            <a:r>
+              <a:rPr lang="en-US" sz="2800" dirty="0" smtClean="0">
+                <a:latin typeface="Monaco" pitchFamily="2" charset="0"/>
+              </a:rPr>
+              <a:t>  </a:t>
+            </a:r>
+            <a:r>
+              <a:rPr lang="en-US" sz="2800" dirty="0" smtClean="0">
+                <a:latin typeface="Consolas"/>
+                <a:cs typeface="Consolas"/>
+              </a:rPr>
+              <a:t>let</a:t>
+            </a:r>
+            <a:r>
+              <a:rPr lang="en-US" sz="2800" dirty="0">
+                <a:latin typeface="Consolas"/>
+                <a:cs typeface="Consolas"/>
+              </a:rPr>
+              <a:t>! body = </a:t>
+            </a:r>
+            <a:r>
+              <a:rPr lang="en-US" sz="2800" dirty="0" err="1">
+                <a:latin typeface="Consolas"/>
+                <a:cs typeface="Consolas"/>
+              </a:rPr>
+              <a:t>request.Content.AsyncReadAsString</a:t>
+            </a:r>
+            <a:r>
+              <a:rPr lang="en-US" sz="2800" dirty="0">
+                <a:latin typeface="Consolas"/>
+                <a:cs typeface="Consolas"/>
+              </a:rPr>
+              <a:t>()</a:t>
+            </a:r>
+          </a:p>
+          <a:p>
+            <a:pPr marL="0" indent="0">
+              <a:buNone/>
+            </a:pPr>
+            <a:r>
+              <a:rPr lang="en-US" sz="2800" dirty="0">
+                <a:latin typeface="Monaco" pitchFamily="2" charset="0"/>
+              </a:rPr>
+              <a:t>  </a:t>
+            </a:r>
+            <a:r>
+              <a:rPr lang="en-US" sz="2800" dirty="0" smtClean="0">
+                <a:latin typeface="Monaco" pitchFamily="2" charset="0"/>
+              </a:rPr>
+              <a:t>  </a:t>
+            </a:r>
+            <a:r>
+              <a:rPr lang="en-US" sz="2800" dirty="0" smtClean="0">
+                <a:latin typeface="Consolas"/>
+                <a:cs typeface="Consolas"/>
+              </a:rPr>
+              <a:t>return </a:t>
+            </a:r>
+            <a:r>
+              <a:rPr lang="en-US" sz="2800" dirty="0" err="1" smtClean="0">
+                <a:latin typeface="Consolas"/>
+                <a:cs typeface="Consolas"/>
+              </a:rPr>
+              <a:t>request.CreateResponse</a:t>
+            </a:r>
+            <a:r>
+              <a:rPr lang="en-US" sz="2800" dirty="0" smtClean="0">
+                <a:latin typeface="Consolas"/>
+                <a:cs typeface="Consolas"/>
+              </a:rPr>
+              <a:t>(</a:t>
+            </a:r>
+            <a:r>
+              <a:rPr lang="en-US" sz="2800" dirty="0" err="1" smtClean="0">
+                <a:latin typeface="Consolas"/>
+                <a:cs typeface="Consolas"/>
+              </a:rPr>
+              <a:t>HttpStatusCode.OK</a:t>
+            </a:r>
+            <a:r>
+              <a:rPr lang="en-US" sz="2800" dirty="0" smtClean="0">
+                <a:latin typeface="Consolas"/>
+                <a:cs typeface="Consolas"/>
+              </a:rPr>
+              <a:t>, body)</a:t>
+            </a:r>
+            <a:endParaRPr lang="en-US" sz="2800" dirty="0">
+              <a:latin typeface="Consolas"/>
+              <a:cs typeface="Consolas"/>
+            </a:endParaRPr>
+          </a:p>
+          <a:p>
+            <a:pPr marL="0" indent="0">
+              <a:buNone/>
+            </a:pPr>
+            <a:r>
+              <a:rPr lang="en-US" sz="2800" dirty="0" smtClean="0">
+                <a:latin typeface="Consolas"/>
+                <a:cs typeface="Consolas"/>
+              </a:rPr>
+              <a:t>}</a:t>
+            </a:r>
+            <a:endParaRPr lang="en-US" sz="2800" dirty="0">
+              <a:latin typeface="Monaco" pitchFamily="2" charset="0"/>
+            </a:endParaRPr>
+          </a:p>
+          <a:p>
+            <a:pPr marL="0" indent="0">
+              <a:buNone/>
+            </a:pPr>
+            <a:r>
+              <a:rPr lang="en-US" sz="2800" dirty="0">
+                <a:latin typeface="Consolas"/>
+                <a:cs typeface="Consolas"/>
+              </a:rPr>
+              <a:t>// method handler</a:t>
+            </a:r>
+          </a:p>
+          <a:p>
+            <a:pPr marL="0" indent="0">
+              <a:buNone/>
+            </a:pPr>
+            <a:r>
+              <a:rPr lang="en-US" sz="2800" dirty="0">
+                <a:latin typeface="Consolas"/>
+                <a:cs typeface="Consolas"/>
+              </a:rPr>
+              <a:t>get echo</a:t>
+            </a:r>
+          </a:p>
+        </p:txBody>
+      </p:sp>
+    </p:spTree>
+    <p:extLst>
+      <p:ext uri="{BB962C8B-B14F-4D97-AF65-F5344CB8AC3E}">
+        <p14:creationId xmlns:p14="http://schemas.microsoft.com/office/powerpoint/2010/main" val="3462925926"/>
+      </p:ext>
+    </p:extLst>
+  </p:cSld>
+  <p:clrMapOvr>
+    <a:masterClrMapping/>
+  </p:clrMapOvr>
+  <mc:AlternateContent xmlns:mc="http://schemas.openxmlformats.org/markup-compatibility/2006">
+    <mc:Choice xmlns:p14="http://schemas.microsoft.com/office/powerpoint/2010/main" Requires="p14">
+      <p:transition spd="slow" p14:dur="2000"/>
+    </mc:Choice>
+    <mc:Fallback>
       <p:transition spd="slow"/>
     </mc:Fallback>
   </mc:AlternateContent>

</xml_diff>

<commit_message>
Added an OO design example to the Web API deck
</commit_message>
<xml_diff>
--- a/WebApi.pptx
+++ b/WebApi.pptx
@@ -5,7 +5,7 @@
     <p:sldMasterId id="2147483648" r:id="rId1"/>
   </p:sldMasterIdLst>
   <p:notesMasterIdLst>
-    <p:notesMasterId r:id="rId14"/>
+    <p:notesMasterId r:id="rId15"/>
   </p:notesMasterIdLst>
   <p:sldIdLst>
     <p:sldId id="256" r:id="rId2"/>
@@ -14,12 +14,13 @@
     <p:sldId id="269" r:id="rId5"/>
     <p:sldId id="271" r:id="rId6"/>
     <p:sldId id="281" r:id="rId7"/>
-    <p:sldId id="274" r:id="rId8"/>
-    <p:sldId id="275" r:id="rId9"/>
-    <p:sldId id="276" r:id="rId10"/>
-    <p:sldId id="277" r:id="rId11"/>
-    <p:sldId id="278" r:id="rId12"/>
-    <p:sldId id="266" r:id="rId13"/>
+    <p:sldId id="282" r:id="rId8"/>
+    <p:sldId id="274" r:id="rId9"/>
+    <p:sldId id="275" r:id="rId10"/>
+    <p:sldId id="276" r:id="rId11"/>
+    <p:sldId id="277" r:id="rId12"/>
+    <p:sldId id="278" r:id="rId13"/>
+    <p:sldId id="266" r:id="rId14"/>
   </p:sldIdLst>
   <p:sldSz cx="12192000" cy="6858000"/>
   <p:notesSz cx="6858000" cy="9144000"/>
@@ -129,6 +130,7 @@
             <p14:sldId id="269"/>
             <p14:sldId id="271"/>
             <p14:sldId id="281"/>
+            <p14:sldId id="282"/>
             <p14:sldId id="274"/>
             <p14:sldId id="275"/>
             <p14:sldId id="276"/>
@@ -647,6 +649,111 @@
           <a:p>
             <a:r>
               <a:rPr lang="en-US" dirty="0" smtClean="0"/>
+              <a:t>A resource is the only curren</a:t>
+            </a:r>
+            <a:r>
+              <a:rPr lang="en-US" baseline="0" dirty="0" smtClean="0"/>
+              <a:t>t location that does not conform solely to the Frank application signature. A resource holds both a Uri Template (its name) as well as a HttpRequestMessage -&gt; </a:t>
+            </a:r>
+            <a:r>
+              <a:rPr lang="en-US" baseline="0" dirty="0" err="1" smtClean="0"/>
+              <a:t>Async</a:t>
+            </a:r>
+            <a:r>
+              <a:rPr lang="en-US" baseline="0" dirty="0" smtClean="0"/>
+              <a:t>&lt;HttpResponseMessage&gt; option. Why the option? The resource will respond with a 405 Method Not Allowed if it does not respond to the method thrown its way. Thus the option allows the programmer to define the methods for the resource without having to manually hook up the 405 response.</a:t>
+            </a:r>
+            <a:endParaRPr lang="en-US" dirty="0"/>
+          </a:p>
+        </p:txBody>
+      </p:sp>
+      <p:sp>
+        <p:nvSpPr>
+          <p:cNvPr id="4" name="Slide Number Placeholder 3"/>
+          <p:cNvSpPr>
+            <a:spLocks noGrp="1"/>
+          </p:cNvSpPr>
+          <p:nvPr>
+            <p:ph type="sldNum" sz="quarter" idx="10"/>
+          </p:nvPr>
+        </p:nvSpPr>
+        <p:spPr/>
+        <p:txBody>
+          <a:bodyPr/>
+          <a:lstStyle/>
+          <a:p>
+            <a:fld id="{A5FD7785-0E15-469E-85B3-F8AF7D47EE69}" type="slidenum">
+              <a:rPr lang="en-US" smtClean="0"/>
+              <a:t>11</a:t>
+            </a:fld>
+            <a:endParaRPr lang="en-US"/>
+          </a:p>
+        </p:txBody>
+      </p:sp>
+    </p:spTree>
+    <p:extLst>
+      <p:ext uri="{BB962C8B-B14F-4D97-AF65-F5344CB8AC3E}">
+        <p14:creationId xmlns:p14="http://schemas.microsoft.com/office/powerpoint/2010/main" val="3397532311"/>
+      </p:ext>
+    </p:extLst>
+  </p:cSld>
+  <p:clrMapOvr>
+    <a:masterClrMapping/>
+  </p:clrMapOvr>
+</p:notes>
+</file>
+
+<file path=ppt/notesSlides/notesSlide11.xml><?xml version="1.0" encoding="utf-8"?>
+<p:notes xmlns:a="http://schemas.openxmlformats.org/drawingml/2006/main" xmlns:r="http://schemas.openxmlformats.org/officeDocument/2006/relationships" xmlns:p="http://schemas.openxmlformats.org/presentationml/2006/main">
+  <p:cSld>
+    <p:spTree>
+      <p:nvGrpSpPr>
+        <p:cNvPr id="1" name=""/>
+        <p:cNvGrpSpPr/>
+        <p:nvPr/>
+      </p:nvGrpSpPr>
+      <p:grpSpPr>
+        <a:xfrm>
+          <a:off x="0" y="0"/>
+          <a:ext cx="0" cy="0"/>
+          <a:chOff x="0" y="0"/>
+          <a:chExt cx="0" cy="0"/>
+        </a:xfrm>
+      </p:grpSpPr>
+      <p:sp>
+        <p:nvSpPr>
+          <p:cNvPr id="2" name="Slide Image Placeholder 1"/>
+          <p:cNvSpPr>
+            <a:spLocks noGrp="1" noRot="1" noChangeAspect="1"/>
+          </p:cNvSpPr>
+          <p:nvPr>
+            <p:ph type="sldImg"/>
+          </p:nvPr>
+        </p:nvSpPr>
+        <p:spPr>
+          <a:xfrm>
+            <a:off x="381000" y="685800"/>
+            <a:ext cx="6096000" cy="3429000"/>
+          </a:xfrm>
+        </p:spPr>
+      </p:sp>
+      <p:sp>
+        <p:nvSpPr>
+          <p:cNvPr id="3" name="Notes Placeholder 2"/>
+          <p:cNvSpPr>
+            <a:spLocks noGrp="1"/>
+          </p:cNvSpPr>
+          <p:nvPr>
+            <p:ph type="body" idx="1"/>
+          </p:nvPr>
+        </p:nvSpPr>
+        <p:spPr/>
+        <p:txBody>
+          <a:bodyPr/>
+          <a:lstStyle/>
+          <a:p>
+            <a:r>
+              <a:rPr lang="en-US" dirty="0" smtClean="0"/>
               <a:t>Similar</a:t>
             </a:r>
             <a:r>
@@ -690,7 +797,7 @@
           <a:p>
             <a:fld id="{A5FD7785-0E15-469E-85B3-F8AF7D47EE69}" type="slidenum">
               <a:rPr lang="en-US" smtClean="0"/>
-              <a:t>11</a:t>
+              <a:t>12</a:t>
             </a:fld>
             <a:endParaRPr lang="en-US"/>
           </a:p>
@@ -1140,19 +1247,11 @@
           <a:p>
             <a:r>
               <a:rPr lang="en-US" dirty="0" smtClean="0"/>
-              <a:t>For those with a stronger</a:t>
+              <a:t>HTTP defines several components that</a:t>
             </a:r>
             <a:r>
               <a:rPr lang="en-US" baseline="0" dirty="0" smtClean="0"/>
-              <a:t> bent towards building web sites, Mauricio </a:t>
-            </a:r>
-            <a:r>
-              <a:rPr lang="en-US" baseline="0" dirty="0" err="1" smtClean="0"/>
-              <a:t>Scheffer’s</a:t>
-            </a:r>
-            <a:r>
-              <a:rPr lang="en-US" baseline="0" dirty="0" smtClean="0"/>
-              <a:t> Figment may be a closer match to your taste.</a:t>
+              <a:t> allow distributed, loosely-coupled agents to communicate. The first lines of requests and responses are standardized to ensure that loosely-coupled components can understand one another, yet they allow for extension either by standards bodies or for internal, proprietary use.</a:t>
             </a:r>
             <a:endParaRPr lang="en-US" dirty="0"/>
           </a:p>
@@ -1184,7 +1283,7 @@
     </p:spTree>
     <p:extLst>
       <p:ext uri="{BB962C8B-B14F-4D97-AF65-F5344CB8AC3E}">
-        <p14:creationId xmlns:p14="http://schemas.microsoft.com/office/powerpoint/2010/main" val="1706336117"/>
+        <p14:creationId xmlns:p14="http://schemas.microsoft.com/office/powerpoint/2010/main" val="2119160372"/>
       </p:ext>
     </p:extLst>
   </p:cSld>
@@ -1245,43 +1344,19 @@
           <a:p>
             <a:r>
               <a:rPr lang="en-US" dirty="0" smtClean="0"/>
-              <a:t>Compare</a:t>
+              <a:t>For those with a stronger</a:t>
             </a:r>
             <a:r>
               <a:rPr lang="en-US" baseline="0" dirty="0" smtClean="0"/>
-              <a:t> the Frank application signature with the simplest app signature we used above. The only addition is that we are stating that an application is non-blocking. This is the same idea as is used in node.js. It’s also sort-of required since Frank sits on </a:t>
+              <a:t> bent towards building web sites, Mauricio </a:t>
             </a:r>
             <a:r>
               <a:rPr lang="en-US" baseline="0" dirty="0" err="1" smtClean="0"/>
-              <a:t>System.Net.Http</a:t>
+              <a:t>Scheffer’s</a:t>
             </a:r>
             <a:r>
               <a:rPr lang="en-US" baseline="0" dirty="0" smtClean="0"/>
-              <a:t> via </a:t>
-            </a:r>
-            <a:r>
-              <a:rPr lang="en-US" baseline="0" dirty="0" err="1" smtClean="0"/>
-              <a:t>MessageHandlers</a:t>
-            </a:r>
-            <a:r>
-              <a:rPr lang="en-US" baseline="0" dirty="0" smtClean="0"/>
-              <a:t>. The signature for the </a:t>
-            </a:r>
-            <a:r>
-              <a:rPr lang="en-US" baseline="0" dirty="0" err="1" smtClean="0"/>
-              <a:t>MessageHandler.SendAsync</a:t>
-            </a:r>
-            <a:r>
-              <a:rPr lang="en-US" baseline="0" dirty="0" smtClean="0"/>
-              <a:t> is the same but for Task rather than </a:t>
-            </a:r>
-            <a:r>
-              <a:rPr lang="en-US" baseline="0" dirty="0" err="1" smtClean="0"/>
-              <a:t>Async</a:t>
-            </a:r>
-            <a:r>
-              <a:rPr lang="en-US" baseline="0" dirty="0" smtClean="0"/>
-              <a:t>. This signature extends all the way through all layers of composition.</a:t>
+              <a:t> Figment may be a closer match to your taste.</a:t>
             </a:r>
             <a:endParaRPr lang="en-US" dirty="0"/>
           </a:p>
@@ -1313,7 +1388,7 @@
     </p:spTree>
     <p:extLst>
       <p:ext uri="{BB962C8B-B14F-4D97-AF65-F5344CB8AC3E}">
-        <p14:creationId xmlns:p14="http://schemas.microsoft.com/office/powerpoint/2010/main" val="809592611"/>
+        <p14:creationId xmlns:p14="http://schemas.microsoft.com/office/powerpoint/2010/main" val="1706336117"/>
       </p:ext>
     </p:extLst>
   </p:cSld>
@@ -1372,7 +1447,47 @@
           <a:bodyPr/>
           <a:lstStyle/>
           <a:p>
-            <a:endParaRPr lang="en-US"/>
+            <a:r>
+              <a:rPr lang="en-US" dirty="0" smtClean="0"/>
+              <a:t>Compare</a:t>
+            </a:r>
+            <a:r>
+              <a:rPr lang="en-US" baseline="0" dirty="0" smtClean="0"/>
+              <a:t> the Frank application signature with the simplest app signature we used above. The only addition is that we are stating that an application is non-blocking. This is the same idea as is used in node.js. It’s also sort-of required since Frank sits on </a:t>
+            </a:r>
+            <a:r>
+              <a:rPr lang="en-US" baseline="0" dirty="0" err="1" smtClean="0"/>
+              <a:t>System.Net.Http</a:t>
+            </a:r>
+            <a:r>
+              <a:rPr lang="en-US" baseline="0" dirty="0" smtClean="0"/>
+              <a:t> via </a:t>
+            </a:r>
+            <a:r>
+              <a:rPr lang="en-US" baseline="0" dirty="0" err="1" smtClean="0"/>
+              <a:t>MessageHandlers</a:t>
+            </a:r>
+            <a:r>
+              <a:rPr lang="en-US" baseline="0" dirty="0" smtClean="0"/>
+              <a:t>. The signature for the </a:t>
+            </a:r>
+            <a:r>
+              <a:rPr lang="en-US" baseline="0" dirty="0" err="1" smtClean="0"/>
+              <a:t>MessageHandler.SendAsync</a:t>
+            </a:r>
+            <a:r>
+              <a:rPr lang="en-US" baseline="0" dirty="0" smtClean="0"/>
+              <a:t> is the same but for Task rather than </a:t>
+            </a:r>
+            <a:r>
+              <a:rPr lang="en-US" baseline="0" dirty="0" err="1" smtClean="0"/>
+              <a:t>Async</a:t>
+            </a:r>
+            <a:r>
+              <a:rPr lang="en-US" baseline="0" dirty="0" smtClean="0"/>
+              <a:t>. This signature extends all the way through all layers of composition.</a:t>
+            </a:r>
+            <a:endParaRPr lang="en-US" dirty="0"/>
           </a:p>
         </p:txBody>
       </p:sp>
@@ -1402,7 +1517,7 @@
     </p:spTree>
     <p:extLst>
       <p:ext uri="{BB962C8B-B14F-4D97-AF65-F5344CB8AC3E}">
-        <p14:creationId xmlns:p14="http://schemas.microsoft.com/office/powerpoint/2010/main" val="1749080848"/>
+        <p14:creationId xmlns:p14="http://schemas.microsoft.com/office/powerpoint/2010/main" val="809592611"/>
       </p:ext>
     </p:extLst>
   </p:cSld>
@@ -1461,23 +1576,7 @@
           <a:bodyPr/>
           <a:lstStyle/>
           <a:p>
-            <a:r>
-              <a:rPr lang="en-US" dirty="0" smtClean="0"/>
-              <a:t>A resource is the only curren</a:t>
-            </a:r>
-            <a:r>
-              <a:rPr lang="en-US" baseline="0" dirty="0" smtClean="0"/>
-              <a:t>t location that does not conform solely to the Frank application signature. A resource holds both a Uri Template (its name) as well as a HttpRequestMessage -&gt; </a:t>
-            </a:r>
-            <a:r>
-              <a:rPr lang="en-US" baseline="0" dirty="0" err="1" smtClean="0"/>
-              <a:t>Async</a:t>
-            </a:r>
-            <a:r>
-              <a:rPr lang="en-US" baseline="0" dirty="0" smtClean="0"/>
-              <a:t>&lt;HttpResponseMessage&gt; option. Why the option? The resource will respond with a 405 Method Not Allowed if it does not respond to the method thrown its way. Thus the option allows the programmer to define the methods for the resource without having to manually hook up the 405 response.</a:t>
-            </a:r>
-            <a:endParaRPr lang="en-US" dirty="0"/>
+            <a:endParaRPr lang="en-US"/>
           </a:p>
         </p:txBody>
       </p:sp>
@@ -1507,7 +1606,7 @@
     </p:spTree>
     <p:extLst>
       <p:ext uri="{BB962C8B-B14F-4D97-AF65-F5344CB8AC3E}">
-        <p14:creationId xmlns:p14="http://schemas.microsoft.com/office/powerpoint/2010/main" val="3397532311"/>
+        <p14:creationId xmlns:p14="http://schemas.microsoft.com/office/powerpoint/2010/main" val="1749080848"/>
       </p:ext>
     </p:extLst>
   </p:cSld>
@@ -8478,7 +8577,7 @@
           <a:p>
             <a:r>
               <a:rPr lang="en-US" dirty="0" smtClean="0"/>
-              <a:t>Define a Resource</a:t>
+              <a:t>Define a Method Handler</a:t>
             </a:r>
             <a:endParaRPr lang="en-US" dirty="0"/>
           </a:p>
@@ -8486,7 +8585,7 @@
       </p:sp>
       <p:sp>
         <p:nvSpPr>
-          <p:cNvPr id="4" name="Content Placeholder 2"/>
+          <p:cNvPr id="3" name="Content Placeholder 2"/>
           <p:cNvSpPr>
             <a:spLocks noGrp="1"/>
           </p:cNvSpPr>
@@ -8496,13 +8595,13 @@
         </p:nvSpPr>
         <p:spPr>
           <a:xfrm>
-            <a:off x="646111" y="1997631"/>
-            <a:ext cx="11000457" cy="3869823"/>
+            <a:off x="445168" y="1696452"/>
+            <a:ext cx="11273590" cy="4551947"/>
           </a:xfrm>
         </p:spPr>
         <p:txBody>
           <a:bodyPr>
-            <a:normAutofit/>
+            <a:noAutofit/>
           </a:bodyPr>
           <a:lstStyle/>
           <a:p>
@@ -8514,21 +8613,26 @@
                 <a:latin typeface="Consolas"/>
                 <a:cs typeface="Consolas"/>
               </a:rPr>
-              <a:t>let </a:t>
-            </a:r>
-            <a:r>
-              <a:rPr lang="en-US" sz="2800" dirty="0" err="1">
-                <a:latin typeface="Consolas"/>
-                <a:cs typeface="Consolas"/>
-              </a:rPr>
-              <a:t>helloworld</a:t>
+              <a:t>// </a:t>
             </a:r>
             <a:r>
               <a:rPr lang="en-US" sz="2800" dirty="0">
                 <a:latin typeface="Consolas"/>
                 <a:cs typeface="Consolas"/>
               </a:rPr>
-              <a:t> request = </a:t>
+              <a:t>handler</a:t>
+            </a:r>
+          </a:p>
+          <a:p>
+            <a:pPr marL="0" indent="0">
+              <a:buNone/>
+            </a:pPr>
+            <a:r>
+              <a:rPr lang="en-US" sz="2800" dirty="0">
+                <a:latin typeface="Consolas"/>
+                <a:cs typeface="Consolas"/>
+              </a:rPr>
+              <a:t>let echo request = </a:t>
             </a:r>
             <a:r>
               <a:rPr lang="en-US" sz="2800" dirty="0" err="1">
@@ -8542,39 +8646,121 @@
                 <a:latin typeface="Consolas"/>
                 <a:cs typeface="Consolas"/>
               </a:rPr>
-              <a:t> { … }</a:t>
+              <a:t> {</a:t>
             </a:r>
           </a:p>
           <a:p>
             <a:pPr marL="0" indent="0">
               <a:buNone/>
             </a:pPr>
+            <a:r>
+              <a:rPr lang="en-US" sz="2800" dirty="0">
+                <a:latin typeface="Monaco" pitchFamily="2" charset="0"/>
+              </a:rPr>
+              <a:t>  </a:t>
+            </a:r>
+            <a:r>
+              <a:rPr lang="en-US" sz="2800" dirty="0" smtClean="0">
+                <a:latin typeface="Monaco" pitchFamily="2" charset="0"/>
+              </a:rPr>
+              <a:t>  </a:t>
+            </a:r>
+            <a:r>
+              <a:rPr lang="en-US" sz="2800" dirty="0" smtClean="0">
+                <a:latin typeface="Consolas"/>
+                <a:cs typeface="Consolas"/>
+              </a:rPr>
+              <a:t>let</a:t>
+            </a:r>
             <a:r>
               <a:rPr lang="en-US" sz="2800" dirty="0">
                 <a:latin typeface="Consolas"/>
                 <a:cs typeface="Consolas"/>
               </a:rPr>
-              <a:t>let echo request = </a:t>
+              <a:t>! body = </a:t>
             </a:r>
             <a:r>
               <a:rPr lang="en-US" sz="2800" dirty="0" err="1">
                 <a:latin typeface="Consolas"/>
                 <a:cs typeface="Consolas"/>
               </a:rPr>
-              <a:t>async</a:t>
+              <a:t>request.Content.AsyncReadAsString</a:t>
             </a:r>
             <a:r>
               <a:rPr lang="en-US" sz="2800" dirty="0">
                 <a:latin typeface="Consolas"/>
                 <a:cs typeface="Consolas"/>
               </a:rPr>
-              <a:t> { … }</a:t>
+              <a:t>()</a:t>
             </a:r>
           </a:p>
           <a:p>
             <a:pPr marL="0" indent="0">
               <a:buNone/>
             </a:pPr>
+            <a:r>
+              <a:rPr lang="en-US" sz="2800" dirty="0">
+                <a:latin typeface="Monaco" pitchFamily="2" charset="0"/>
+              </a:rPr>
+              <a:t>  </a:t>
+            </a:r>
+            <a:r>
+              <a:rPr lang="en-US" sz="2800" dirty="0" smtClean="0">
+                <a:latin typeface="Monaco" pitchFamily="2" charset="0"/>
+              </a:rPr>
+              <a:t>  </a:t>
+            </a:r>
+            <a:r>
+              <a:rPr lang="en-US" sz="2800" dirty="0" smtClean="0">
+                <a:latin typeface="Consolas"/>
+                <a:cs typeface="Consolas"/>
+              </a:rPr>
+              <a:t>return </a:t>
+            </a:r>
+            <a:r>
+              <a:rPr lang="en-US" sz="2800" dirty="0" err="1" smtClean="0">
+                <a:latin typeface="Consolas"/>
+                <a:cs typeface="Consolas"/>
+              </a:rPr>
+              <a:t>request.CreateResponse</a:t>
+            </a:r>
+            <a:r>
+              <a:rPr lang="en-US" sz="2800" dirty="0" smtClean="0">
+                <a:latin typeface="Consolas"/>
+                <a:cs typeface="Consolas"/>
+              </a:rPr>
+              <a:t>(</a:t>
+            </a:r>
+            <a:r>
+              <a:rPr lang="en-US" sz="2800" dirty="0" err="1" smtClean="0">
+                <a:latin typeface="Consolas"/>
+                <a:cs typeface="Consolas"/>
+              </a:rPr>
+              <a:t>HttpStatusCode.OK</a:t>
+            </a:r>
+            <a:r>
+              <a:rPr lang="en-US" sz="2800" dirty="0" smtClean="0">
+                <a:latin typeface="Consolas"/>
+                <a:cs typeface="Consolas"/>
+              </a:rPr>
+              <a:t>, body)</a:t>
+            </a:r>
+            <a:endParaRPr lang="en-US" sz="2800" dirty="0">
+              <a:latin typeface="Consolas"/>
+              <a:cs typeface="Consolas"/>
+            </a:endParaRPr>
+          </a:p>
+          <a:p>
+            <a:pPr marL="0" indent="0">
+              <a:buNone/>
+            </a:pPr>
+            <a:r>
+              <a:rPr lang="en-US" sz="2800" dirty="0" smtClean="0">
+                <a:latin typeface="Consolas"/>
+                <a:cs typeface="Consolas"/>
+              </a:rPr>
+              <a:t>}</a:t>
+            </a:r>
             <a:endParaRPr lang="en-US" sz="2800" dirty="0">
               <a:latin typeface="Monaco" pitchFamily="2" charset="0"/>
             </a:endParaRPr>
@@ -8588,21 +8774,19 @@
                 <a:latin typeface="Consolas"/>
                 <a:cs typeface="Consolas"/>
               </a:rPr>
-              <a:t>let resource = route “/” (get </a:t>
-            </a:r>
-            <a:r>
-              <a:rPr lang="en-US" sz="2800" dirty="0" err="1">
-                <a:latin typeface="Consolas"/>
-                <a:cs typeface="Consolas"/>
-              </a:rPr>
-              <a:t>helloworld</a:t>
-            </a:r>
+              <a:t>// method handler</a:t>
+            </a:r>
+          </a:p>
+          <a:p>
+            <a:pPr marL="0" indent="0">
+              <a:buNone/>
+            </a:pPr>
             <a:r>
               <a:rPr lang="en-US" sz="2800" dirty="0">
                 <a:latin typeface="Consolas"/>
                 <a:cs typeface="Consolas"/>
               </a:rPr>
-              <a:t> &lt;|&gt; post echo)</a:t>
+              <a:t>get echo</a:t>
             </a:r>
           </a:p>
         </p:txBody>
@@ -8610,7 +8794,7 @@
     </p:spTree>
     <p:extLst>
       <p:ext uri="{BB962C8B-B14F-4D97-AF65-F5344CB8AC3E}">
-        <p14:creationId xmlns:p14="http://schemas.microsoft.com/office/powerpoint/2010/main" val="2148083016"/>
+        <p14:creationId xmlns:p14="http://schemas.microsoft.com/office/powerpoint/2010/main" val="3462925926"/>
       </p:ext>
     </p:extLst>
   </p:cSld>
@@ -8669,6 +8853,197 @@
           <a:p>
             <a:r>
               <a:rPr lang="en-US" dirty="0" smtClean="0"/>
+              <a:t>Define a Resource</a:t>
+            </a:r>
+            <a:endParaRPr lang="en-US" dirty="0"/>
+          </a:p>
+        </p:txBody>
+      </p:sp>
+      <p:sp>
+        <p:nvSpPr>
+          <p:cNvPr id="4" name="Content Placeholder 2"/>
+          <p:cNvSpPr>
+            <a:spLocks noGrp="1"/>
+          </p:cNvSpPr>
+          <p:nvPr>
+            <p:ph idx="1"/>
+          </p:nvPr>
+        </p:nvSpPr>
+        <p:spPr>
+          <a:xfrm>
+            <a:off x="646111" y="1997631"/>
+            <a:ext cx="11000457" cy="3869823"/>
+          </a:xfrm>
+        </p:spPr>
+        <p:txBody>
+          <a:bodyPr>
+            <a:normAutofit/>
+          </a:bodyPr>
+          <a:lstStyle/>
+          <a:p>
+            <a:pPr marL="0" indent="0">
+              <a:buNone/>
+            </a:pPr>
+            <a:r>
+              <a:rPr lang="en-US" sz="2800" dirty="0" smtClean="0">
+                <a:latin typeface="Consolas"/>
+                <a:cs typeface="Consolas"/>
+              </a:rPr>
+              <a:t>let </a:t>
+            </a:r>
+            <a:r>
+              <a:rPr lang="en-US" sz="2800" dirty="0" err="1">
+                <a:latin typeface="Consolas"/>
+                <a:cs typeface="Consolas"/>
+              </a:rPr>
+              <a:t>helloworld</a:t>
+            </a:r>
+            <a:r>
+              <a:rPr lang="en-US" sz="2800" dirty="0">
+                <a:latin typeface="Consolas"/>
+                <a:cs typeface="Consolas"/>
+              </a:rPr>
+              <a:t> request = </a:t>
+            </a:r>
+            <a:r>
+              <a:rPr lang="en-US" sz="2800" dirty="0" err="1">
+                <a:latin typeface="Consolas"/>
+                <a:cs typeface="Consolas"/>
+              </a:rPr>
+              <a:t>async</a:t>
+            </a:r>
+            <a:r>
+              <a:rPr lang="en-US" sz="2800" dirty="0">
+                <a:latin typeface="Consolas"/>
+                <a:cs typeface="Consolas"/>
+              </a:rPr>
+              <a:t> { … }</a:t>
+            </a:r>
+          </a:p>
+          <a:p>
+            <a:pPr marL="0" indent="0">
+              <a:buNone/>
+            </a:pPr>
+            <a:r>
+              <a:rPr lang="en-US" sz="2800" dirty="0">
+                <a:latin typeface="Consolas"/>
+                <a:cs typeface="Consolas"/>
+              </a:rPr>
+              <a:t>let echo request = </a:t>
+            </a:r>
+            <a:r>
+              <a:rPr lang="en-US" sz="2800" dirty="0" err="1">
+                <a:latin typeface="Consolas"/>
+                <a:cs typeface="Consolas"/>
+              </a:rPr>
+              <a:t>async</a:t>
+            </a:r>
+            <a:r>
+              <a:rPr lang="en-US" sz="2800" dirty="0">
+                <a:latin typeface="Consolas"/>
+                <a:cs typeface="Consolas"/>
+              </a:rPr>
+              <a:t> { … }</a:t>
+            </a:r>
+          </a:p>
+          <a:p>
+            <a:pPr marL="0" indent="0">
+              <a:buNone/>
+            </a:pPr>
+            <a:endParaRPr lang="en-US" sz="2800" dirty="0">
+              <a:latin typeface="Monaco" pitchFamily="2" charset="0"/>
+            </a:endParaRPr>
+          </a:p>
+          <a:p>
+            <a:pPr marL="0" indent="0">
+              <a:buNone/>
+            </a:pPr>
+            <a:r>
+              <a:rPr lang="en-US" sz="2800" dirty="0">
+                <a:latin typeface="Consolas"/>
+                <a:cs typeface="Consolas"/>
+              </a:rPr>
+              <a:t>let resource = route “/” (get </a:t>
+            </a:r>
+            <a:r>
+              <a:rPr lang="en-US" sz="2800" dirty="0" err="1">
+                <a:latin typeface="Consolas"/>
+                <a:cs typeface="Consolas"/>
+              </a:rPr>
+              <a:t>helloworld</a:t>
+            </a:r>
+            <a:r>
+              <a:rPr lang="en-US" sz="2800" dirty="0">
+                <a:latin typeface="Consolas"/>
+                <a:cs typeface="Consolas"/>
+              </a:rPr>
+              <a:t> &lt;|&gt; post echo)</a:t>
+            </a:r>
+          </a:p>
+        </p:txBody>
+      </p:sp>
+    </p:spTree>
+    <p:extLst>
+      <p:ext uri="{BB962C8B-B14F-4D97-AF65-F5344CB8AC3E}">
+        <p14:creationId xmlns:p14="http://schemas.microsoft.com/office/powerpoint/2010/main" val="2148083016"/>
+      </p:ext>
+    </p:extLst>
+  </p:cSld>
+  <p:clrMapOvr>
+    <a:masterClrMapping/>
+  </p:clrMapOvr>
+  <mc:AlternateContent xmlns:mc="http://schemas.openxmlformats.org/markup-compatibility/2006">
+    <mc:Choice xmlns:p14="http://schemas.microsoft.com/office/powerpoint/2010/main" Requires="p14">
+      <p:transition spd="slow" p14:dur="2000"/>
+    </mc:Choice>
+    <mc:Fallback>
+      <p:transition spd="slow"/>
+    </mc:Fallback>
+  </mc:AlternateContent>
+  <p:timing>
+    <p:tnLst>
+      <p:par>
+        <p:cTn id="1" dur="indefinite" restart="never" nodeType="tmRoot"/>
+      </p:par>
+    </p:tnLst>
+  </p:timing>
+</p:sld>
+</file>
+
+<file path=ppt/slides/slide12.xml><?xml version="1.0" encoding="utf-8"?>
+<p:sld xmlns:a="http://schemas.openxmlformats.org/drawingml/2006/main" xmlns:r="http://schemas.openxmlformats.org/officeDocument/2006/relationships" xmlns:p="http://schemas.openxmlformats.org/presentationml/2006/main">
+  <p:cSld>
+    <p:spTree>
+      <p:nvGrpSpPr>
+        <p:cNvPr id="1" name=""/>
+        <p:cNvGrpSpPr/>
+        <p:nvPr/>
+      </p:nvGrpSpPr>
+      <p:grpSpPr>
+        <a:xfrm>
+          <a:off x="0" y="0"/>
+          <a:ext cx="0" cy="0"/>
+          <a:chOff x="0" y="0"/>
+          <a:chExt cx="0" cy="0"/>
+        </a:xfrm>
+      </p:grpSpPr>
+      <p:sp>
+        <p:nvSpPr>
+          <p:cNvPr id="2" name="Title 1"/>
+          <p:cNvSpPr>
+            <a:spLocks noGrp="1"/>
+          </p:cNvSpPr>
+          <p:nvPr>
+            <p:ph type="title"/>
+          </p:nvPr>
+        </p:nvSpPr>
+        <p:spPr/>
+        <p:txBody>
+          <a:bodyPr/>
+          <a:lstStyle/>
+          <a:p>
+            <a:r>
+              <a:rPr lang="en-US" dirty="0" smtClean="0"/>
               <a:t>Define an Application</a:t>
             </a:r>
             <a:endParaRPr lang="en-US" dirty="0"/>
@@ -8840,7 +9215,7 @@
 </p:sld>
 </file>
 
-<file path=ppt/slides/slide12.xml><?xml version="1.0" encoding="utf-8"?>
+<file path=ppt/slides/slide13.xml><?xml version="1.0" encoding="utf-8"?>
 <p:sld xmlns:a="http://schemas.openxmlformats.org/drawingml/2006/main" xmlns:r="http://schemas.openxmlformats.org/officeDocument/2006/relationships" xmlns:p="http://schemas.openxmlformats.org/presentationml/2006/main">
   <p:cSld>
     <p:spTree>
@@ -10195,47 +10570,53 @@
           <a:p>
             <a:r>
               <a:rPr lang="en-US" dirty="0" smtClean="0"/>
-              <a:t>Where does F# shine?</a:t>
+              <a:t>Web API with an OO Approach</a:t>
             </a:r>
             <a:endParaRPr lang="en-US" dirty="0"/>
           </a:p>
         </p:txBody>
       </p:sp>
-      <p:sp>
-        <p:nvSpPr>
-          <p:cNvPr id="5" name="Content Placeholder 4"/>
-          <p:cNvSpPr>
-            <a:spLocks noGrp="1"/>
-          </p:cNvSpPr>
-          <p:nvPr>
-            <p:ph idx="1"/>
-          </p:nvPr>
-        </p:nvSpPr>
-        <p:spPr>
+      <p:pic>
+        <p:nvPicPr>
+          <p:cNvPr id="1028" name="Picture 4" descr="http://3.bp.blogspot.com/-xGXlMzbGvGM/Udm5quz2WPI/AAAAAAAAAMI/9lhV3ui9gRw/s400/FsAngularTemplate.PNG"/>
+          <p:cNvPicPr>
+            <a:picLocks noChangeAspect="1" noChangeArrowheads="1"/>
+          </p:cNvPicPr>
+          <p:nvPr/>
+        </p:nvPicPr>
+        <p:blipFill>
+          <a:blip r:embed="rId3">
+            <a:extLst>
+              <a:ext uri="{28A0092B-C50C-407E-A947-70E740481C1C}">
+                <a14:useLocalDpi xmlns:a14="http://schemas.microsoft.com/office/drawing/2010/main" val="0"/>
+              </a:ext>
+            </a:extLst>
+          </a:blip>
+          <a:srcRect/>
+          <a:stretch>
+            <a:fillRect/>
+          </a:stretch>
+        </p:blipFill>
+        <p:spPr bwMode="auto">
           <a:xfrm>
-            <a:off x="1103312" y="1443790"/>
-            <a:ext cx="8946541" cy="4804610"/>
+            <a:off x="2782860" y="1853247"/>
+            <a:ext cx="6426929" cy="4289975"/>
           </a:xfrm>
+          <a:prstGeom prst="rect">
+            <a:avLst/>
+          </a:prstGeom>
+          <a:noFill/>
+          <a:extLst>
+            <a:ext uri="{909E8E84-426E-40DD-AFC4-6F175D3DCCD1}">
+              <a14:hiddenFill xmlns:a14="http://schemas.microsoft.com/office/drawing/2010/main">
+                <a:solidFill>
+                  <a:srgbClr val="FFFFFF"/>
+                </a:solidFill>
+              </a14:hiddenFill>
+            </a:ext>
+          </a:extLst>
         </p:spPr>
-        <p:txBody>
-          <a:bodyPr>
-            <a:noAutofit/>
-          </a:bodyPr>
-          <a:lstStyle/>
-          <a:p>
-            <a:r>
-              <a:rPr lang="en-US" sz="2800" dirty="0" smtClean="0"/>
-              <a:t>Serve functional Web APIs</a:t>
-            </a:r>
-          </a:p>
-          <a:p>
-            <a:r>
-              <a:rPr lang="en-US" sz="2800" dirty="0" smtClean="0"/>
-              <a:t>Consume HTTP with pattern matching</a:t>
-            </a:r>
-          </a:p>
-        </p:txBody>
-      </p:sp>
+      </p:pic>
     </p:spTree>
     <p:extLst>
       <p:ext uri="{BB962C8B-B14F-4D97-AF65-F5344CB8AC3E}">
@@ -10275,7 +10656,7 @@
       </p:grpSpPr>
       <p:sp>
         <p:nvSpPr>
-          <p:cNvPr id="2" name="Title 1"/>
+          <p:cNvPr id="4" name="Title 3"/>
           <p:cNvSpPr>
             <a:spLocks noGrp="1"/>
           </p:cNvSpPr>
@@ -10290,7 +10671,7 @@
           <a:p>
             <a:r>
               <a:rPr lang="en-US" dirty="0" smtClean="0"/>
-              <a:t>Frank</a:t>
+              <a:t>Where does F# shine?</a:t>
             </a:r>
             <a:endParaRPr lang="en-US" dirty="0"/>
           </a:p>
@@ -10298,7 +10679,7 @@
       </p:sp>
       <p:sp>
         <p:nvSpPr>
-          <p:cNvPr id="3" name="Content Placeholder 2"/>
+          <p:cNvPr id="5" name="Content Placeholder 4"/>
           <p:cNvSpPr>
             <a:spLocks noGrp="1"/>
           </p:cNvSpPr>
@@ -10306,68 +10687,41 @@
             <p:ph idx="1"/>
           </p:nvPr>
         </p:nvSpPr>
-        <p:spPr/>
+        <p:spPr>
+          <a:xfrm>
+            <a:off x="1103312" y="1443790"/>
+            <a:ext cx="8946541" cy="4804610"/>
+          </a:xfrm>
+        </p:spPr>
         <p:txBody>
           <a:bodyPr>
-            <a:normAutofit/>
+            <a:noAutofit/>
           </a:bodyPr>
           <a:lstStyle/>
           <a:p>
             <a:r>
               <a:rPr lang="en-US" sz="2800" dirty="0" smtClean="0"/>
-              <a:t>F# DSL using </a:t>
-            </a:r>
-            <a:r>
-              <a:rPr lang="en-US" sz="2800" dirty="0" err="1" smtClean="0"/>
-              <a:t>System.Net.Http</a:t>
-            </a:r>
-            <a:endParaRPr lang="en-US" sz="2800" dirty="0" smtClean="0"/>
+              <a:t>Serve functional Web APIs</a:t>
+            </a:r>
           </a:p>
           <a:p>
             <a:r>
               <a:rPr lang="en-US" sz="2800" dirty="0" smtClean="0"/>
-              <a:t>Headers composition</a:t>
-            </a:r>
-          </a:p>
-          <a:p>
-            <a:r>
-              <a:rPr lang="en-US" sz="2800" dirty="0" smtClean="0"/>
-              <a:t>Follows the natural composition of HTTP</a:t>
-            </a:r>
-          </a:p>
-          <a:p>
-            <a:r>
-              <a:rPr lang="en-US" sz="2800" dirty="0" smtClean="0"/>
-              <a:t>Frank Resources == HTTP Resources</a:t>
-            </a:r>
-          </a:p>
-          <a:p>
-            <a:r>
-              <a:rPr lang="en-US" sz="2800" dirty="0" smtClean="0"/>
-              <a:t>Define your own conventions!</a:t>
-            </a:r>
-            <a:endParaRPr lang="en-US" sz="2800" dirty="0"/>
+              <a:t>Consume HTTP with pattern matching</a:t>
+            </a:r>
           </a:p>
         </p:txBody>
       </p:sp>
     </p:spTree>
     <p:extLst>
       <p:ext uri="{BB962C8B-B14F-4D97-AF65-F5344CB8AC3E}">
-        <p14:creationId xmlns:p14="http://schemas.microsoft.com/office/powerpoint/2010/main" val="1532543768"/>
+        <p14:creationId xmlns:p14="http://schemas.microsoft.com/office/powerpoint/2010/main" val="1393590585"/>
       </p:ext>
     </p:extLst>
   </p:cSld>
   <p:clrMapOvr>
     <a:masterClrMapping/>
   </p:clrMapOvr>
-  <mc:AlternateContent xmlns:mc="http://schemas.openxmlformats.org/markup-compatibility/2006">
-    <mc:Choice xmlns:p14="http://schemas.microsoft.com/office/powerpoint/2010/main" Requires="p14">
-      <p:transition spd="slow" p14:dur="2000"/>
-    </mc:Choice>
-    <mc:Fallback>
-      <p:transition spd="slow"/>
-    </mc:Fallback>
-  </mc:AlternateContent>
   <p:timing>
     <p:tnLst>
       <p:par>
@@ -10407,113 +10761,75 @@
         </p:nvSpPr>
         <p:spPr/>
         <p:txBody>
+          <a:bodyPr/>
+          <a:lstStyle/>
+          <a:p>
+            <a:r>
+              <a:rPr lang="en-US" dirty="0" smtClean="0"/>
+              <a:t>Frank</a:t>
+            </a:r>
+            <a:endParaRPr lang="en-US" dirty="0"/>
+          </a:p>
+        </p:txBody>
+      </p:sp>
+      <p:sp>
+        <p:nvSpPr>
+          <p:cNvPr id="3" name="Content Placeholder 2"/>
+          <p:cNvSpPr>
+            <a:spLocks noGrp="1"/>
+          </p:cNvSpPr>
+          <p:nvPr>
+            <p:ph idx="1"/>
+          </p:nvPr>
+        </p:nvSpPr>
+        <p:spPr/>
+        <p:txBody>
           <a:bodyPr>
             <a:normAutofit/>
           </a:bodyPr>
           <a:lstStyle/>
           <a:p>
             <a:r>
-              <a:rPr lang="en-US" dirty="0" smtClean="0"/>
-              <a:t>Simplest HTTP Application</a:t>
-            </a:r>
-            <a:endParaRPr lang="en-US" dirty="0"/>
-          </a:p>
-        </p:txBody>
-      </p:sp>
-      <p:sp>
-        <p:nvSpPr>
-          <p:cNvPr id="3" name="Content Placeholder 2"/>
-          <p:cNvSpPr>
-            <a:spLocks noGrp="1"/>
-          </p:cNvSpPr>
-          <p:nvPr>
-            <p:ph idx="1"/>
-          </p:nvPr>
-        </p:nvSpPr>
-        <p:spPr>
-          <a:xfrm>
-            <a:off x="481263" y="2052918"/>
-            <a:ext cx="11165305" cy="4195481"/>
-          </a:xfrm>
-        </p:spPr>
-        <p:txBody>
-          <a:bodyPr>
-            <a:normAutofit/>
-          </a:bodyPr>
-          <a:lstStyle/>
-          <a:p>
-            <a:pPr marL="0" indent="0" algn="ctr">
-              <a:buNone/>
-            </a:pPr>
-            <a:r>
-              <a:rPr lang="en-US" sz="3200" dirty="0" err="1" smtClean="0">
-                <a:latin typeface="Consolas"/>
-                <a:cs typeface="Consolas"/>
-              </a:rPr>
-              <a:t>HttpRequestMessage</a:t>
-            </a:r>
-            <a:r>
-              <a:rPr lang="en-US" sz="3200" dirty="0" smtClean="0">
-                <a:latin typeface="Consolas"/>
-                <a:cs typeface="Consolas"/>
-              </a:rPr>
-              <a:t> </a:t>
-            </a:r>
-            <a:r>
-              <a:rPr lang="en-US" sz="3200" dirty="0">
-                <a:latin typeface="Consolas"/>
-                <a:cs typeface="Consolas"/>
-              </a:rPr>
-              <a:t>-&gt; </a:t>
-            </a:r>
-            <a:r>
-              <a:rPr lang="en-US" sz="3200" strike="sngStrike" dirty="0">
-                <a:latin typeface="Consolas"/>
-                <a:cs typeface="Consolas"/>
-              </a:rPr>
-              <a:t>HttpResponseMessage</a:t>
-            </a:r>
-          </a:p>
-          <a:p>
-            <a:pPr marL="0" indent="0" algn="ctr">
-              <a:buNone/>
-            </a:pPr>
-            <a:endParaRPr lang="en-US" sz="3200" strike="sngStrike" dirty="0">
-              <a:latin typeface="Monaco" pitchFamily="2" charset="0"/>
-            </a:endParaRPr>
-          </a:p>
-          <a:p>
-            <a:pPr marL="0" indent="0" algn="ctr">
-              <a:buNone/>
-            </a:pPr>
-            <a:r>
-              <a:rPr lang="en-US" sz="3200" dirty="0">
-                <a:latin typeface="Consolas"/>
-                <a:cs typeface="Consolas"/>
-              </a:rPr>
-              <a:t>HttpRequestMessage -&gt; </a:t>
-            </a:r>
-            <a:r>
-              <a:rPr lang="en-US" sz="3200" dirty="0" err="1">
-                <a:latin typeface="Consolas"/>
-                <a:cs typeface="Consolas"/>
-              </a:rPr>
-              <a:t>Async</a:t>
-            </a:r>
-            <a:r>
-              <a:rPr lang="en-US" sz="3200" dirty="0">
-                <a:latin typeface="Consolas"/>
-                <a:cs typeface="Consolas"/>
-              </a:rPr>
-              <a:t>&lt;HttpResponseMessage&gt;</a:t>
-            </a:r>
+              <a:rPr lang="en-US" sz="2800" dirty="0" smtClean="0"/>
+              <a:t>F# DSL using </a:t>
+            </a:r>
+            <a:r>
+              <a:rPr lang="en-US" sz="2800" dirty="0" err="1" smtClean="0"/>
+              <a:t>System.Net.Http</a:t>
+            </a:r>
+            <a:endParaRPr lang="en-US" sz="2800" dirty="0" smtClean="0"/>
+          </a:p>
+          <a:p>
+            <a:r>
+              <a:rPr lang="en-US" sz="2800" dirty="0" smtClean="0"/>
+              <a:t>Headers composition</a:t>
+            </a:r>
+          </a:p>
+          <a:p>
+            <a:r>
+              <a:rPr lang="en-US" sz="2800" dirty="0" smtClean="0"/>
+              <a:t>Follows the natural composition of HTTP</a:t>
+            </a:r>
+          </a:p>
+          <a:p>
+            <a:r>
+              <a:rPr lang="en-US" sz="2800" dirty="0" smtClean="0"/>
+              <a:t>Frank Resources == HTTP Resources</a:t>
+            </a:r>
+          </a:p>
+          <a:p>
+            <a:r>
+              <a:rPr lang="en-US" sz="2800" dirty="0" smtClean="0"/>
+              <a:t>Define your own conventions!</a:t>
+            </a:r>
+            <a:endParaRPr lang="en-US" sz="2800" dirty="0"/>
           </a:p>
         </p:txBody>
       </p:sp>
     </p:spTree>
     <p:extLst>
       <p:ext uri="{BB962C8B-B14F-4D97-AF65-F5344CB8AC3E}">
-        <p14:creationId xmlns:p14="http://schemas.microsoft.com/office/powerpoint/2010/main" val="540654935"/>
+        <p14:creationId xmlns:p14="http://schemas.microsoft.com/office/powerpoint/2010/main" val="1532543768"/>
       </p:ext>
     </p:extLst>
   </p:cSld>
@@ -10567,12 +10883,14 @@
         </p:nvSpPr>
         <p:spPr/>
         <p:txBody>
-          <a:bodyPr/>
+          <a:bodyPr>
+            <a:normAutofit/>
+          </a:bodyPr>
           <a:lstStyle/>
           <a:p>
             <a:r>
               <a:rPr lang="en-US" dirty="0" smtClean="0"/>
-              <a:t>Define a Method Handler</a:t>
+              <a:t>Simplest HTTP Application</a:t>
             </a:r>
             <a:endParaRPr lang="en-US" dirty="0"/>
           </a:p>
@@ -10590,198 +10908,80 @@
         </p:nvSpPr>
         <p:spPr>
           <a:xfrm>
-            <a:off x="445168" y="1696452"/>
-            <a:ext cx="11273590" cy="4551947"/>
+            <a:off x="481263" y="2052918"/>
+            <a:ext cx="11165305" cy="4195481"/>
           </a:xfrm>
         </p:spPr>
         <p:txBody>
           <a:bodyPr>
-            <a:noAutofit/>
+            <a:normAutofit/>
           </a:bodyPr>
           <a:lstStyle/>
           <a:p>
-            <a:pPr marL="0" indent="0">
+            <a:pPr marL="0" indent="0" algn="ctr">
               <a:buNone/>
             </a:pPr>
             <a:r>
-              <a:rPr lang="en-US" sz="2800" dirty="0" smtClean="0">
+              <a:rPr lang="en-US" sz="3200" dirty="0" err="1" smtClean="0">
                 <a:latin typeface="Consolas"/>
                 <a:cs typeface="Consolas"/>
               </a:rPr>
-              <a:t>// </a:t>
-            </a:r>
-            <a:r>
-              <a:rPr lang="en-US" sz="2800" dirty="0">
+              <a:t>HttpRequestMessage</a:t>
+            </a:r>
+            <a:r>
+              <a:rPr lang="en-US" sz="3200" dirty="0" smtClean="0">
                 <a:latin typeface="Consolas"/>
                 <a:cs typeface="Consolas"/>
               </a:rPr>
-              <a:t>handler</a:t>
-            </a:r>
-          </a:p>
-          <a:p>
-            <a:pPr marL="0" indent="0">
-              <a:buNone/>
-            </a:pPr>
-            <a:r>
-              <a:rPr lang="en-US" sz="2800" dirty="0">
+              <a:t> </a:t>
+            </a:r>
+            <a:r>
+              <a:rPr lang="en-US" sz="3200" dirty="0">
                 <a:latin typeface="Consolas"/>
                 <a:cs typeface="Consolas"/>
               </a:rPr>
-              <a:t>let echo request = </a:t>
-            </a:r>
-            <a:r>
-              <a:rPr lang="en-US" sz="2800" dirty="0" err="1">
+              <a:t>-&gt; </a:t>
+            </a:r>
+            <a:r>
+              <a:rPr lang="en-US" sz="3200" strike="sngStrike" dirty="0">
                 <a:latin typeface="Consolas"/>
                 <a:cs typeface="Consolas"/>
               </a:rPr>
-              <a:t>async</a:t>
-            </a:r>
-            <a:r>
-              <a:rPr lang="en-US" sz="2800" dirty="0">
+              <a:t>HttpResponseMessage</a:t>
+            </a:r>
+          </a:p>
+          <a:p>
+            <a:pPr marL="0" indent="0" algn="ctr">
+              <a:buNone/>
+            </a:pPr>
+            <a:endParaRPr lang="en-US" sz="3200" strike="sngStrike" dirty="0">
+              <a:latin typeface="Monaco" pitchFamily="2" charset="0"/>
+            </a:endParaRPr>
+          </a:p>
+          <a:p>
+            <a:pPr marL="0" indent="0" algn="ctr">
+              <a:buNone/>
+            </a:pPr>
+            <a:r>
+              <a:rPr lang="en-US" sz="3200" dirty="0">
                 <a:latin typeface="Consolas"/>
                 <a:cs typeface="Consolas"/>
               </a:rPr>
-              <a:t> {</a:t>
-            </a:r>
-          </a:p>
-          <a:p>
-            <a:pPr marL="0" indent="0">
-              <a:buNone/>
-            </a:pPr>
-            <a:r>
-              <a:rPr lang="en-US" sz="2800" dirty="0">
-                <a:latin typeface="Monaco" pitchFamily="2" charset="0"/>
-              </a:rPr>
-              <a:t>  </a:t>
-            </a:r>
-            <a:r>
-              <a:rPr lang="en-US" sz="2800" dirty="0" smtClean="0">
-                <a:latin typeface="Monaco" pitchFamily="2" charset="0"/>
-              </a:rPr>
-              <a:t>  </a:t>
-            </a:r>
-            <a:r>
-              <a:rPr lang="en-US" sz="2800" dirty="0" smtClean="0">
+              <a:t>HttpRequestMessage -&gt; </a:t>
+            </a:r>
+            <a:r>
+              <a:rPr lang="en-US" sz="3200" dirty="0" err="1">
                 <a:latin typeface="Consolas"/>
                 <a:cs typeface="Consolas"/>
               </a:rPr>
-              <a:t>let</a:t>
-            </a:r>
-            <a:r>
-              <a:rPr lang="en-US" sz="2800" dirty="0">
+              <a:t>Async</a:t>
+            </a:r>
+            <a:r>
+              <a:rPr lang="en-US" sz="3200" dirty="0">
                 <a:latin typeface="Consolas"/>
                 <a:cs typeface="Consolas"/>
               </a:rPr>
-              <a:t>! body = </a:t>
-            </a:r>
-            <a:r>
-              <a:rPr lang="en-US" sz="2800" dirty="0" err="1">
-                <a:latin typeface="Consolas"/>
-                <a:cs typeface="Consolas"/>
-              </a:rPr>
-              <a:t>request.Content.AsyncReadAsString</a:t>
-            </a:r>
-            <a:r>
-              <a:rPr lang="en-US" sz="2800" dirty="0">
-                <a:latin typeface="Consolas"/>
-                <a:cs typeface="Consolas"/>
-              </a:rPr>
-              <a:t>()</a:t>
-            </a:r>
-          </a:p>
-          <a:p>
-            <a:pPr marL="0" indent="0">
-              <a:buNone/>
-            </a:pPr>
-            <a:r>
-              <a:rPr lang="en-US" sz="2800" dirty="0">
-                <a:latin typeface="Monaco" pitchFamily="2" charset="0"/>
-              </a:rPr>
-              <a:t>  </a:t>
-            </a:r>
-            <a:r>
-              <a:rPr lang="en-US" sz="2800" dirty="0" smtClean="0">
-                <a:latin typeface="Monaco" pitchFamily="2" charset="0"/>
-              </a:rPr>
-              <a:t>  </a:t>
-            </a:r>
-            <a:r>
-              <a:rPr lang="en-US" sz="2800" dirty="0" smtClean="0">
-                <a:latin typeface="Consolas"/>
-                <a:cs typeface="Consolas"/>
-              </a:rPr>
-              <a:t>return </a:t>
-            </a:r>
-            <a:r>
-              <a:rPr lang="en-US" sz="2800" dirty="0" err="1" smtClean="0">
-                <a:latin typeface="Consolas"/>
-                <a:cs typeface="Consolas"/>
-              </a:rPr>
-              <a:t>request.CreateResponse</a:t>
-            </a:r>
-            <a:r>
-              <a:rPr lang="en-US" sz="2800" dirty="0" smtClean="0">
-                <a:latin typeface="Consolas"/>
-                <a:cs typeface="Consolas"/>
-              </a:rPr>
-              <a:t>(</a:t>
-            </a:r>
-            <a:r>
-              <a:rPr lang="en-US" sz="2800" dirty="0" err="1" smtClean="0">
-                <a:latin typeface="Consolas"/>
-                <a:cs typeface="Consolas"/>
-              </a:rPr>
-              <a:t>HttpStatusCode.OK</a:t>
-            </a:r>
-            <a:r>
-              <a:rPr lang="en-US" sz="2800" dirty="0" smtClean="0">
-                <a:latin typeface="Consolas"/>
-                <a:cs typeface="Consolas"/>
-              </a:rPr>
-              <a:t>, body)</a:t>
-            </a:r>
-            <a:endParaRPr lang="en-US" sz="2800" dirty="0">
-              <a:latin typeface="Consolas"/>
-              <a:cs typeface="Consolas"/>
-            </a:endParaRPr>
-          </a:p>
-          <a:p>
-            <a:pPr marL="0" indent="0">
-              <a:buNone/>
-            </a:pPr>
-            <a:r>
-              <a:rPr lang="en-US" sz="2800" dirty="0" smtClean="0">
-                <a:latin typeface="Consolas"/>
-                <a:cs typeface="Consolas"/>
-              </a:rPr>
-              <a:t>}</a:t>
-            </a:r>
-            <a:endParaRPr lang="en-US" sz="2800" dirty="0">
-              <a:latin typeface="Monaco" pitchFamily="2" charset="0"/>
-            </a:endParaRPr>
-          </a:p>
-          <a:p>
-            <a:pPr marL="0" indent="0">
-              <a:buNone/>
-            </a:pPr>
-            <a:r>
-              <a:rPr lang="en-US" sz="2800" dirty="0">
-                <a:latin typeface="Consolas"/>
-                <a:cs typeface="Consolas"/>
-              </a:rPr>
-              <a:t>// method handler</a:t>
-            </a:r>
-          </a:p>
-          <a:p>
-            <a:pPr marL="0" indent="0">
-              <a:buNone/>
-            </a:pPr>
-            <a:r>
-              <a:rPr lang="en-US" sz="2800" dirty="0">
-                <a:latin typeface="Consolas"/>
-                <a:cs typeface="Consolas"/>
-              </a:rPr>
-              <a:t>get echo</a:t>
+              <a:t>&lt;HttpResponseMessage&gt;</a:t>
             </a:r>
           </a:p>
         </p:txBody>
@@ -10789,7 +10989,7 @@
     </p:spTree>
     <p:extLst>
       <p:ext uri="{BB962C8B-B14F-4D97-AF65-F5344CB8AC3E}">
-        <p14:creationId xmlns:p14="http://schemas.microsoft.com/office/powerpoint/2010/main" val="3462925926"/>
+        <p14:creationId xmlns:p14="http://schemas.microsoft.com/office/powerpoint/2010/main" val="540654935"/>
       </p:ext>
     </p:extLst>
   </p:cSld>

</xml_diff>